<commit_message>
more work on powerpoint completed
</commit_message>
<xml_diff>
--- a/dataBreach.pptx
+++ b/dataBreach.pptx
@@ -7,6 +7,9 @@
   <p:sldIdLst>
     <p:sldId id="280" r:id="rId5"/>
     <p:sldId id="281" r:id="rId6"/>
+    <p:sldId id="282" r:id="rId7"/>
+    <p:sldId id="283" r:id="rId8"/>
+    <p:sldId id="284" r:id="rId9"/>
   </p:sldIdLst>
   <p:sldSz cx="12192000" cy="6858000"/>
   <p:notesSz cx="6858000" cy="9144000"/>
@@ -111,3369 +114,6 @@
     </p:ext>
   </p:extLst>
 </p:presentation>
-</file>
-
-<file path=ppt/diagrams/colors1.xml><?xml version="1.0" encoding="utf-8"?>
-<dgm:colorsDef xmlns:dgm="http://schemas.openxmlformats.org/drawingml/2006/diagram" xmlns:a="http://schemas.openxmlformats.org/drawingml/2006/main" uniqueId="urn:microsoft.com/office/officeart/2018/5/colors/Iconchunking_neutralbg_accent2_2">
-  <dgm:title val=""/>
-  <dgm:desc val=""/>
-  <dgm:catLst>
-    <dgm:cat type="accent2" pri="11200"/>
-  </dgm:catLst>
-  <dgm:styleLbl name="node0">
-    <dgm:fillClrLst meth="repeat">
-      <a:schemeClr val="accent2"/>
-    </dgm:fillClrLst>
-    <dgm:linClrLst meth="repeat">
-      <a:schemeClr val="lt1"/>
-    </dgm:linClrLst>
-    <dgm:effectClrLst/>
-    <dgm:txLinClrLst/>
-    <dgm:txFillClrLst/>
-    <dgm:txEffectClrLst/>
-  </dgm:styleLbl>
-  <dgm:styleLbl name="node1">
-    <dgm:fillClrLst meth="repeat">
-      <a:schemeClr val="accent2"/>
-    </dgm:fillClrLst>
-    <dgm:linClrLst meth="repeat">
-      <a:schemeClr val="lt1">
-        <a:alpha val="0"/>
-      </a:schemeClr>
-    </dgm:linClrLst>
-    <dgm:effectClrLst/>
-    <dgm:txLinClrLst/>
-    <dgm:txFillClrLst/>
-    <dgm:txEffectClrLst/>
-  </dgm:styleLbl>
-  <dgm:styleLbl name="alignNode1">
-    <dgm:fillClrLst meth="repeat">
-      <a:schemeClr val="accent2"/>
-    </dgm:fillClrLst>
-    <dgm:linClrLst meth="repeat">
-      <a:schemeClr val="accent2"/>
-    </dgm:linClrLst>
-    <dgm:effectClrLst/>
-    <dgm:txLinClrLst/>
-    <dgm:txFillClrLst/>
-    <dgm:txEffectClrLst/>
-  </dgm:styleLbl>
-  <dgm:styleLbl name="lnNode1">
-    <dgm:fillClrLst meth="repeat">
-      <a:schemeClr val="accent2"/>
-    </dgm:fillClrLst>
-    <dgm:linClrLst meth="repeat">
-      <a:schemeClr val="lt1"/>
-    </dgm:linClrLst>
-    <dgm:effectClrLst/>
-    <dgm:txLinClrLst/>
-    <dgm:txFillClrLst/>
-    <dgm:txEffectClrLst/>
-  </dgm:styleLbl>
-  <dgm:styleLbl name="vennNode1">
-    <dgm:fillClrLst meth="repeat">
-      <a:schemeClr val="accent2">
-        <a:alpha val="50000"/>
-      </a:schemeClr>
-    </dgm:fillClrLst>
-    <dgm:linClrLst meth="repeat">
-      <a:schemeClr val="lt1"/>
-    </dgm:linClrLst>
-    <dgm:effectClrLst/>
-    <dgm:txLinClrLst/>
-    <dgm:txFillClrLst/>
-    <dgm:txEffectClrLst/>
-  </dgm:styleLbl>
-  <dgm:styleLbl name="node2">
-    <dgm:fillClrLst meth="repeat">
-      <a:schemeClr val="accent2"/>
-    </dgm:fillClrLst>
-    <dgm:linClrLst meth="repeat">
-      <a:schemeClr val="lt1"/>
-    </dgm:linClrLst>
-    <dgm:effectClrLst/>
-    <dgm:txLinClrLst/>
-    <dgm:txFillClrLst/>
-    <dgm:txEffectClrLst/>
-  </dgm:styleLbl>
-  <dgm:styleLbl name="node3">
-    <dgm:fillClrLst meth="repeat">
-      <a:schemeClr val="accent2"/>
-    </dgm:fillClrLst>
-    <dgm:linClrLst meth="repeat">
-      <a:schemeClr val="lt1"/>
-    </dgm:linClrLst>
-    <dgm:effectClrLst/>
-    <dgm:txLinClrLst/>
-    <dgm:txFillClrLst/>
-    <dgm:txEffectClrLst/>
-  </dgm:styleLbl>
-  <dgm:styleLbl name="node4">
-    <dgm:fillClrLst meth="repeat">
-      <a:schemeClr val="accent2"/>
-    </dgm:fillClrLst>
-    <dgm:linClrLst meth="repeat">
-      <a:schemeClr val="lt1"/>
-    </dgm:linClrLst>
-    <dgm:effectClrLst/>
-    <dgm:txLinClrLst/>
-    <dgm:txFillClrLst/>
-    <dgm:txEffectClrLst/>
-  </dgm:styleLbl>
-  <dgm:styleLbl name="fgImgPlace1">
-    <dgm:fillClrLst meth="repeat">
-      <a:schemeClr val="accent2">
-        <a:tint val="50000"/>
-      </a:schemeClr>
-    </dgm:fillClrLst>
-    <dgm:linClrLst meth="repeat">
-      <a:schemeClr val="lt1"/>
-    </dgm:linClrLst>
-    <dgm:effectClrLst/>
-    <dgm:txLinClrLst/>
-    <dgm:txFillClrLst meth="repeat">
-      <a:schemeClr val="lt1"/>
-    </dgm:txFillClrLst>
-    <dgm:txEffectClrLst/>
-  </dgm:styleLbl>
-  <dgm:styleLbl name="alignImgPlace1">
-    <dgm:fillClrLst meth="repeat">
-      <a:schemeClr val="accent2">
-        <a:tint val="50000"/>
-      </a:schemeClr>
-    </dgm:fillClrLst>
-    <dgm:linClrLst meth="repeat">
-      <a:schemeClr val="lt1"/>
-    </dgm:linClrLst>
-    <dgm:effectClrLst/>
-    <dgm:txLinClrLst/>
-    <dgm:txFillClrLst meth="repeat">
-      <a:schemeClr val="lt1"/>
-    </dgm:txFillClrLst>
-    <dgm:txEffectClrLst/>
-  </dgm:styleLbl>
-  <dgm:styleLbl name="bgImgPlace1">
-    <dgm:fillClrLst meth="repeat">
-      <a:schemeClr val="accent2">
-        <a:tint val="50000"/>
-      </a:schemeClr>
-    </dgm:fillClrLst>
-    <dgm:linClrLst meth="repeat">
-      <a:schemeClr val="lt1"/>
-    </dgm:linClrLst>
-    <dgm:effectClrLst/>
-    <dgm:txLinClrLst/>
-    <dgm:txFillClrLst meth="repeat">
-      <a:schemeClr val="lt1"/>
-    </dgm:txFillClrLst>
-    <dgm:txEffectClrLst/>
-  </dgm:styleLbl>
-  <dgm:styleLbl name="sibTrans2D1">
-    <dgm:fillClrLst meth="repeat">
-      <a:schemeClr val="accent2">
-        <a:tint val="60000"/>
-      </a:schemeClr>
-    </dgm:fillClrLst>
-    <dgm:linClrLst meth="repeat">
-      <a:schemeClr val="accent2">
-        <a:tint val="60000"/>
-      </a:schemeClr>
-    </dgm:linClrLst>
-    <dgm:effectClrLst/>
-    <dgm:txLinClrLst/>
-    <dgm:txFillClrLst/>
-    <dgm:txEffectClrLst/>
-  </dgm:styleLbl>
-  <dgm:styleLbl name="fgSibTrans2D1">
-    <dgm:fillClrLst meth="repeat">
-      <a:schemeClr val="accent2">
-        <a:tint val="60000"/>
-      </a:schemeClr>
-    </dgm:fillClrLst>
-    <dgm:linClrLst meth="repeat">
-      <a:schemeClr val="accent2">
-        <a:tint val="60000"/>
-      </a:schemeClr>
-    </dgm:linClrLst>
-    <dgm:effectClrLst/>
-    <dgm:txLinClrLst/>
-    <dgm:txFillClrLst/>
-    <dgm:txEffectClrLst/>
-  </dgm:styleLbl>
-  <dgm:styleLbl name="bgSibTrans2D1">
-    <dgm:fillClrLst meth="repeat">
-      <a:schemeClr val="accent2">
-        <a:tint val="60000"/>
-      </a:schemeClr>
-    </dgm:fillClrLst>
-    <dgm:linClrLst meth="repeat">
-      <a:schemeClr val="accent2">
-        <a:tint val="60000"/>
-      </a:schemeClr>
-    </dgm:linClrLst>
-    <dgm:effectClrLst/>
-    <dgm:txLinClrLst/>
-    <dgm:txFillClrLst/>
-    <dgm:txEffectClrLst/>
-  </dgm:styleLbl>
-  <dgm:styleLbl name="sibTrans1D1">
-    <dgm:fillClrLst meth="repeat">
-      <a:schemeClr val="accent2"/>
-    </dgm:fillClrLst>
-    <dgm:linClrLst meth="repeat">
-      <a:schemeClr val="accent2"/>
-    </dgm:linClrLst>
-    <dgm:effectClrLst/>
-    <dgm:txLinClrLst/>
-    <dgm:txFillClrLst meth="repeat">
-      <a:schemeClr val="tx1"/>
-    </dgm:txFillClrLst>
-    <dgm:txEffectClrLst/>
-  </dgm:styleLbl>
-  <dgm:styleLbl name="callout">
-    <dgm:fillClrLst meth="repeat">
-      <a:schemeClr val="accent2"/>
-    </dgm:fillClrLst>
-    <dgm:linClrLst meth="repeat">
-      <a:schemeClr val="accent2">
-        <a:tint val="50000"/>
-      </a:schemeClr>
-    </dgm:linClrLst>
-    <dgm:effectClrLst/>
-    <dgm:txLinClrLst/>
-    <dgm:txFillClrLst meth="repeat">
-      <a:schemeClr val="tx1"/>
-    </dgm:txFillClrLst>
-    <dgm:txEffectClrLst/>
-  </dgm:styleLbl>
-  <dgm:styleLbl name="asst0">
-    <dgm:fillClrLst meth="repeat">
-      <a:schemeClr val="accent2"/>
-    </dgm:fillClrLst>
-    <dgm:linClrLst meth="repeat">
-      <a:schemeClr val="lt1"/>
-    </dgm:linClrLst>
-    <dgm:effectClrLst/>
-    <dgm:txLinClrLst/>
-    <dgm:txFillClrLst/>
-    <dgm:txEffectClrLst/>
-  </dgm:styleLbl>
-  <dgm:styleLbl name="asst1">
-    <dgm:fillClrLst meth="repeat">
-      <a:schemeClr val="accent2"/>
-    </dgm:fillClrLst>
-    <dgm:linClrLst meth="repeat">
-      <a:schemeClr val="lt1"/>
-    </dgm:linClrLst>
-    <dgm:effectClrLst/>
-    <dgm:txLinClrLst/>
-    <dgm:txFillClrLst/>
-    <dgm:txEffectClrLst/>
-  </dgm:styleLbl>
-  <dgm:styleLbl name="asst2">
-    <dgm:fillClrLst meth="repeat">
-      <a:schemeClr val="accent2"/>
-    </dgm:fillClrLst>
-    <dgm:linClrLst meth="repeat">
-      <a:schemeClr val="lt1"/>
-    </dgm:linClrLst>
-    <dgm:effectClrLst/>
-    <dgm:txLinClrLst/>
-    <dgm:txFillClrLst/>
-    <dgm:txEffectClrLst/>
-  </dgm:styleLbl>
-  <dgm:styleLbl name="asst3">
-    <dgm:fillClrLst meth="repeat">
-      <a:schemeClr val="accent2"/>
-    </dgm:fillClrLst>
-    <dgm:linClrLst meth="repeat">
-      <a:schemeClr val="lt1"/>
-    </dgm:linClrLst>
-    <dgm:effectClrLst/>
-    <dgm:txLinClrLst/>
-    <dgm:txFillClrLst/>
-    <dgm:txEffectClrLst/>
-  </dgm:styleLbl>
-  <dgm:styleLbl name="asst4">
-    <dgm:fillClrLst meth="repeat">
-      <a:schemeClr val="accent2"/>
-    </dgm:fillClrLst>
-    <dgm:linClrLst meth="repeat">
-      <a:schemeClr val="lt1"/>
-    </dgm:linClrLst>
-    <dgm:effectClrLst/>
-    <dgm:txLinClrLst/>
-    <dgm:txFillClrLst/>
-    <dgm:txEffectClrLst/>
-  </dgm:styleLbl>
-  <dgm:styleLbl name="parChTrans2D1">
-    <dgm:fillClrLst meth="repeat">
-      <a:schemeClr val="accent2">
-        <a:tint val="60000"/>
-      </a:schemeClr>
-    </dgm:fillClrLst>
-    <dgm:linClrLst meth="repeat">
-      <a:schemeClr val="accent2">
-        <a:tint val="60000"/>
-      </a:schemeClr>
-    </dgm:linClrLst>
-    <dgm:effectClrLst/>
-    <dgm:txLinClrLst/>
-    <dgm:txFillClrLst meth="repeat">
-      <a:schemeClr val="lt1"/>
-    </dgm:txFillClrLst>
-    <dgm:txEffectClrLst/>
-  </dgm:styleLbl>
-  <dgm:styleLbl name="parChTrans2D2">
-    <dgm:fillClrLst meth="repeat">
-      <a:schemeClr val="accent2"/>
-    </dgm:fillClrLst>
-    <dgm:linClrLst meth="repeat">
-      <a:schemeClr val="accent2"/>
-    </dgm:linClrLst>
-    <dgm:effectClrLst/>
-    <dgm:txLinClrLst/>
-    <dgm:txFillClrLst meth="repeat">
-      <a:schemeClr val="lt1"/>
-    </dgm:txFillClrLst>
-    <dgm:txEffectClrLst/>
-  </dgm:styleLbl>
-  <dgm:styleLbl name="parChTrans2D3">
-    <dgm:fillClrLst meth="repeat">
-      <a:schemeClr val="accent2"/>
-    </dgm:fillClrLst>
-    <dgm:linClrLst meth="repeat">
-      <a:schemeClr val="accent2"/>
-    </dgm:linClrLst>
-    <dgm:effectClrLst/>
-    <dgm:txLinClrLst/>
-    <dgm:txFillClrLst meth="repeat">
-      <a:schemeClr val="lt1"/>
-    </dgm:txFillClrLst>
-    <dgm:txEffectClrLst/>
-  </dgm:styleLbl>
-  <dgm:styleLbl name="parChTrans2D4">
-    <dgm:fillClrLst meth="repeat">
-      <a:schemeClr val="accent2"/>
-    </dgm:fillClrLst>
-    <dgm:linClrLst meth="repeat">
-      <a:schemeClr val="accent2"/>
-    </dgm:linClrLst>
-    <dgm:effectClrLst/>
-    <dgm:txLinClrLst/>
-    <dgm:txFillClrLst meth="repeat">
-      <a:schemeClr val="lt1"/>
-    </dgm:txFillClrLst>
-    <dgm:txEffectClrLst/>
-  </dgm:styleLbl>
-  <dgm:styleLbl name="parChTrans1D1">
-    <dgm:fillClrLst meth="repeat">
-      <a:schemeClr val="accent2"/>
-    </dgm:fillClrLst>
-    <dgm:linClrLst meth="repeat">
-      <a:schemeClr val="accent2">
-        <a:shade val="60000"/>
-      </a:schemeClr>
-    </dgm:linClrLst>
-    <dgm:effectClrLst/>
-    <dgm:txLinClrLst/>
-    <dgm:txFillClrLst meth="repeat">
-      <a:schemeClr val="tx1"/>
-    </dgm:txFillClrLst>
-    <dgm:txEffectClrLst/>
-  </dgm:styleLbl>
-  <dgm:styleLbl name="parChTrans1D2">
-    <dgm:fillClrLst meth="repeat">
-      <a:schemeClr val="accent2"/>
-    </dgm:fillClrLst>
-    <dgm:linClrLst meth="repeat">
-      <a:schemeClr val="accent2">
-        <a:shade val="60000"/>
-      </a:schemeClr>
-    </dgm:linClrLst>
-    <dgm:effectClrLst/>
-    <dgm:txLinClrLst/>
-    <dgm:txFillClrLst meth="repeat">
-      <a:schemeClr val="tx1"/>
-    </dgm:txFillClrLst>
-    <dgm:txEffectClrLst/>
-  </dgm:styleLbl>
-  <dgm:styleLbl name="parChTrans1D3">
-    <dgm:fillClrLst meth="repeat">
-      <a:schemeClr val="accent2"/>
-    </dgm:fillClrLst>
-    <dgm:linClrLst meth="repeat">
-      <a:schemeClr val="accent2">
-        <a:shade val="80000"/>
-      </a:schemeClr>
-    </dgm:linClrLst>
-    <dgm:effectClrLst/>
-    <dgm:txLinClrLst/>
-    <dgm:txFillClrLst meth="repeat">
-      <a:schemeClr val="tx1"/>
-    </dgm:txFillClrLst>
-    <dgm:txEffectClrLst/>
-  </dgm:styleLbl>
-  <dgm:styleLbl name="parChTrans1D4">
-    <dgm:fillClrLst meth="repeat">
-      <a:schemeClr val="accent2"/>
-    </dgm:fillClrLst>
-    <dgm:linClrLst meth="repeat">
-      <a:schemeClr val="accent2">
-        <a:shade val="80000"/>
-      </a:schemeClr>
-    </dgm:linClrLst>
-    <dgm:effectClrLst/>
-    <dgm:txLinClrLst/>
-    <dgm:txFillClrLst meth="repeat">
-      <a:schemeClr val="tx1"/>
-    </dgm:txFillClrLst>
-    <dgm:txEffectClrLst/>
-  </dgm:styleLbl>
-  <dgm:styleLbl name="fgAcc1">
-    <dgm:fillClrLst meth="repeat">
-      <a:schemeClr val="lt1">
-        <a:alpha val="90000"/>
-      </a:schemeClr>
-    </dgm:fillClrLst>
-    <dgm:linClrLst meth="repeat">
-      <a:schemeClr val="accent2"/>
-    </dgm:linClrLst>
-    <dgm:effectClrLst/>
-    <dgm:txLinClrLst/>
-    <dgm:txFillClrLst meth="repeat">
-      <a:schemeClr val="dk1"/>
-    </dgm:txFillClrLst>
-    <dgm:txEffectClrLst/>
-  </dgm:styleLbl>
-  <dgm:styleLbl name="conFgAcc1">
-    <dgm:fillClrLst meth="repeat">
-      <a:schemeClr val="lt1">
-        <a:alpha val="90000"/>
-      </a:schemeClr>
-    </dgm:fillClrLst>
-    <dgm:linClrLst meth="repeat">
-      <a:schemeClr val="accent2"/>
-    </dgm:linClrLst>
-    <dgm:effectClrLst/>
-    <dgm:txLinClrLst/>
-    <dgm:txFillClrLst meth="repeat">
-      <a:schemeClr val="dk1"/>
-    </dgm:txFillClrLst>
-    <dgm:txEffectClrLst/>
-  </dgm:styleLbl>
-  <dgm:styleLbl name="alignAcc1">
-    <dgm:fillClrLst meth="repeat">
-      <a:schemeClr val="lt1">
-        <a:alpha val="90000"/>
-      </a:schemeClr>
-    </dgm:fillClrLst>
-    <dgm:linClrLst meth="repeat">
-      <a:schemeClr val="accent2"/>
-    </dgm:linClrLst>
-    <dgm:effectClrLst/>
-    <dgm:txLinClrLst/>
-    <dgm:txFillClrLst meth="repeat">
-      <a:schemeClr val="dk1"/>
-    </dgm:txFillClrLst>
-    <dgm:txEffectClrLst/>
-  </dgm:styleLbl>
-  <dgm:styleLbl name="trAlignAcc1">
-    <dgm:fillClrLst meth="repeat">
-      <a:schemeClr val="lt1">
-        <a:alpha val="40000"/>
-      </a:schemeClr>
-    </dgm:fillClrLst>
-    <dgm:linClrLst meth="repeat">
-      <a:schemeClr val="accent2"/>
-    </dgm:linClrLst>
-    <dgm:effectClrLst/>
-    <dgm:txLinClrLst/>
-    <dgm:txFillClrLst meth="repeat">
-      <a:schemeClr val="dk1"/>
-    </dgm:txFillClrLst>
-    <dgm:txEffectClrLst/>
-  </dgm:styleLbl>
-  <dgm:styleLbl name="bgAcc1">
-    <dgm:fillClrLst meth="repeat">
-      <a:schemeClr val="lt1">
-        <a:alpha val="90000"/>
-      </a:schemeClr>
-    </dgm:fillClrLst>
-    <dgm:linClrLst meth="repeat">
-      <a:schemeClr val="accent2"/>
-    </dgm:linClrLst>
-    <dgm:effectClrLst/>
-    <dgm:txLinClrLst/>
-    <dgm:txFillClrLst meth="repeat">
-      <a:schemeClr val="dk1"/>
-    </dgm:txFillClrLst>
-    <dgm:txEffectClrLst/>
-  </dgm:styleLbl>
-  <dgm:styleLbl name="solidFgAcc1">
-    <dgm:fillClrLst meth="repeat">
-      <a:schemeClr val="lt1"/>
-    </dgm:fillClrLst>
-    <dgm:linClrLst meth="repeat">
-      <a:schemeClr val="accent2"/>
-    </dgm:linClrLst>
-    <dgm:effectClrLst/>
-    <dgm:txLinClrLst/>
-    <dgm:txFillClrLst meth="repeat">
-      <a:schemeClr val="dk1"/>
-    </dgm:txFillClrLst>
-    <dgm:txEffectClrLst/>
-  </dgm:styleLbl>
-  <dgm:styleLbl name="solidAlignAcc1">
-    <dgm:fillClrLst meth="repeat">
-      <a:schemeClr val="lt1"/>
-    </dgm:fillClrLst>
-    <dgm:linClrLst meth="repeat">
-      <a:schemeClr val="accent2"/>
-    </dgm:linClrLst>
-    <dgm:effectClrLst/>
-    <dgm:txLinClrLst/>
-    <dgm:txFillClrLst meth="repeat">
-      <a:schemeClr val="dk1"/>
-    </dgm:txFillClrLst>
-    <dgm:txEffectClrLst/>
-  </dgm:styleLbl>
-  <dgm:styleLbl name="solidBgAcc1">
-    <dgm:fillClrLst meth="repeat">
-      <a:schemeClr val="lt1"/>
-    </dgm:fillClrLst>
-    <dgm:linClrLst meth="repeat">
-      <a:schemeClr val="accent2"/>
-    </dgm:linClrLst>
-    <dgm:effectClrLst/>
-    <dgm:txLinClrLst/>
-    <dgm:txFillClrLst meth="repeat">
-      <a:schemeClr val="dk1"/>
-    </dgm:txFillClrLst>
-    <dgm:txEffectClrLst/>
-  </dgm:styleLbl>
-  <dgm:styleLbl name="fgAccFollowNode1">
-    <dgm:fillClrLst meth="repeat">
-      <a:schemeClr val="accent2">
-        <a:alpha val="90000"/>
-        <a:tint val="40000"/>
-      </a:schemeClr>
-    </dgm:fillClrLst>
-    <dgm:linClrLst meth="repeat">
-      <a:schemeClr val="accent2">
-        <a:alpha val="90000"/>
-        <a:tint val="40000"/>
-      </a:schemeClr>
-    </dgm:linClrLst>
-    <dgm:effectClrLst/>
-    <dgm:txLinClrLst/>
-    <dgm:txFillClrLst meth="repeat">
-      <a:schemeClr val="dk1"/>
-    </dgm:txFillClrLst>
-    <dgm:txEffectClrLst/>
-  </dgm:styleLbl>
-  <dgm:styleLbl name="alignAccFollowNode1">
-    <dgm:fillClrLst meth="repeat">
-      <a:schemeClr val="accent2">
-        <a:alpha val="90000"/>
-        <a:tint val="40000"/>
-      </a:schemeClr>
-    </dgm:fillClrLst>
-    <dgm:linClrLst meth="repeat">
-      <a:schemeClr val="accent2">
-        <a:alpha val="90000"/>
-        <a:tint val="40000"/>
-      </a:schemeClr>
-    </dgm:linClrLst>
-    <dgm:effectClrLst/>
-    <dgm:txLinClrLst/>
-    <dgm:txFillClrLst meth="repeat">
-      <a:schemeClr val="dk1"/>
-    </dgm:txFillClrLst>
-    <dgm:txEffectClrLst/>
-  </dgm:styleLbl>
-  <dgm:styleLbl name="bgAccFollowNode1">
-    <dgm:fillClrLst meth="repeat">
-      <a:schemeClr val="accent2">
-        <a:alpha val="90000"/>
-        <a:tint val="40000"/>
-      </a:schemeClr>
-    </dgm:fillClrLst>
-    <dgm:linClrLst meth="repeat">
-      <a:schemeClr val="accent2">
-        <a:alpha val="90000"/>
-        <a:tint val="40000"/>
-      </a:schemeClr>
-    </dgm:linClrLst>
-    <dgm:effectClrLst/>
-    <dgm:txLinClrLst/>
-    <dgm:txFillClrLst meth="repeat">
-      <a:schemeClr val="dk1"/>
-    </dgm:txFillClrLst>
-    <dgm:txEffectClrLst/>
-  </dgm:styleLbl>
-  <dgm:styleLbl name="fgAcc0">
-    <dgm:fillClrLst meth="repeat">
-      <a:schemeClr val="lt1">
-        <a:alpha val="90000"/>
-      </a:schemeClr>
-    </dgm:fillClrLst>
-    <dgm:linClrLst meth="repeat">
-      <a:schemeClr val="accent2"/>
-    </dgm:linClrLst>
-    <dgm:effectClrLst/>
-    <dgm:txLinClrLst/>
-    <dgm:txFillClrLst meth="repeat">
-      <a:schemeClr val="dk1"/>
-    </dgm:txFillClrLst>
-    <dgm:txEffectClrLst/>
-  </dgm:styleLbl>
-  <dgm:styleLbl name="fgAcc2">
-    <dgm:fillClrLst meth="repeat">
-      <a:schemeClr val="lt1">
-        <a:alpha val="90000"/>
-      </a:schemeClr>
-    </dgm:fillClrLst>
-    <dgm:linClrLst meth="repeat">
-      <a:schemeClr val="accent2"/>
-    </dgm:linClrLst>
-    <dgm:effectClrLst/>
-    <dgm:txLinClrLst/>
-    <dgm:txFillClrLst meth="repeat">
-      <a:schemeClr val="dk1"/>
-    </dgm:txFillClrLst>
-    <dgm:txEffectClrLst/>
-  </dgm:styleLbl>
-  <dgm:styleLbl name="fgAcc3">
-    <dgm:fillClrLst meth="repeat">
-      <a:schemeClr val="lt1">
-        <a:alpha val="90000"/>
-      </a:schemeClr>
-    </dgm:fillClrLst>
-    <dgm:linClrLst meth="repeat">
-      <a:schemeClr val="accent2"/>
-    </dgm:linClrLst>
-    <dgm:effectClrLst/>
-    <dgm:txLinClrLst/>
-    <dgm:txFillClrLst meth="repeat">
-      <a:schemeClr val="dk1"/>
-    </dgm:txFillClrLst>
-    <dgm:txEffectClrLst/>
-  </dgm:styleLbl>
-  <dgm:styleLbl name="fgAcc4">
-    <dgm:fillClrLst meth="repeat">
-      <a:schemeClr val="lt1">
-        <a:alpha val="90000"/>
-      </a:schemeClr>
-    </dgm:fillClrLst>
-    <dgm:linClrLst meth="repeat">
-      <a:schemeClr val="accent2"/>
-    </dgm:linClrLst>
-    <dgm:effectClrLst/>
-    <dgm:txLinClrLst/>
-    <dgm:txFillClrLst meth="repeat">
-      <a:schemeClr val="dk1"/>
-    </dgm:txFillClrLst>
-    <dgm:txEffectClrLst/>
-  </dgm:styleLbl>
-  <dgm:styleLbl name="bgShp">
-    <dgm:fillClrLst meth="repeat">
-      <a:schemeClr val="bg1">
-        <a:lumMod val="95000"/>
-      </a:schemeClr>
-    </dgm:fillClrLst>
-    <dgm:linClrLst meth="repeat">
-      <a:schemeClr val="accent2"/>
-    </dgm:linClrLst>
-    <dgm:effectClrLst/>
-    <dgm:txLinClrLst/>
-    <dgm:txFillClrLst meth="repeat">
-      <a:schemeClr val="dk1"/>
-    </dgm:txFillClrLst>
-    <dgm:txEffectClrLst/>
-  </dgm:styleLbl>
-  <dgm:styleLbl name="dkBgShp">
-    <dgm:fillClrLst meth="repeat">
-      <a:schemeClr val="accent2">
-        <a:shade val="80000"/>
-      </a:schemeClr>
-    </dgm:fillClrLst>
-    <dgm:linClrLst meth="repeat">
-      <a:schemeClr val="accent2"/>
-    </dgm:linClrLst>
-    <dgm:effectClrLst/>
-    <dgm:txLinClrLst/>
-    <dgm:txFillClrLst meth="repeat">
-      <a:schemeClr val="lt1"/>
-    </dgm:txFillClrLst>
-    <dgm:txEffectClrLst/>
-  </dgm:styleLbl>
-  <dgm:styleLbl name="trBgShp">
-    <dgm:fillClrLst meth="repeat">
-      <a:schemeClr val="accent2">
-        <a:tint val="50000"/>
-        <a:alpha val="40000"/>
-      </a:schemeClr>
-    </dgm:fillClrLst>
-    <dgm:linClrLst meth="repeat">
-      <a:schemeClr val="accent2"/>
-    </dgm:linClrLst>
-    <dgm:effectClrLst/>
-    <dgm:txLinClrLst/>
-    <dgm:txFillClrLst meth="repeat">
-      <a:schemeClr val="lt1"/>
-    </dgm:txFillClrLst>
-    <dgm:txEffectClrLst/>
-  </dgm:styleLbl>
-  <dgm:styleLbl name="fgShp">
-    <dgm:fillClrLst meth="repeat">
-      <a:schemeClr val="accent2">
-        <a:tint val="60000"/>
-      </a:schemeClr>
-    </dgm:fillClrLst>
-    <dgm:linClrLst meth="repeat">
-      <a:schemeClr val="lt1"/>
-    </dgm:linClrLst>
-    <dgm:effectClrLst/>
-    <dgm:txLinClrLst/>
-    <dgm:txFillClrLst meth="repeat">
-      <a:schemeClr val="dk1"/>
-    </dgm:txFillClrLst>
-    <dgm:txEffectClrLst/>
-  </dgm:styleLbl>
-  <dgm:styleLbl name="revTx">
-    <dgm:fillClrLst meth="repeat">
-      <a:schemeClr val="lt1">
-        <a:alpha val="0"/>
-      </a:schemeClr>
-    </dgm:fillClrLst>
-    <dgm:linClrLst meth="repeat">
-      <a:schemeClr val="dk1">
-        <a:alpha val="0"/>
-      </a:schemeClr>
-    </dgm:linClrLst>
-    <dgm:effectClrLst/>
-    <dgm:txLinClrLst/>
-    <dgm:txFillClrLst meth="repeat">
-      <a:schemeClr val="tx1"/>
-    </dgm:txFillClrLst>
-    <dgm:txEffectClrLst/>
-  </dgm:styleLbl>
-</dgm:colorsDef>
-</file>
-
-<file path=ppt/diagrams/data1.xml><?xml version="1.0" encoding="utf-8"?>
-<dgm:dataModel xmlns:dgm="http://schemas.openxmlformats.org/drawingml/2006/diagram" xmlns:a="http://schemas.openxmlformats.org/drawingml/2006/main">
-  <dgm:ptLst>
-    <dgm:pt modelId="{E817CCF5-DA3F-4E5F-BE7C-D8111B2BFEBA}" type="doc">
-      <dgm:prSet loTypeId="urn:microsoft.com/office/officeart/2018/5/layout/CenteredIconLabelDescriptionList" loCatId="icon" qsTypeId="urn:microsoft.com/office/officeart/2005/8/quickstyle/simple1" qsCatId="simple" csTypeId="urn:microsoft.com/office/officeart/2018/5/colors/Iconchunking_neutralbg_accent2_2" csCatId="accent2" phldr="1"/>
-      <dgm:spPr/>
-      <dgm:t>
-        <a:bodyPr/>
-        <a:lstStyle/>
-        <a:p>
-          <a:endParaRPr lang="en-US"/>
-        </a:p>
-      </dgm:t>
-    </dgm:pt>
-    <dgm:pt modelId="{E754A2A0-41CE-428B-9DDC-DCD1FD12D16A}">
-      <dgm:prSet/>
-      <dgm:spPr/>
-      <dgm:t>
-        <a:bodyPr/>
-        <a:lstStyle/>
-        <a:p>
-          <a:pPr>
-            <a:lnSpc>
-              <a:spcPct val="100000"/>
-            </a:lnSpc>
-            <a:defRPr b="1"/>
-          </a:pPr>
-          <a:r>
-            <a:rPr lang="en-US" dirty="0"/>
-            <a:t>Lorem Ipsum</a:t>
-          </a:r>
-        </a:p>
-      </dgm:t>
-    </dgm:pt>
-    <dgm:pt modelId="{BE164097-A5AA-4EA1-9E64-D7FCD4DD2A4E}" type="parTrans" cxnId="{507A74C7-FEAF-4A4C-9250-0613CBC2F127}">
-      <dgm:prSet/>
-      <dgm:spPr/>
-      <dgm:t>
-        <a:bodyPr/>
-        <a:lstStyle/>
-        <a:p>
-          <a:endParaRPr lang="en-US"/>
-        </a:p>
-      </dgm:t>
-    </dgm:pt>
-    <dgm:pt modelId="{02D8D4EF-9694-45C7-AF26-E20371B3C352}" type="sibTrans" cxnId="{507A74C7-FEAF-4A4C-9250-0613CBC2F127}">
-      <dgm:prSet/>
-      <dgm:spPr/>
-      <dgm:t>
-        <a:bodyPr/>
-        <a:lstStyle/>
-        <a:p>
-          <a:endParaRPr lang="en-US"/>
-        </a:p>
-      </dgm:t>
-    </dgm:pt>
-    <dgm:pt modelId="{C2F66EED-74C3-4F36-A1D4-8AFCBB009938}">
-      <dgm:prSet/>
-      <dgm:spPr/>
-      <dgm:t>
-        <a:bodyPr/>
-        <a:lstStyle/>
-        <a:p>
-          <a:pPr>
-            <a:lnSpc>
-              <a:spcPct val="100000"/>
-            </a:lnSpc>
-          </a:pPr>
-          <a:r>
-            <a:rPr lang="en-US" dirty="0"/>
-            <a:t>Dolor Sit Amet</a:t>
-          </a:r>
-        </a:p>
-      </dgm:t>
-    </dgm:pt>
-    <dgm:pt modelId="{5CF5C62A-BD1A-4922-92B6-33ECA44C1F76}" type="parTrans" cxnId="{7A243DB8-C0B8-4718-B558-CE939B8FF03E}">
-      <dgm:prSet/>
-      <dgm:spPr/>
-      <dgm:t>
-        <a:bodyPr/>
-        <a:lstStyle/>
-        <a:p>
-          <a:endParaRPr lang="en-US"/>
-        </a:p>
-      </dgm:t>
-    </dgm:pt>
-    <dgm:pt modelId="{F9BAA161-AAEC-4A41-B4D9-A27EAD80526E}" type="sibTrans" cxnId="{7A243DB8-C0B8-4718-B558-CE939B8FF03E}">
-      <dgm:prSet/>
-      <dgm:spPr/>
-      <dgm:t>
-        <a:bodyPr/>
-        <a:lstStyle/>
-        <a:p>
-          <a:endParaRPr lang="en-US"/>
-        </a:p>
-      </dgm:t>
-    </dgm:pt>
-    <dgm:pt modelId="{DCCE571A-4D30-4294-ABAF-6885F619D2D9}">
-      <dgm:prSet/>
-      <dgm:spPr/>
-      <dgm:t>
-        <a:bodyPr/>
-        <a:lstStyle/>
-        <a:p>
-          <a:pPr>
-            <a:lnSpc>
-              <a:spcPct val="100000"/>
-            </a:lnSpc>
-            <a:defRPr b="1"/>
-          </a:pPr>
-          <a:r>
-            <a:rPr lang="en-US" dirty="0"/>
-            <a:t>Lorem Ipsum</a:t>
-          </a:r>
-        </a:p>
-      </dgm:t>
-    </dgm:pt>
-    <dgm:pt modelId="{3AD83C96-5A95-4337-BF2D-97454AF7F108}" type="parTrans" cxnId="{E70347E4-4461-4B80-8927-4CA0AEBFAAF8}">
-      <dgm:prSet/>
-      <dgm:spPr/>
-      <dgm:t>
-        <a:bodyPr/>
-        <a:lstStyle/>
-        <a:p>
-          <a:endParaRPr lang="en-US"/>
-        </a:p>
-      </dgm:t>
-    </dgm:pt>
-    <dgm:pt modelId="{2C1DF6EC-6090-4926-A556-3D2417B7F2AA}" type="sibTrans" cxnId="{E70347E4-4461-4B80-8927-4CA0AEBFAAF8}">
-      <dgm:prSet/>
-      <dgm:spPr/>
-      <dgm:t>
-        <a:bodyPr/>
-        <a:lstStyle/>
-        <a:p>
-          <a:endParaRPr lang="en-US"/>
-        </a:p>
-      </dgm:t>
-    </dgm:pt>
-    <dgm:pt modelId="{B4C55E9F-B5C0-4AD1-919B-D2D83AC9CD40}">
-      <dgm:prSet/>
-      <dgm:spPr/>
-      <dgm:t>
-        <a:bodyPr/>
-        <a:lstStyle/>
-        <a:p>
-          <a:pPr>
-            <a:lnSpc>
-              <a:spcPct val="100000"/>
-            </a:lnSpc>
-          </a:pPr>
-          <a:r>
-            <a:rPr lang="en-US" dirty="0"/>
-            <a:t>Dolor Sit Amet</a:t>
-          </a:r>
-        </a:p>
-      </dgm:t>
-    </dgm:pt>
-    <dgm:pt modelId="{D1B05DEA-DFE0-4560-B75F-1C2BCB67A7C6}" type="parTrans" cxnId="{B2BEE9D2-644C-400C-8E33-2C4491C5B104}">
-      <dgm:prSet/>
-      <dgm:spPr/>
-      <dgm:t>
-        <a:bodyPr/>
-        <a:lstStyle/>
-        <a:p>
-          <a:endParaRPr lang="en-US"/>
-        </a:p>
-      </dgm:t>
-    </dgm:pt>
-    <dgm:pt modelId="{A6301E27-5ACC-4907-A7C8-B41877235C87}" type="sibTrans" cxnId="{B2BEE9D2-644C-400C-8E33-2C4491C5B104}">
-      <dgm:prSet/>
-      <dgm:spPr/>
-      <dgm:t>
-        <a:bodyPr/>
-        <a:lstStyle/>
-        <a:p>
-          <a:endParaRPr lang="en-US"/>
-        </a:p>
-      </dgm:t>
-    </dgm:pt>
-    <dgm:pt modelId="{1C1B28B7-2609-4BAA-AAAB-5801EDFD334C}">
-      <dgm:prSet/>
-      <dgm:spPr/>
-      <dgm:t>
-        <a:bodyPr/>
-        <a:lstStyle/>
-        <a:p>
-          <a:pPr>
-            <a:lnSpc>
-              <a:spcPct val="100000"/>
-            </a:lnSpc>
-            <a:defRPr b="1"/>
-          </a:pPr>
-          <a:r>
-            <a:rPr lang="en-US" dirty="0"/>
-            <a:t>Lorem Ipsum</a:t>
-          </a:r>
-        </a:p>
-      </dgm:t>
-    </dgm:pt>
-    <dgm:pt modelId="{2BF5F791-D223-44A4-B231-6C3F4B786D08}" type="parTrans" cxnId="{05037335-2E5B-48BE-86A9-5372B1A16299}">
-      <dgm:prSet/>
-      <dgm:spPr/>
-      <dgm:t>
-        <a:bodyPr/>
-        <a:lstStyle/>
-        <a:p>
-          <a:endParaRPr lang="en-US"/>
-        </a:p>
-      </dgm:t>
-    </dgm:pt>
-    <dgm:pt modelId="{A432C086-9156-4D32-A06E-6E237CC66D92}" type="sibTrans" cxnId="{05037335-2E5B-48BE-86A9-5372B1A16299}">
-      <dgm:prSet/>
-      <dgm:spPr/>
-      <dgm:t>
-        <a:bodyPr/>
-        <a:lstStyle/>
-        <a:p>
-          <a:endParaRPr lang="en-US"/>
-        </a:p>
-      </dgm:t>
-    </dgm:pt>
-    <dgm:pt modelId="{28C188E4-A3B1-47AF-802E-B2DED21921BA}">
-      <dgm:prSet/>
-      <dgm:spPr/>
-      <dgm:t>
-        <a:bodyPr/>
-        <a:lstStyle/>
-        <a:p>
-          <a:pPr>
-            <a:lnSpc>
-              <a:spcPct val="100000"/>
-            </a:lnSpc>
-          </a:pPr>
-          <a:r>
-            <a:rPr lang="en-US" dirty="0"/>
-            <a:t>Dolor Sit Amet</a:t>
-          </a:r>
-        </a:p>
-      </dgm:t>
-    </dgm:pt>
-    <dgm:pt modelId="{C89C556F-BA69-4B68-9F7C-1121B26764B0}" type="parTrans" cxnId="{B807BF75-BC86-4A84-AB83-7B8BC68E737C}">
-      <dgm:prSet/>
-      <dgm:spPr/>
-      <dgm:t>
-        <a:bodyPr/>
-        <a:lstStyle/>
-        <a:p>
-          <a:endParaRPr lang="en-US"/>
-        </a:p>
-      </dgm:t>
-    </dgm:pt>
-    <dgm:pt modelId="{7BEFF1EA-4DB5-4BD3-A89B-DF0184626A1A}" type="sibTrans" cxnId="{B807BF75-BC86-4A84-AB83-7B8BC68E737C}">
-      <dgm:prSet/>
-      <dgm:spPr/>
-      <dgm:t>
-        <a:bodyPr/>
-        <a:lstStyle/>
-        <a:p>
-          <a:endParaRPr lang="en-US"/>
-        </a:p>
-      </dgm:t>
-    </dgm:pt>
-    <dgm:pt modelId="{E73E8133-584D-4C45-99EA-6F2691A17A73}">
-      <dgm:prSet/>
-      <dgm:spPr/>
-      <dgm:t>
-        <a:bodyPr/>
-        <a:lstStyle/>
-        <a:p>
-          <a:pPr>
-            <a:lnSpc>
-              <a:spcPct val="100000"/>
-            </a:lnSpc>
-          </a:pPr>
-          <a:r>
-            <a:rPr lang="en-US" dirty="0"/>
-            <a:t>Consectetuer Elit</a:t>
-          </a:r>
-        </a:p>
-      </dgm:t>
-    </dgm:pt>
-    <dgm:pt modelId="{19366B0E-517E-41A1-A871-4D800CF4D2F7}" type="parTrans" cxnId="{CE13601D-E1A5-42B4-9435-EF16045E60FA}">
-      <dgm:prSet/>
-      <dgm:spPr/>
-      <dgm:t>
-        <a:bodyPr/>
-        <a:lstStyle/>
-        <a:p>
-          <a:endParaRPr lang="en-US"/>
-        </a:p>
-      </dgm:t>
-    </dgm:pt>
-    <dgm:pt modelId="{C09243AF-AD07-4CBF-84F7-E2CD9DD2CEF1}" type="sibTrans" cxnId="{CE13601D-E1A5-42B4-9435-EF16045E60FA}">
-      <dgm:prSet/>
-      <dgm:spPr/>
-      <dgm:t>
-        <a:bodyPr/>
-        <a:lstStyle/>
-        <a:p>
-          <a:endParaRPr lang="en-US"/>
-        </a:p>
-      </dgm:t>
-    </dgm:pt>
-    <dgm:pt modelId="{19AE6A50-B2F7-4F98-A456-DF10E94887E7}">
-      <dgm:prSet/>
-      <dgm:spPr/>
-      <dgm:t>
-        <a:bodyPr/>
-        <a:lstStyle/>
-        <a:p>
-          <a:pPr>
-            <a:lnSpc>
-              <a:spcPct val="100000"/>
-            </a:lnSpc>
-          </a:pPr>
-          <a:r>
-            <a:rPr lang="en-US" dirty="0"/>
-            <a:t>Nunc Viverra</a:t>
-          </a:r>
-        </a:p>
-      </dgm:t>
-    </dgm:pt>
-    <dgm:pt modelId="{FCAB35B7-FF11-4E93-9864-F2B9C97274F4}" type="parTrans" cxnId="{F938F5D5-804D-4B23-8281-BE5677075ACA}">
-      <dgm:prSet/>
-      <dgm:spPr/>
-      <dgm:t>
-        <a:bodyPr/>
-        <a:lstStyle/>
-        <a:p>
-          <a:endParaRPr lang="en-US"/>
-        </a:p>
-      </dgm:t>
-    </dgm:pt>
-    <dgm:pt modelId="{F7BDB8CA-0E84-4B27-8BED-5C7340299BE3}" type="sibTrans" cxnId="{F938F5D5-804D-4B23-8281-BE5677075ACA}">
-      <dgm:prSet/>
-      <dgm:spPr/>
-      <dgm:t>
-        <a:bodyPr/>
-        <a:lstStyle/>
-        <a:p>
-          <a:endParaRPr lang="en-US"/>
-        </a:p>
-      </dgm:t>
-    </dgm:pt>
-    <dgm:pt modelId="{6BF509EE-1E1E-4BF7-84F4-158CD8D2DC09}">
-      <dgm:prSet/>
-      <dgm:spPr/>
-      <dgm:t>
-        <a:bodyPr/>
-        <a:lstStyle/>
-        <a:p>
-          <a:pPr>
-            <a:lnSpc>
-              <a:spcPct val="100000"/>
-            </a:lnSpc>
-          </a:pPr>
-          <a:r>
-            <a:rPr lang="en-US" dirty="0"/>
-            <a:t>Consectetuer Elit</a:t>
-          </a:r>
-        </a:p>
-      </dgm:t>
-    </dgm:pt>
-    <dgm:pt modelId="{A66C651E-305C-49C9-A282-1069A4617E85}" type="parTrans" cxnId="{E40A96C6-DC5F-42A1-9307-3B282B7BE6C8}">
-      <dgm:prSet/>
-      <dgm:spPr/>
-      <dgm:t>
-        <a:bodyPr/>
-        <a:lstStyle/>
-        <a:p>
-          <a:endParaRPr lang="en-US"/>
-        </a:p>
-      </dgm:t>
-    </dgm:pt>
-    <dgm:pt modelId="{20224668-7462-4C4B-BD92-AE4512D3930F}" type="sibTrans" cxnId="{E40A96C6-DC5F-42A1-9307-3B282B7BE6C8}">
-      <dgm:prSet/>
-      <dgm:spPr/>
-      <dgm:t>
-        <a:bodyPr/>
-        <a:lstStyle/>
-        <a:p>
-          <a:endParaRPr lang="en-US"/>
-        </a:p>
-      </dgm:t>
-    </dgm:pt>
-    <dgm:pt modelId="{80308036-41FA-49DF-BC56-8BE1223C877B}">
-      <dgm:prSet/>
-      <dgm:spPr/>
-      <dgm:t>
-        <a:bodyPr/>
-        <a:lstStyle/>
-        <a:p>
-          <a:pPr>
-            <a:lnSpc>
-              <a:spcPct val="100000"/>
-            </a:lnSpc>
-          </a:pPr>
-          <a:r>
-            <a:rPr lang="en-US" dirty="0"/>
-            <a:t>Nunc Viverra</a:t>
-          </a:r>
-        </a:p>
-      </dgm:t>
-    </dgm:pt>
-    <dgm:pt modelId="{CB4C8DF6-8671-4F14-9BD6-68E721D7CBE8}" type="parTrans" cxnId="{D1B32484-28F0-428A-9520-8334A2F3F0B1}">
-      <dgm:prSet/>
-      <dgm:spPr/>
-      <dgm:t>
-        <a:bodyPr/>
-        <a:lstStyle/>
-        <a:p>
-          <a:endParaRPr lang="en-US"/>
-        </a:p>
-      </dgm:t>
-    </dgm:pt>
-    <dgm:pt modelId="{1F052CFC-B532-468F-8AAE-C7C381ADE52A}" type="sibTrans" cxnId="{D1B32484-28F0-428A-9520-8334A2F3F0B1}">
-      <dgm:prSet/>
-      <dgm:spPr/>
-      <dgm:t>
-        <a:bodyPr/>
-        <a:lstStyle/>
-        <a:p>
-          <a:endParaRPr lang="en-US"/>
-        </a:p>
-      </dgm:t>
-    </dgm:pt>
-    <dgm:pt modelId="{C1BC2591-8C91-4D2E-838F-26D0C0073985}">
-      <dgm:prSet/>
-      <dgm:spPr/>
-      <dgm:t>
-        <a:bodyPr/>
-        <a:lstStyle/>
-        <a:p>
-          <a:pPr>
-            <a:lnSpc>
-              <a:spcPct val="100000"/>
-            </a:lnSpc>
-          </a:pPr>
-          <a:r>
-            <a:rPr lang="en-US" dirty="0"/>
-            <a:t>Consectetuer Elit</a:t>
-          </a:r>
-        </a:p>
-      </dgm:t>
-    </dgm:pt>
-    <dgm:pt modelId="{7DCA0393-C91B-458E-9602-70CA0004F5AA}" type="parTrans" cxnId="{D20E76FA-21CC-446B-8735-8A5FCDFC9E0E}">
-      <dgm:prSet/>
-      <dgm:spPr/>
-      <dgm:t>
-        <a:bodyPr/>
-        <a:lstStyle/>
-        <a:p>
-          <a:endParaRPr lang="en-US"/>
-        </a:p>
-      </dgm:t>
-    </dgm:pt>
-    <dgm:pt modelId="{472A1DB7-924E-4E35-8E55-E1EE1C624B51}" type="sibTrans" cxnId="{D20E76FA-21CC-446B-8735-8A5FCDFC9E0E}">
-      <dgm:prSet/>
-      <dgm:spPr/>
-      <dgm:t>
-        <a:bodyPr/>
-        <a:lstStyle/>
-        <a:p>
-          <a:endParaRPr lang="en-US"/>
-        </a:p>
-      </dgm:t>
-    </dgm:pt>
-    <dgm:pt modelId="{F74BC01B-5E1E-4ADD-9515-00356B79D176}">
-      <dgm:prSet/>
-      <dgm:spPr/>
-      <dgm:t>
-        <a:bodyPr/>
-        <a:lstStyle/>
-        <a:p>
-          <a:pPr>
-            <a:lnSpc>
-              <a:spcPct val="100000"/>
-            </a:lnSpc>
-          </a:pPr>
-          <a:r>
-            <a:rPr lang="en-US" dirty="0"/>
-            <a:t>Nunc Viverra</a:t>
-          </a:r>
-        </a:p>
-      </dgm:t>
-    </dgm:pt>
-    <dgm:pt modelId="{E80B95A6-581A-4BC4-B523-74C273FD8287}" type="parTrans" cxnId="{8778ABD9-C262-4DF9-8C1E-BF1D063BB5C9}">
-      <dgm:prSet/>
-      <dgm:spPr/>
-      <dgm:t>
-        <a:bodyPr/>
-        <a:lstStyle/>
-        <a:p>
-          <a:endParaRPr lang="en-US"/>
-        </a:p>
-      </dgm:t>
-    </dgm:pt>
-    <dgm:pt modelId="{FD8ABA08-9D28-4DE1-846B-EF07372F5BF8}" type="sibTrans" cxnId="{8778ABD9-C262-4DF9-8C1E-BF1D063BB5C9}">
-      <dgm:prSet/>
-      <dgm:spPr/>
-      <dgm:t>
-        <a:bodyPr/>
-        <a:lstStyle/>
-        <a:p>
-          <a:endParaRPr lang="en-US"/>
-        </a:p>
-      </dgm:t>
-    </dgm:pt>
-    <dgm:pt modelId="{071926C8-9E08-4BE0-A1E4-133B16FF713E}" type="pres">
-      <dgm:prSet presAssocID="{E817CCF5-DA3F-4E5F-BE7C-D8111B2BFEBA}" presName="root" presStyleCnt="0">
-        <dgm:presLayoutVars>
-          <dgm:dir/>
-          <dgm:resizeHandles val="exact"/>
-        </dgm:presLayoutVars>
-      </dgm:prSet>
-      <dgm:spPr/>
-    </dgm:pt>
-    <dgm:pt modelId="{1DA6F9F3-4A7F-42F9-8B77-7BD552F03105}" type="pres">
-      <dgm:prSet presAssocID="{E754A2A0-41CE-428B-9DDC-DCD1FD12D16A}" presName="compNode" presStyleCnt="0"/>
-      <dgm:spPr/>
-    </dgm:pt>
-    <dgm:pt modelId="{AF72813A-2810-4A52-BE92-611D54918694}" type="pres">
-      <dgm:prSet presAssocID="{E754A2A0-41CE-428B-9DDC-DCD1FD12D16A}" presName="iconRect" presStyleLbl="node1" presStyleIdx="0" presStyleCnt="3"/>
-      <dgm:spPr>
-        <a:blipFill>
-          <a:blip xmlns:r="http://schemas.openxmlformats.org/officeDocument/2006/relationships" r:embed="rId1">
-            <a:extLst>
-              <a:ext uri="{28A0092B-C50C-407E-A947-70E740481C1C}">
-                <a14:useLocalDpi xmlns:a14="http://schemas.microsoft.com/office/drawing/2010/main" val="0"/>
-              </a:ext>
-              <a:ext uri="{96DAC541-7B7A-43D3-8B79-37D633B846F1}">
-                <asvg:svgBlip xmlns:asvg="http://schemas.microsoft.com/office/drawing/2016/SVG/main" r:embed="rId2"/>
-              </a:ext>
-            </a:extLst>
-          </a:blip>
-          <a:stretch>
-            <a:fillRect/>
-          </a:stretch>
-        </a:blipFill>
-        <a:ln>
-          <a:noFill/>
-        </a:ln>
-      </dgm:spPr>
-      <dgm:extLst>
-        <a:ext uri="{E40237B7-FDA0-4F09-8148-C483321AD2D9}">
-          <dgm14:cNvPr xmlns:dgm14="http://schemas.microsoft.com/office/drawing/2010/diagram" id="0" name="" descr="Bullseye"/>
-        </a:ext>
-      </dgm:extLst>
-    </dgm:pt>
-    <dgm:pt modelId="{0FF9AC2C-F836-43CA-8259-A20F609F4C83}" type="pres">
-      <dgm:prSet presAssocID="{E754A2A0-41CE-428B-9DDC-DCD1FD12D16A}" presName="iconSpace" presStyleCnt="0"/>
-      <dgm:spPr/>
-    </dgm:pt>
-    <dgm:pt modelId="{DF27DA54-DCB6-45F4-890E-F7DCC5A4BE12}" type="pres">
-      <dgm:prSet presAssocID="{E754A2A0-41CE-428B-9DDC-DCD1FD12D16A}" presName="parTx" presStyleLbl="revTx" presStyleIdx="0" presStyleCnt="6">
-        <dgm:presLayoutVars>
-          <dgm:chMax val="0"/>
-          <dgm:chPref val="0"/>
-        </dgm:presLayoutVars>
-      </dgm:prSet>
-      <dgm:spPr/>
-    </dgm:pt>
-    <dgm:pt modelId="{E3A03C26-8C60-4D73-A4C2-0678A1DD3B31}" type="pres">
-      <dgm:prSet presAssocID="{E754A2A0-41CE-428B-9DDC-DCD1FD12D16A}" presName="txSpace" presStyleCnt="0"/>
-      <dgm:spPr/>
-    </dgm:pt>
-    <dgm:pt modelId="{DD091D0A-5A25-4241-91F3-18D32B0BDD4F}" type="pres">
-      <dgm:prSet presAssocID="{E754A2A0-41CE-428B-9DDC-DCD1FD12D16A}" presName="desTx" presStyleLbl="revTx" presStyleIdx="1" presStyleCnt="6">
-        <dgm:presLayoutVars/>
-      </dgm:prSet>
-      <dgm:spPr/>
-    </dgm:pt>
-    <dgm:pt modelId="{2564C0D4-4875-421D-81DB-70BF6751BBA7}" type="pres">
-      <dgm:prSet presAssocID="{02D8D4EF-9694-45C7-AF26-E20371B3C352}" presName="sibTrans" presStyleCnt="0"/>
-      <dgm:spPr/>
-    </dgm:pt>
-    <dgm:pt modelId="{3076B9F9-EC92-4653-AC03-C71FD5E9A400}" type="pres">
-      <dgm:prSet presAssocID="{DCCE571A-4D30-4294-ABAF-6885F619D2D9}" presName="compNode" presStyleCnt="0"/>
-      <dgm:spPr/>
-    </dgm:pt>
-    <dgm:pt modelId="{210823F6-AC1A-46E3-9D99-A319DF497539}" type="pres">
-      <dgm:prSet presAssocID="{DCCE571A-4D30-4294-ABAF-6885F619D2D9}" presName="iconRect" presStyleLbl="node1" presStyleIdx="1" presStyleCnt="3"/>
-      <dgm:spPr>
-        <a:blipFill>
-          <a:blip xmlns:r="http://schemas.openxmlformats.org/officeDocument/2006/relationships" r:embed="rId3">
-            <a:extLst>
-              <a:ext uri="{28A0092B-C50C-407E-A947-70E740481C1C}">
-                <a14:useLocalDpi xmlns:a14="http://schemas.microsoft.com/office/drawing/2010/main" val="0"/>
-              </a:ext>
-              <a:ext uri="{96DAC541-7B7A-43D3-8B79-37D633B846F1}">
-                <asvg:svgBlip xmlns:asvg="http://schemas.microsoft.com/office/drawing/2016/SVG/main" r:embed="rId4"/>
-              </a:ext>
-            </a:extLst>
-          </a:blip>
-          <a:stretch>
-            <a:fillRect/>
-          </a:stretch>
-        </a:blipFill>
-        <a:ln>
-          <a:noFill/>
-        </a:ln>
-      </dgm:spPr>
-      <dgm:extLst>
-        <a:ext uri="{E40237B7-FDA0-4F09-8148-C483321AD2D9}">
-          <dgm14:cNvPr xmlns:dgm14="http://schemas.microsoft.com/office/drawing/2010/diagram" id="0" name="" descr="Bar chart"/>
-        </a:ext>
-      </dgm:extLst>
-    </dgm:pt>
-    <dgm:pt modelId="{2F262968-0DF4-4BB1-BD25-0ED2829FA45D}" type="pres">
-      <dgm:prSet presAssocID="{DCCE571A-4D30-4294-ABAF-6885F619D2D9}" presName="iconSpace" presStyleCnt="0"/>
-      <dgm:spPr/>
-    </dgm:pt>
-    <dgm:pt modelId="{3C1752BD-6530-4141-80E9-9A0923780DCB}" type="pres">
-      <dgm:prSet presAssocID="{DCCE571A-4D30-4294-ABAF-6885F619D2D9}" presName="parTx" presStyleLbl="revTx" presStyleIdx="2" presStyleCnt="6">
-        <dgm:presLayoutVars>
-          <dgm:chMax val="0"/>
-          <dgm:chPref val="0"/>
-        </dgm:presLayoutVars>
-      </dgm:prSet>
-      <dgm:spPr/>
-    </dgm:pt>
-    <dgm:pt modelId="{C393D316-1AB7-4A24-B8A5-3485F2713F88}" type="pres">
-      <dgm:prSet presAssocID="{DCCE571A-4D30-4294-ABAF-6885F619D2D9}" presName="txSpace" presStyleCnt="0"/>
-      <dgm:spPr/>
-    </dgm:pt>
-    <dgm:pt modelId="{7CD40649-A74C-4AD8-B9D0-2573A1955C91}" type="pres">
-      <dgm:prSet presAssocID="{DCCE571A-4D30-4294-ABAF-6885F619D2D9}" presName="desTx" presStyleLbl="revTx" presStyleIdx="3" presStyleCnt="6">
-        <dgm:presLayoutVars/>
-      </dgm:prSet>
-      <dgm:spPr/>
-    </dgm:pt>
-    <dgm:pt modelId="{9A7327AD-D2A8-4CB1-B3E0-7543B1D84369}" type="pres">
-      <dgm:prSet presAssocID="{2C1DF6EC-6090-4926-A556-3D2417B7F2AA}" presName="sibTrans" presStyleCnt="0"/>
-      <dgm:spPr/>
-    </dgm:pt>
-    <dgm:pt modelId="{13BCBAD6-8F08-4029-90C7-8E8A0D0733DD}" type="pres">
-      <dgm:prSet presAssocID="{1C1B28B7-2609-4BAA-AAAB-5801EDFD334C}" presName="compNode" presStyleCnt="0"/>
-      <dgm:spPr/>
-    </dgm:pt>
-    <dgm:pt modelId="{B0A3ABD2-C471-4A21-8AEF-3843C86919E1}" type="pres">
-      <dgm:prSet presAssocID="{1C1B28B7-2609-4BAA-AAAB-5801EDFD334C}" presName="iconRect" presStyleLbl="node1" presStyleIdx="2" presStyleCnt="3"/>
-      <dgm:spPr>
-        <a:blipFill>
-          <a:blip xmlns:r="http://schemas.openxmlformats.org/officeDocument/2006/relationships" r:embed="rId5">
-            <a:extLst>
-              <a:ext uri="{28A0092B-C50C-407E-A947-70E740481C1C}">
-                <a14:useLocalDpi xmlns:a14="http://schemas.microsoft.com/office/drawing/2010/main" val="0"/>
-              </a:ext>
-              <a:ext uri="{96DAC541-7B7A-43D3-8B79-37D633B846F1}">
-                <asvg:svgBlip xmlns:asvg="http://schemas.microsoft.com/office/drawing/2016/SVG/main" r:embed="rId6"/>
-              </a:ext>
-            </a:extLst>
-          </a:blip>
-          <a:stretch>
-            <a:fillRect/>
-          </a:stretch>
-        </a:blipFill>
-        <a:ln>
-          <a:noFill/>
-        </a:ln>
-      </dgm:spPr>
-      <dgm:extLst>
-        <a:ext uri="{E40237B7-FDA0-4F09-8148-C483321AD2D9}">
-          <dgm14:cNvPr xmlns:dgm14="http://schemas.microsoft.com/office/drawing/2010/diagram" id="0" name="" descr="Checkmark"/>
-        </a:ext>
-      </dgm:extLst>
-    </dgm:pt>
-    <dgm:pt modelId="{C05B68FE-639F-4FA9-A205-D74CFD77C39F}" type="pres">
-      <dgm:prSet presAssocID="{1C1B28B7-2609-4BAA-AAAB-5801EDFD334C}" presName="iconSpace" presStyleCnt="0"/>
-      <dgm:spPr/>
-    </dgm:pt>
-    <dgm:pt modelId="{C4D97C04-1692-4931-9A64-809D862C1739}" type="pres">
-      <dgm:prSet presAssocID="{1C1B28B7-2609-4BAA-AAAB-5801EDFD334C}" presName="parTx" presStyleLbl="revTx" presStyleIdx="4" presStyleCnt="6">
-        <dgm:presLayoutVars>
-          <dgm:chMax val="0"/>
-          <dgm:chPref val="0"/>
-        </dgm:presLayoutVars>
-      </dgm:prSet>
-      <dgm:spPr/>
-    </dgm:pt>
-    <dgm:pt modelId="{62A868A2-37A4-4832-B3F5-E1EA98BA3648}" type="pres">
-      <dgm:prSet presAssocID="{1C1B28B7-2609-4BAA-AAAB-5801EDFD334C}" presName="txSpace" presStyleCnt="0"/>
-      <dgm:spPr/>
-    </dgm:pt>
-    <dgm:pt modelId="{6418EBED-F111-425B-8EE2-06B8B2297A68}" type="pres">
-      <dgm:prSet presAssocID="{1C1B28B7-2609-4BAA-AAAB-5801EDFD334C}" presName="desTx" presStyleLbl="revTx" presStyleIdx="5" presStyleCnt="6">
-        <dgm:presLayoutVars/>
-      </dgm:prSet>
-      <dgm:spPr/>
-    </dgm:pt>
-  </dgm:ptLst>
-  <dgm:cxnLst>
-    <dgm:cxn modelId="{079E1015-BF7E-499A-99C0-BA5607789253}" type="presOf" srcId="{E754A2A0-41CE-428B-9DDC-DCD1FD12D16A}" destId="{DF27DA54-DCB6-45F4-890E-F7DCC5A4BE12}" srcOrd="0" destOrd="0" presId="urn:microsoft.com/office/officeart/2018/5/layout/CenteredIconLabelDescriptionList"/>
-    <dgm:cxn modelId="{CE13601D-E1A5-42B4-9435-EF16045E60FA}" srcId="{E754A2A0-41CE-428B-9DDC-DCD1FD12D16A}" destId="{E73E8133-584D-4C45-99EA-6F2691A17A73}" srcOrd="1" destOrd="0" parTransId="{19366B0E-517E-41A1-A871-4D800CF4D2F7}" sibTransId="{C09243AF-AD07-4CBF-84F7-E2CD9DD2CEF1}"/>
-    <dgm:cxn modelId="{6D4CB933-1DF3-4BC1-A454-546CC5034B5C}" type="presOf" srcId="{C1BC2591-8C91-4D2E-838F-26D0C0073985}" destId="{6418EBED-F111-425B-8EE2-06B8B2297A68}" srcOrd="0" destOrd="1" presId="urn:microsoft.com/office/officeart/2018/5/layout/CenteredIconLabelDescriptionList"/>
-    <dgm:cxn modelId="{05037335-2E5B-48BE-86A9-5372B1A16299}" srcId="{E817CCF5-DA3F-4E5F-BE7C-D8111B2BFEBA}" destId="{1C1B28B7-2609-4BAA-AAAB-5801EDFD334C}" srcOrd="2" destOrd="0" parTransId="{2BF5F791-D223-44A4-B231-6C3F4B786D08}" sibTransId="{A432C086-9156-4D32-A06E-6E237CC66D92}"/>
-    <dgm:cxn modelId="{1CCE1B3A-0A40-44CD-A839-C37BCA6E0D94}" type="presOf" srcId="{B4C55E9F-B5C0-4AD1-919B-D2D83AC9CD40}" destId="{7CD40649-A74C-4AD8-B9D0-2573A1955C91}" srcOrd="0" destOrd="0" presId="urn:microsoft.com/office/officeart/2018/5/layout/CenteredIconLabelDescriptionList"/>
-    <dgm:cxn modelId="{C5FF5745-4781-44B9-BC29-74DCE41C1172}" type="presOf" srcId="{DCCE571A-4D30-4294-ABAF-6885F619D2D9}" destId="{3C1752BD-6530-4141-80E9-9A0923780DCB}" srcOrd="0" destOrd="0" presId="urn:microsoft.com/office/officeart/2018/5/layout/CenteredIconLabelDescriptionList"/>
-    <dgm:cxn modelId="{6F7E1B4A-66A4-466F-97C5-ED0892509BF2}" type="presOf" srcId="{28C188E4-A3B1-47AF-802E-B2DED21921BA}" destId="{6418EBED-F111-425B-8EE2-06B8B2297A68}" srcOrd="0" destOrd="0" presId="urn:microsoft.com/office/officeart/2018/5/layout/CenteredIconLabelDescriptionList"/>
-    <dgm:cxn modelId="{31236A4C-17B7-4AD6-A6DF-D5505A7B3830}" type="presOf" srcId="{19AE6A50-B2F7-4F98-A456-DF10E94887E7}" destId="{DD091D0A-5A25-4241-91F3-18D32B0BDD4F}" srcOrd="0" destOrd="2" presId="urn:microsoft.com/office/officeart/2018/5/layout/CenteredIconLabelDescriptionList"/>
-    <dgm:cxn modelId="{E3ED426D-0ED9-435E-9A9A-1B437DA49D3E}" type="presOf" srcId="{80308036-41FA-49DF-BC56-8BE1223C877B}" destId="{7CD40649-A74C-4AD8-B9D0-2573A1955C91}" srcOrd="0" destOrd="2" presId="urn:microsoft.com/office/officeart/2018/5/layout/CenteredIconLabelDescriptionList"/>
-    <dgm:cxn modelId="{B807BF75-BC86-4A84-AB83-7B8BC68E737C}" srcId="{1C1B28B7-2609-4BAA-AAAB-5801EDFD334C}" destId="{28C188E4-A3B1-47AF-802E-B2DED21921BA}" srcOrd="0" destOrd="0" parTransId="{C89C556F-BA69-4B68-9F7C-1121B26764B0}" sibTransId="{7BEFF1EA-4DB5-4BD3-A89B-DF0184626A1A}"/>
-    <dgm:cxn modelId="{BE03A87C-50F2-49E6-B8EB-2219D8A5E4BF}" type="presOf" srcId="{E73E8133-584D-4C45-99EA-6F2691A17A73}" destId="{DD091D0A-5A25-4241-91F3-18D32B0BDD4F}" srcOrd="0" destOrd="1" presId="urn:microsoft.com/office/officeart/2018/5/layout/CenteredIconLabelDescriptionList"/>
-    <dgm:cxn modelId="{9C9F8283-EF4B-46ED-B123-7152942A1C38}" type="presOf" srcId="{F74BC01B-5E1E-4ADD-9515-00356B79D176}" destId="{6418EBED-F111-425B-8EE2-06B8B2297A68}" srcOrd="0" destOrd="2" presId="urn:microsoft.com/office/officeart/2018/5/layout/CenteredIconLabelDescriptionList"/>
-    <dgm:cxn modelId="{D1B32484-28F0-428A-9520-8334A2F3F0B1}" srcId="{DCCE571A-4D30-4294-ABAF-6885F619D2D9}" destId="{80308036-41FA-49DF-BC56-8BE1223C877B}" srcOrd="2" destOrd="0" parTransId="{CB4C8DF6-8671-4F14-9BD6-68E721D7CBE8}" sibTransId="{1F052CFC-B532-468F-8AAE-C7C381ADE52A}"/>
-    <dgm:cxn modelId="{4D6131AC-1805-4438-A39D-4F587C933D11}" type="presOf" srcId="{E817CCF5-DA3F-4E5F-BE7C-D8111B2BFEBA}" destId="{071926C8-9E08-4BE0-A1E4-133B16FF713E}" srcOrd="0" destOrd="0" presId="urn:microsoft.com/office/officeart/2018/5/layout/CenteredIconLabelDescriptionList"/>
-    <dgm:cxn modelId="{7A243DB8-C0B8-4718-B558-CE939B8FF03E}" srcId="{E754A2A0-41CE-428B-9DDC-DCD1FD12D16A}" destId="{C2F66EED-74C3-4F36-A1D4-8AFCBB009938}" srcOrd="0" destOrd="0" parTransId="{5CF5C62A-BD1A-4922-92B6-33ECA44C1F76}" sibTransId="{F9BAA161-AAEC-4A41-B4D9-A27EAD80526E}"/>
-    <dgm:cxn modelId="{E40A96C6-DC5F-42A1-9307-3B282B7BE6C8}" srcId="{DCCE571A-4D30-4294-ABAF-6885F619D2D9}" destId="{6BF509EE-1E1E-4BF7-84F4-158CD8D2DC09}" srcOrd="1" destOrd="0" parTransId="{A66C651E-305C-49C9-A282-1069A4617E85}" sibTransId="{20224668-7462-4C4B-BD92-AE4512D3930F}"/>
-    <dgm:cxn modelId="{507A74C7-FEAF-4A4C-9250-0613CBC2F127}" srcId="{E817CCF5-DA3F-4E5F-BE7C-D8111B2BFEBA}" destId="{E754A2A0-41CE-428B-9DDC-DCD1FD12D16A}" srcOrd="0" destOrd="0" parTransId="{BE164097-A5AA-4EA1-9E64-D7FCD4DD2A4E}" sibTransId="{02D8D4EF-9694-45C7-AF26-E20371B3C352}"/>
-    <dgm:cxn modelId="{B51342D1-507F-4538-B2E7-CC8612277523}" type="presOf" srcId="{1C1B28B7-2609-4BAA-AAAB-5801EDFD334C}" destId="{C4D97C04-1692-4931-9A64-809D862C1739}" srcOrd="0" destOrd="0" presId="urn:microsoft.com/office/officeart/2018/5/layout/CenteredIconLabelDescriptionList"/>
-    <dgm:cxn modelId="{B2BEE9D2-644C-400C-8E33-2C4491C5B104}" srcId="{DCCE571A-4D30-4294-ABAF-6885F619D2D9}" destId="{B4C55E9F-B5C0-4AD1-919B-D2D83AC9CD40}" srcOrd="0" destOrd="0" parTransId="{D1B05DEA-DFE0-4560-B75F-1C2BCB67A7C6}" sibTransId="{A6301E27-5ACC-4907-A7C8-B41877235C87}"/>
-    <dgm:cxn modelId="{F938F5D5-804D-4B23-8281-BE5677075ACA}" srcId="{E754A2A0-41CE-428B-9DDC-DCD1FD12D16A}" destId="{19AE6A50-B2F7-4F98-A456-DF10E94887E7}" srcOrd="2" destOrd="0" parTransId="{FCAB35B7-FF11-4E93-9864-F2B9C97274F4}" sibTransId="{F7BDB8CA-0E84-4B27-8BED-5C7340299BE3}"/>
-    <dgm:cxn modelId="{8778ABD9-C262-4DF9-8C1E-BF1D063BB5C9}" srcId="{1C1B28B7-2609-4BAA-AAAB-5801EDFD334C}" destId="{F74BC01B-5E1E-4ADD-9515-00356B79D176}" srcOrd="2" destOrd="0" parTransId="{E80B95A6-581A-4BC4-B523-74C273FD8287}" sibTransId="{FD8ABA08-9D28-4DE1-846B-EF07372F5BF8}"/>
-    <dgm:cxn modelId="{E70347E4-4461-4B80-8927-4CA0AEBFAAF8}" srcId="{E817CCF5-DA3F-4E5F-BE7C-D8111B2BFEBA}" destId="{DCCE571A-4D30-4294-ABAF-6885F619D2D9}" srcOrd="1" destOrd="0" parTransId="{3AD83C96-5A95-4337-BF2D-97454AF7F108}" sibTransId="{2C1DF6EC-6090-4926-A556-3D2417B7F2AA}"/>
-    <dgm:cxn modelId="{3DA7E7F0-5057-42E1-BFDF-4C763F4C13E6}" type="presOf" srcId="{6BF509EE-1E1E-4BF7-84F4-158CD8D2DC09}" destId="{7CD40649-A74C-4AD8-B9D0-2573A1955C91}" srcOrd="0" destOrd="1" presId="urn:microsoft.com/office/officeart/2018/5/layout/CenteredIconLabelDescriptionList"/>
-    <dgm:cxn modelId="{55A931F7-B2A3-4173-A574-A80CB726BAE2}" type="presOf" srcId="{C2F66EED-74C3-4F36-A1D4-8AFCBB009938}" destId="{DD091D0A-5A25-4241-91F3-18D32B0BDD4F}" srcOrd="0" destOrd="0" presId="urn:microsoft.com/office/officeart/2018/5/layout/CenteredIconLabelDescriptionList"/>
-    <dgm:cxn modelId="{D20E76FA-21CC-446B-8735-8A5FCDFC9E0E}" srcId="{1C1B28B7-2609-4BAA-AAAB-5801EDFD334C}" destId="{C1BC2591-8C91-4D2E-838F-26D0C0073985}" srcOrd="1" destOrd="0" parTransId="{7DCA0393-C91B-458E-9602-70CA0004F5AA}" sibTransId="{472A1DB7-924E-4E35-8E55-E1EE1C624B51}"/>
-    <dgm:cxn modelId="{87DD2528-CB43-4F2F-AD70-34B2C76F4974}" type="presParOf" srcId="{071926C8-9E08-4BE0-A1E4-133B16FF713E}" destId="{1DA6F9F3-4A7F-42F9-8B77-7BD552F03105}" srcOrd="0" destOrd="0" presId="urn:microsoft.com/office/officeart/2018/5/layout/CenteredIconLabelDescriptionList"/>
-    <dgm:cxn modelId="{C7D85599-D34F-41B3-ACEB-0C058EB1F61E}" type="presParOf" srcId="{1DA6F9F3-4A7F-42F9-8B77-7BD552F03105}" destId="{AF72813A-2810-4A52-BE92-611D54918694}" srcOrd="0" destOrd="0" presId="urn:microsoft.com/office/officeart/2018/5/layout/CenteredIconLabelDescriptionList"/>
-    <dgm:cxn modelId="{C48669E0-1E6E-4350-9DF8-08B6FB55FE83}" type="presParOf" srcId="{1DA6F9F3-4A7F-42F9-8B77-7BD552F03105}" destId="{0FF9AC2C-F836-43CA-8259-A20F609F4C83}" srcOrd="1" destOrd="0" presId="urn:microsoft.com/office/officeart/2018/5/layout/CenteredIconLabelDescriptionList"/>
-    <dgm:cxn modelId="{99FB1C93-FBB0-428C-B3D1-D2EC3308D436}" type="presParOf" srcId="{1DA6F9F3-4A7F-42F9-8B77-7BD552F03105}" destId="{DF27DA54-DCB6-45F4-890E-F7DCC5A4BE12}" srcOrd="2" destOrd="0" presId="urn:microsoft.com/office/officeart/2018/5/layout/CenteredIconLabelDescriptionList"/>
-    <dgm:cxn modelId="{D2C113FF-430C-42FA-B64E-13ACE978DEE7}" type="presParOf" srcId="{1DA6F9F3-4A7F-42F9-8B77-7BD552F03105}" destId="{E3A03C26-8C60-4D73-A4C2-0678A1DD3B31}" srcOrd="3" destOrd="0" presId="urn:microsoft.com/office/officeart/2018/5/layout/CenteredIconLabelDescriptionList"/>
-    <dgm:cxn modelId="{C10D59DD-0D52-4682-AC9F-5873A75B6FEF}" type="presParOf" srcId="{1DA6F9F3-4A7F-42F9-8B77-7BD552F03105}" destId="{DD091D0A-5A25-4241-91F3-18D32B0BDD4F}" srcOrd="4" destOrd="0" presId="urn:microsoft.com/office/officeart/2018/5/layout/CenteredIconLabelDescriptionList"/>
-    <dgm:cxn modelId="{0510082E-5DF2-42DD-AE6C-D1E60730D4E3}" type="presParOf" srcId="{071926C8-9E08-4BE0-A1E4-133B16FF713E}" destId="{2564C0D4-4875-421D-81DB-70BF6751BBA7}" srcOrd="1" destOrd="0" presId="urn:microsoft.com/office/officeart/2018/5/layout/CenteredIconLabelDescriptionList"/>
-    <dgm:cxn modelId="{E144C32E-E72B-4991-B9EC-93820D68CFB5}" type="presParOf" srcId="{071926C8-9E08-4BE0-A1E4-133B16FF713E}" destId="{3076B9F9-EC92-4653-AC03-C71FD5E9A400}" srcOrd="2" destOrd="0" presId="urn:microsoft.com/office/officeart/2018/5/layout/CenteredIconLabelDescriptionList"/>
-    <dgm:cxn modelId="{66AB50A5-3D6E-4CE8-9C00-3540BF3A682A}" type="presParOf" srcId="{3076B9F9-EC92-4653-AC03-C71FD5E9A400}" destId="{210823F6-AC1A-46E3-9D99-A319DF497539}" srcOrd="0" destOrd="0" presId="urn:microsoft.com/office/officeart/2018/5/layout/CenteredIconLabelDescriptionList"/>
-    <dgm:cxn modelId="{BB0A9168-4CEF-4C37-AA4F-28A0F96C5AAE}" type="presParOf" srcId="{3076B9F9-EC92-4653-AC03-C71FD5E9A400}" destId="{2F262968-0DF4-4BB1-BD25-0ED2829FA45D}" srcOrd="1" destOrd="0" presId="urn:microsoft.com/office/officeart/2018/5/layout/CenteredIconLabelDescriptionList"/>
-    <dgm:cxn modelId="{05D1054F-4CFA-4960-9C76-474461246A75}" type="presParOf" srcId="{3076B9F9-EC92-4653-AC03-C71FD5E9A400}" destId="{3C1752BD-6530-4141-80E9-9A0923780DCB}" srcOrd="2" destOrd="0" presId="urn:microsoft.com/office/officeart/2018/5/layout/CenteredIconLabelDescriptionList"/>
-    <dgm:cxn modelId="{021DA957-19C0-48AF-82E6-5EF64E6E4350}" type="presParOf" srcId="{3076B9F9-EC92-4653-AC03-C71FD5E9A400}" destId="{C393D316-1AB7-4A24-B8A5-3485F2713F88}" srcOrd="3" destOrd="0" presId="urn:microsoft.com/office/officeart/2018/5/layout/CenteredIconLabelDescriptionList"/>
-    <dgm:cxn modelId="{E4E1ED22-2207-49AD-89BF-A68B1DCF8B24}" type="presParOf" srcId="{3076B9F9-EC92-4653-AC03-C71FD5E9A400}" destId="{7CD40649-A74C-4AD8-B9D0-2573A1955C91}" srcOrd="4" destOrd="0" presId="urn:microsoft.com/office/officeart/2018/5/layout/CenteredIconLabelDescriptionList"/>
-    <dgm:cxn modelId="{E12208AE-A278-4C0F-9A95-B2A9F1FA788C}" type="presParOf" srcId="{071926C8-9E08-4BE0-A1E4-133B16FF713E}" destId="{9A7327AD-D2A8-4CB1-B3E0-7543B1D84369}" srcOrd="3" destOrd="0" presId="urn:microsoft.com/office/officeart/2018/5/layout/CenteredIconLabelDescriptionList"/>
-    <dgm:cxn modelId="{04AF0028-0607-4319-870D-38F76BAD13CF}" type="presParOf" srcId="{071926C8-9E08-4BE0-A1E4-133B16FF713E}" destId="{13BCBAD6-8F08-4029-90C7-8E8A0D0733DD}" srcOrd="4" destOrd="0" presId="urn:microsoft.com/office/officeart/2018/5/layout/CenteredIconLabelDescriptionList"/>
-    <dgm:cxn modelId="{6A4CD51F-23AC-49BF-A6C9-263678EFDC1A}" type="presParOf" srcId="{13BCBAD6-8F08-4029-90C7-8E8A0D0733DD}" destId="{B0A3ABD2-C471-4A21-8AEF-3843C86919E1}" srcOrd="0" destOrd="0" presId="urn:microsoft.com/office/officeart/2018/5/layout/CenteredIconLabelDescriptionList"/>
-    <dgm:cxn modelId="{09B630B3-6E33-4A75-A9D0-DB0F7EABE59A}" type="presParOf" srcId="{13BCBAD6-8F08-4029-90C7-8E8A0D0733DD}" destId="{C05B68FE-639F-4FA9-A205-D74CFD77C39F}" srcOrd="1" destOrd="0" presId="urn:microsoft.com/office/officeart/2018/5/layout/CenteredIconLabelDescriptionList"/>
-    <dgm:cxn modelId="{54C79EE1-3818-4202-8586-5211607DA0B9}" type="presParOf" srcId="{13BCBAD6-8F08-4029-90C7-8E8A0D0733DD}" destId="{C4D97C04-1692-4931-9A64-809D862C1739}" srcOrd="2" destOrd="0" presId="urn:microsoft.com/office/officeart/2018/5/layout/CenteredIconLabelDescriptionList"/>
-    <dgm:cxn modelId="{18E2766E-C663-4DEC-B900-6C8AE4D2800E}" type="presParOf" srcId="{13BCBAD6-8F08-4029-90C7-8E8A0D0733DD}" destId="{62A868A2-37A4-4832-B3F5-E1EA98BA3648}" srcOrd="3" destOrd="0" presId="urn:microsoft.com/office/officeart/2018/5/layout/CenteredIconLabelDescriptionList"/>
-    <dgm:cxn modelId="{9E5F65AC-D550-43B1-ABB5-AF4466613C81}" type="presParOf" srcId="{13BCBAD6-8F08-4029-90C7-8E8A0D0733DD}" destId="{6418EBED-F111-425B-8EE2-06B8B2297A68}" srcOrd="4" destOrd="0" presId="urn:microsoft.com/office/officeart/2018/5/layout/CenteredIconLabelDescriptionList"/>
-  </dgm:cxnLst>
-  <dgm:bg/>
-  <dgm:whole/>
-  <dgm:extLst>
-    <a:ext uri="http://schemas.microsoft.com/office/drawing/2008/diagram">
-      <dsp:dataModelExt xmlns:dsp="http://schemas.microsoft.com/office/drawing/2008/diagram" relId="rId7" minVer="http://schemas.openxmlformats.org/drawingml/2006/diagram"/>
-    </a:ext>
-  </dgm:extLst>
-</dgm:dataModel>
-</file>
-
-<file path=ppt/diagrams/drawing1.xml><?xml version="1.0" encoding="utf-8"?>
-<dsp:drawing xmlns:dgm="http://schemas.openxmlformats.org/drawingml/2006/diagram" xmlns:dsp="http://schemas.microsoft.com/office/drawing/2008/diagram" xmlns:a="http://schemas.openxmlformats.org/drawingml/2006/main">
-  <dsp:spTree>
-    <dsp:nvGrpSpPr>
-      <dsp:cNvPr id="0" name=""/>
-      <dsp:cNvGrpSpPr/>
-    </dsp:nvGrpSpPr>
-    <dsp:grpSpPr/>
-    <dsp:sp modelId="{AF72813A-2810-4A52-BE92-611D54918694}">
-      <dsp:nvSpPr>
-        <dsp:cNvPr id="0" name=""/>
-        <dsp:cNvSpPr/>
-      </dsp:nvSpPr>
-      <dsp:spPr>
-        <a:xfrm>
-          <a:off x="1007868" y="510596"/>
-          <a:ext cx="1080843" cy="1080843"/>
-        </a:xfrm>
-        <a:prstGeom prst="rect">
-          <a:avLst/>
-        </a:prstGeom>
-        <a:blipFill>
-          <a:blip xmlns:r="http://schemas.openxmlformats.org/officeDocument/2006/relationships" r:embed="rId1">
-            <a:extLst>
-              <a:ext uri="{28A0092B-C50C-407E-A947-70E740481C1C}">
-                <a14:useLocalDpi xmlns:a14="http://schemas.microsoft.com/office/drawing/2010/main" val="0"/>
-              </a:ext>
-              <a:ext uri="{96DAC541-7B7A-43D3-8B79-37D633B846F1}">
-                <asvg:svgBlip xmlns:asvg="http://schemas.microsoft.com/office/drawing/2016/SVG/main" r:embed="rId2"/>
-              </a:ext>
-            </a:extLst>
-          </a:blip>
-          <a:stretch>
-            <a:fillRect/>
-          </a:stretch>
-        </a:blipFill>
-        <a:ln w="15875" cap="rnd" cmpd="sng" algn="ctr">
-          <a:noFill/>
-          <a:prstDash val="solid"/>
-        </a:ln>
-        <a:effectLst/>
-      </dsp:spPr>
-      <dsp:style>
-        <a:lnRef idx="2">
-          <a:scrgbClr r="0" g="0" b="0"/>
-        </a:lnRef>
-        <a:fillRef idx="1">
-          <a:scrgbClr r="0" g="0" b="0"/>
-        </a:fillRef>
-        <a:effectRef idx="0">
-          <a:scrgbClr r="0" g="0" b="0"/>
-        </a:effectRef>
-        <a:fontRef idx="minor">
-          <a:schemeClr val="lt1"/>
-        </a:fontRef>
-      </dsp:style>
-    </dsp:sp>
-    <dsp:sp modelId="{DF27DA54-DCB6-45F4-890E-F7DCC5A4BE12}">
-      <dsp:nvSpPr>
-        <dsp:cNvPr id="0" name=""/>
-        <dsp:cNvSpPr/>
-      </dsp:nvSpPr>
-      <dsp:spPr>
-        <a:xfrm>
-          <a:off x="4228" y="1707263"/>
-          <a:ext cx="3088125" cy="463218"/>
-        </a:xfrm>
-        <a:prstGeom prst="rect">
-          <a:avLst/>
-        </a:prstGeom>
-        <a:noFill/>
-        <a:ln>
-          <a:noFill/>
-        </a:ln>
-        <a:effectLst/>
-      </dsp:spPr>
-      <dsp:style>
-        <a:lnRef idx="0">
-          <a:scrgbClr r="0" g="0" b="0"/>
-        </a:lnRef>
-        <a:fillRef idx="0">
-          <a:scrgbClr r="0" g="0" b="0"/>
-        </a:fillRef>
-        <a:effectRef idx="0">
-          <a:scrgbClr r="0" g="0" b="0"/>
-        </a:effectRef>
-        <a:fontRef idx="minor"/>
-      </dsp:style>
-      <dsp:txBody>
-        <a:bodyPr spcFirstLastPara="0" vert="horz" wrap="square" lIns="0" tIns="0" rIns="0" bIns="0" numCol="1" spcCol="1270" anchor="t" anchorCtr="0">
-          <a:noAutofit/>
-        </a:bodyPr>
-        <a:lstStyle/>
-        <a:p>
-          <a:pPr marL="0" lvl="0" indent="0" algn="ctr" defTabSz="1333500">
-            <a:lnSpc>
-              <a:spcPct val="100000"/>
-            </a:lnSpc>
-            <a:spcBef>
-              <a:spcPct val="0"/>
-            </a:spcBef>
-            <a:spcAft>
-              <a:spcPct val="35000"/>
-            </a:spcAft>
-            <a:buNone/>
-            <a:defRPr b="1"/>
-          </a:pPr>
-          <a:r>
-            <a:rPr lang="en-US" sz="3000" kern="1200" dirty="0"/>
-            <a:t>Lorem Ipsum</a:t>
-          </a:r>
-        </a:p>
-      </dsp:txBody>
-      <dsp:txXfrm>
-        <a:off x="4228" y="1707263"/>
-        <a:ext cx="3088125" cy="463218"/>
-      </dsp:txXfrm>
-    </dsp:sp>
-    <dsp:sp modelId="{DD091D0A-5A25-4241-91F3-18D32B0BDD4F}">
-      <dsp:nvSpPr>
-        <dsp:cNvPr id="0" name=""/>
-        <dsp:cNvSpPr/>
-      </dsp:nvSpPr>
-      <dsp:spPr>
-        <a:xfrm>
-          <a:off x="4228" y="2224353"/>
-          <a:ext cx="3088125" cy="979799"/>
-        </a:xfrm>
-        <a:prstGeom prst="rect">
-          <a:avLst/>
-        </a:prstGeom>
-        <a:noFill/>
-        <a:ln>
-          <a:noFill/>
-        </a:ln>
-        <a:effectLst/>
-      </dsp:spPr>
-      <dsp:style>
-        <a:lnRef idx="0">
-          <a:scrgbClr r="0" g="0" b="0"/>
-        </a:lnRef>
-        <a:fillRef idx="0">
-          <a:scrgbClr r="0" g="0" b="0"/>
-        </a:fillRef>
-        <a:effectRef idx="0">
-          <a:scrgbClr r="0" g="0" b="0"/>
-        </a:effectRef>
-        <a:fontRef idx="minor"/>
-      </dsp:style>
-      <dsp:txBody>
-        <a:bodyPr spcFirstLastPara="0" vert="horz" wrap="square" lIns="0" tIns="0" rIns="0" bIns="0" numCol="1" spcCol="1270" anchor="t" anchorCtr="0">
-          <a:noAutofit/>
-        </a:bodyPr>
-        <a:lstStyle/>
-        <a:p>
-          <a:pPr marL="0" lvl="0" indent="0" algn="ctr" defTabSz="755650">
-            <a:lnSpc>
-              <a:spcPct val="100000"/>
-            </a:lnSpc>
-            <a:spcBef>
-              <a:spcPct val="0"/>
-            </a:spcBef>
-            <a:spcAft>
-              <a:spcPct val="35000"/>
-            </a:spcAft>
-            <a:buNone/>
-          </a:pPr>
-          <a:r>
-            <a:rPr lang="en-US" sz="1700" kern="1200" dirty="0"/>
-            <a:t>Dolor Sit Amet</a:t>
-          </a:r>
-        </a:p>
-        <a:p>
-          <a:pPr marL="0" lvl="0" indent="0" algn="ctr" defTabSz="755650">
-            <a:lnSpc>
-              <a:spcPct val="100000"/>
-            </a:lnSpc>
-            <a:spcBef>
-              <a:spcPct val="0"/>
-            </a:spcBef>
-            <a:spcAft>
-              <a:spcPct val="35000"/>
-            </a:spcAft>
-            <a:buNone/>
-          </a:pPr>
-          <a:r>
-            <a:rPr lang="en-US" sz="1700" kern="1200" dirty="0"/>
-            <a:t>Consectetuer Elit</a:t>
-          </a:r>
-        </a:p>
-        <a:p>
-          <a:pPr marL="0" lvl="0" indent="0" algn="ctr" defTabSz="755650">
-            <a:lnSpc>
-              <a:spcPct val="100000"/>
-            </a:lnSpc>
-            <a:spcBef>
-              <a:spcPct val="0"/>
-            </a:spcBef>
-            <a:spcAft>
-              <a:spcPct val="35000"/>
-            </a:spcAft>
-            <a:buNone/>
-          </a:pPr>
-          <a:r>
-            <a:rPr lang="en-US" sz="1700" kern="1200" dirty="0"/>
-            <a:t>Nunc Viverra</a:t>
-          </a:r>
-        </a:p>
-      </dsp:txBody>
-      <dsp:txXfrm>
-        <a:off x="4228" y="2224353"/>
-        <a:ext cx="3088125" cy="979799"/>
-      </dsp:txXfrm>
-    </dsp:sp>
-    <dsp:sp modelId="{210823F6-AC1A-46E3-9D99-A319DF497539}">
-      <dsp:nvSpPr>
-        <dsp:cNvPr id="0" name=""/>
-        <dsp:cNvSpPr/>
-      </dsp:nvSpPr>
-      <dsp:spPr>
-        <a:xfrm>
-          <a:off x="4636415" y="510596"/>
-          <a:ext cx="1080843" cy="1080843"/>
-        </a:xfrm>
-        <a:prstGeom prst="rect">
-          <a:avLst/>
-        </a:prstGeom>
-        <a:blipFill>
-          <a:blip xmlns:r="http://schemas.openxmlformats.org/officeDocument/2006/relationships" r:embed="rId3">
-            <a:extLst>
-              <a:ext uri="{28A0092B-C50C-407E-A947-70E740481C1C}">
-                <a14:useLocalDpi xmlns:a14="http://schemas.microsoft.com/office/drawing/2010/main" val="0"/>
-              </a:ext>
-              <a:ext uri="{96DAC541-7B7A-43D3-8B79-37D633B846F1}">
-                <asvg:svgBlip xmlns:asvg="http://schemas.microsoft.com/office/drawing/2016/SVG/main" r:embed="rId4"/>
-              </a:ext>
-            </a:extLst>
-          </a:blip>
-          <a:stretch>
-            <a:fillRect/>
-          </a:stretch>
-        </a:blipFill>
-        <a:ln w="15875" cap="rnd" cmpd="sng" algn="ctr">
-          <a:noFill/>
-          <a:prstDash val="solid"/>
-        </a:ln>
-        <a:effectLst/>
-      </dsp:spPr>
-      <dsp:style>
-        <a:lnRef idx="2">
-          <a:scrgbClr r="0" g="0" b="0"/>
-        </a:lnRef>
-        <a:fillRef idx="1">
-          <a:scrgbClr r="0" g="0" b="0"/>
-        </a:fillRef>
-        <a:effectRef idx="0">
-          <a:scrgbClr r="0" g="0" b="0"/>
-        </a:effectRef>
-        <a:fontRef idx="minor">
-          <a:schemeClr val="lt1"/>
-        </a:fontRef>
-      </dsp:style>
-    </dsp:sp>
-    <dsp:sp modelId="{3C1752BD-6530-4141-80E9-9A0923780DCB}">
-      <dsp:nvSpPr>
-        <dsp:cNvPr id="0" name=""/>
-        <dsp:cNvSpPr/>
-      </dsp:nvSpPr>
-      <dsp:spPr>
-        <a:xfrm>
-          <a:off x="3632774" y="1707263"/>
-          <a:ext cx="3088125" cy="463218"/>
-        </a:xfrm>
-        <a:prstGeom prst="rect">
-          <a:avLst/>
-        </a:prstGeom>
-        <a:noFill/>
-        <a:ln>
-          <a:noFill/>
-        </a:ln>
-        <a:effectLst/>
-      </dsp:spPr>
-      <dsp:style>
-        <a:lnRef idx="0">
-          <a:scrgbClr r="0" g="0" b="0"/>
-        </a:lnRef>
-        <a:fillRef idx="0">
-          <a:scrgbClr r="0" g="0" b="0"/>
-        </a:fillRef>
-        <a:effectRef idx="0">
-          <a:scrgbClr r="0" g="0" b="0"/>
-        </a:effectRef>
-        <a:fontRef idx="minor"/>
-      </dsp:style>
-      <dsp:txBody>
-        <a:bodyPr spcFirstLastPara="0" vert="horz" wrap="square" lIns="0" tIns="0" rIns="0" bIns="0" numCol="1" spcCol="1270" anchor="t" anchorCtr="0">
-          <a:noAutofit/>
-        </a:bodyPr>
-        <a:lstStyle/>
-        <a:p>
-          <a:pPr marL="0" lvl="0" indent="0" algn="ctr" defTabSz="1333500">
-            <a:lnSpc>
-              <a:spcPct val="100000"/>
-            </a:lnSpc>
-            <a:spcBef>
-              <a:spcPct val="0"/>
-            </a:spcBef>
-            <a:spcAft>
-              <a:spcPct val="35000"/>
-            </a:spcAft>
-            <a:buNone/>
-            <a:defRPr b="1"/>
-          </a:pPr>
-          <a:r>
-            <a:rPr lang="en-US" sz="3000" kern="1200" dirty="0"/>
-            <a:t>Lorem Ipsum</a:t>
-          </a:r>
-        </a:p>
-      </dsp:txBody>
-      <dsp:txXfrm>
-        <a:off x="3632774" y="1707263"/>
-        <a:ext cx="3088125" cy="463218"/>
-      </dsp:txXfrm>
-    </dsp:sp>
-    <dsp:sp modelId="{7CD40649-A74C-4AD8-B9D0-2573A1955C91}">
-      <dsp:nvSpPr>
-        <dsp:cNvPr id="0" name=""/>
-        <dsp:cNvSpPr/>
-      </dsp:nvSpPr>
-      <dsp:spPr>
-        <a:xfrm>
-          <a:off x="3632774" y="2224353"/>
-          <a:ext cx="3088125" cy="979799"/>
-        </a:xfrm>
-        <a:prstGeom prst="rect">
-          <a:avLst/>
-        </a:prstGeom>
-        <a:noFill/>
-        <a:ln>
-          <a:noFill/>
-        </a:ln>
-        <a:effectLst/>
-      </dsp:spPr>
-      <dsp:style>
-        <a:lnRef idx="0">
-          <a:scrgbClr r="0" g="0" b="0"/>
-        </a:lnRef>
-        <a:fillRef idx="0">
-          <a:scrgbClr r="0" g="0" b="0"/>
-        </a:fillRef>
-        <a:effectRef idx="0">
-          <a:scrgbClr r="0" g="0" b="0"/>
-        </a:effectRef>
-        <a:fontRef idx="minor"/>
-      </dsp:style>
-      <dsp:txBody>
-        <a:bodyPr spcFirstLastPara="0" vert="horz" wrap="square" lIns="0" tIns="0" rIns="0" bIns="0" numCol="1" spcCol="1270" anchor="t" anchorCtr="0">
-          <a:noAutofit/>
-        </a:bodyPr>
-        <a:lstStyle/>
-        <a:p>
-          <a:pPr marL="0" lvl="0" indent="0" algn="ctr" defTabSz="755650">
-            <a:lnSpc>
-              <a:spcPct val="100000"/>
-            </a:lnSpc>
-            <a:spcBef>
-              <a:spcPct val="0"/>
-            </a:spcBef>
-            <a:spcAft>
-              <a:spcPct val="35000"/>
-            </a:spcAft>
-            <a:buNone/>
-          </a:pPr>
-          <a:r>
-            <a:rPr lang="en-US" sz="1700" kern="1200" dirty="0"/>
-            <a:t>Dolor Sit Amet</a:t>
-          </a:r>
-        </a:p>
-        <a:p>
-          <a:pPr marL="0" lvl="0" indent="0" algn="ctr" defTabSz="755650">
-            <a:lnSpc>
-              <a:spcPct val="100000"/>
-            </a:lnSpc>
-            <a:spcBef>
-              <a:spcPct val="0"/>
-            </a:spcBef>
-            <a:spcAft>
-              <a:spcPct val="35000"/>
-            </a:spcAft>
-            <a:buNone/>
-          </a:pPr>
-          <a:r>
-            <a:rPr lang="en-US" sz="1700" kern="1200" dirty="0"/>
-            <a:t>Consectetuer Elit</a:t>
-          </a:r>
-        </a:p>
-        <a:p>
-          <a:pPr marL="0" lvl="0" indent="0" algn="ctr" defTabSz="755650">
-            <a:lnSpc>
-              <a:spcPct val="100000"/>
-            </a:lnSpc>
-            <a:spcBef>
-              <a:spcPct val="0"/>
-            </a:spcBef>
-            <a:spcAft>
-              <a:spcPct val="35000"/>
-            </a:spcAft>
-            <a:buNone/>
-          </a:pPr>
-          <a:r>
-            <a:rPr lang="en-US" sz="1700" kern="1200" dirty="0"/>
-            <a:t>Nunc Viverra</a:t>
-          </a:r>
-        </a:p>
-      </dsp:txBody>
-      <dsp:txXfrm>
-        <a:off x="3632774" y="2224353"/>
-        <a:ext cx="3088125" cy="979799"/>
-      </dsp:txXfrm>
-    </dsp:sp>
-    <dsp:sp modelId="{B0A3ABD2-C471-4A21-8AEF-3843C86919E1}">
-      <dsp:nvSpPr>
-        <dsp:cNvPr id="0" name=""/>
-        <dsp:cNvSpPr/>
-      </dsp:nvSpPr>
-      <dsp:spPr>
-        <a:xfrm>
-          <a:off x="8264962" y="510596"/>
-          <a:ext cx="1080843" cy="1080843"/>
-        </a:xfrm>
-        <a:prstGeom prst="rect">
-          <a:avLst/>
-        </a:prstGeom>
-        <a:blipFill>
-          <a:blip xmlns:r="http://schemas.openxmlformats.org/officeDocument/2006/relationships" r:embed="rId5">
-            <a:extLst>
-              <a:ext uri="{28A0092B-C50C-407E-A947-70E740481C1C}">
-                <a14:useLocalDpi xmlns:a14="http://schemas.microsoft.com/office/drawing/2010/main" val="0"/>
-              </a:ext>
-              <a:ext uri="{96DAC541-7B7A-43D3-8B79-37D633B846F1}">
-                <asvg:svgBlip xmlns:asvg="http://schemas.microsoft.com/office/drawing/2016/SVG/main" r:embed="rId6"/>
-              </a:ext>
-            </a:extLst>
-          </a:blip>
-          <a:stretch>
-            <a:fillRect/>
-          </a:stretch>
-        </a:blipFill>
-        <a:ln w="15875" cap="rnd" cmpd="sng" algn="ctr">
-          <a:noFill/>
-          <a:prstDash val="solid"/>
-        </a:ln>
-        <a:effectLst/>
-      </dsp:spPr>
-      <dsp:style>
-        <a:lnRef idx="2">
-          <a:scrgbClr r="0" g="0" b="0"/>
-        </a:lnRef>
-        <a:fillRef idx="1">
-          <a:scrgbClr r="0" g="0" b="0"/>
-        </a:fillRef>
-        <a:effectRef idx="0">
-          <a:scrgbClr r="0" g="0" b="0"/>
-        </a:effectRef>
-        <a:fontRef idx="minor">
-          <a:schemeClr val="lt1"/>
-        </a:fontRef>
-      </dsp:style>
-    </dsp:sp>
-    <dsp:sp modelId="{C4D97C04-1692-4931-9A64-809D862C1739}">
-      <dsp:nvSpPr>
-        <dsp:cNvPr id="0" name=""/>
-        <dsp:cNvSpPr/>
-      </dsp:nvSpPr>
-      <dsp:spPr>
-        <a:xfrm>
-          <a:off x="7261321" y="1707263"/>
-          <a:ext cx="3088125" cy="463218"/>
-        </a:xfrm>
-        <a:prstGeom prst="rect">
-          <a:avLst/>
-        </a:prstGeom>
-        <a:noFill/>
-        <a:ln>
-          <a:noFill/>
-        </a:ln>
-        <a:effectLst/>
-      </dsp:spPr>
-      <dsp:style>
-        <a:lnRef idx="0">
-          <a:scrgbClr r="0" g="0" b="0"/>
-        </a:lnRef>
-        <a:fillRef idx="0">
-          <a:scrgbClr r="0" g="0" b="0"/>
-        </a:fillRef>
-        <a:effectRef idx="0">
-          <a:scrgbClr r="0" g="0" b="0"/>
-        </a:effectRef>
-        <a:fontRef idx="minor"/>
-      </dsp:style>
-      <dsp:txBody>
-        <a:bodyPr spcFirstLastPara="0" vert="horz" wrap="square" lIns="0" tIns="0" rIns="0" bIns="0" numCol="1" spcCol="1270" anchor="t" anchorCtr="0">
-          <a:noAutofit/>
-        </a:bodyPr>
-        <a:lstStyle/>
-        <a:p>
-          <a:pPr marL="0" lvl="0" indent="0" algn="ctr" defTabSz="1333500">
-            <a:lnSpc>
-              <a:spcPct val="100000"/>
-            </a:lnSpc>
-            <a:spcBef>
-              <a:spcPct val="0"/>
-            </a:spcBef>
-            <a:spcAft>
-              <a:spcPct val="35000"/>
-            </a:spcAft>
-            <a:buNone/>
-            <a:defRPr b="1"/>
-          </a:pPr>
-          <a:r>
-            <a:rPr lang="en-US" sz="3000" kern="1200" dirty="0"/>
-            <a:t>Lorem Ipsum</a:t>
-          </a:r>
-        </a:p>
-      </dsp:txBody>
-      <dsp:txXfrm>
-        <a:off x="7261321" y="1707263"/>
-        <a:ext cx="3088125" cy="463218"/>
-      </dsp:txXfrm>
-    </dsp:sp>
-    <dsp:sp modelId="{6418EBED-F111-425B-8EE2-06B8B2297A68}">
-      <dsp:nvSpPr>
-        <dsp:cNvPr id="0" name=""/>
-        <dsp:cNvSpPr/>
-      </dsp:nvSpPr>
-      <dsp:spPr>
-        <a:xfrm>
-          <a:off x="7261321" y="2224353"/>
-          <a:ext cx="3088125" cy="979799"/>
-        </a:xfrm>
-        <a:prstGeom prst="rect">
-          <a:avLst/>
-        </a:prstGeom>
-        <a:noFill/>
-        <a:ln>
-          <a:noFill/>
-        </a:ln>
-        <a:effectLst/>
-      </dsp:spPr>
-      <dsp:style>
-        <a:lnRef idx="0">
-          <a:scrgbClr r="0" g="0" b="0"/>
-        </a:lnRef>
-        <a:fillRef idx="0">
-          <a:scrgbClr r="0" g="0" b="0"/>
-        </a:fillRef>
-        <a:effectRef idx="0">
-          <a:scrgbClr r="0" g="0" b="0"/>
-        </a:effectRef>
-        <a:fontRef idx="minor"/>
-      </dsp:style>
-      <dsp:txBody>
-        <a:bodyPr spcFirstLastPara="0" vert="horz" wrap="square" lIns="0" tIns="0" rIns="0" bIns="0" numCol="1" spcCol="1270" anchor="t" anchorCtr="0">
-          <a:noAutofit/>
-        </a:bodyPr>
-        <a:lstStyle/>
-        <a:p>
-          <a:pPr marL="0" lvl="0" indent="0" algn="ctr" defTabSz="755650">
-            <a:lnSpc>
-              <a:spcPct val="100000"/>
-            </a:lnSpc>
-            <a:spcBef>
-              <a:spcPct val="0"/>
-            </a:spcBef>
-            <a:spcAft>
-              <a:spcPct val="35000"/>
-            </a:spcAft>
-            <a:buNone/>
-          </a:pPr>
-          <a:r>
-            <a:rPr lang="en-US" sz="1700" kern="1200" dirty="0"/>
-            <a:t>Dolor Sit Amet</a:t>
-          </a:r>
-        </a:p>
-        <a:p>
-          <a:pPr marL="0" lvl="0" indent="0" algn="ctr" defTabSz="755650">
-            <a:lnSpc>
-              <a:spcPct val="100000"/>
-            </a:lnSpc>
-            <a:spcBef>
-              <a:spcPct val="0"/>
-            </a:spcBef>
-            <a:spcAft>
-              <a:spcPct val="35000"/>
-            </a:spcAft>
-            <a:buNone/>
-          </a:pPr>
-          <a:r>
-            <a:rPr lang="en-US" sz="1700" kern="1200" dirty="0"/>
-            <a:t>Consectetuer Elit</a:t>
-          </a:r>
-        </a:p>
-        <a:p>
-          <a:pPr marL="0" lvl="0" indent="0" algn="ctr" defTabSz="755650">
-            <a:lnSpc>
-              <a:spcPct val="100000"/>
-            </a:lnSpc>
-            <a:spcBef>
-              <a:spcPct val="0"/>
-            </a:spcBef>
-            <a:spcAft>
-              <a:spcPct val="35000"/>
-            </a:spcAft>
-            <a:buNone/>
-          </a:pPr>
-          <a:r>
-            <a:rPr lang="en-US" sz="1700" kern="1200" dirty="0"/>
-            <a:t>Nunc Viverra</a:t>
-          </a:r>
-        </a:p>
-      </dsp:txBody>
-      <dsp:txXfrm>
-        <a:off x="7261321" y="2224353"/>
-        <a:ext cx="3088125" cy="979799"/>
-      </dsp:txXfrm>
-    </dsp:sp>
-  </dsp:spTree>
-</dsp:drawing>
-</file>
-
-<file path=ppt/diagrams/layout1.xml><?xml version="1.0" encoding="utf-8"?>
-<dgm:layoutDef xmlns:dgm="http://schemas.openxmlformats.org/drawingml/2006/diagram" xmlns:a="http://schemas.openxmlformats.org/drawingml/2006/main" uniqueId="urn:microsoft.com/office/officeart/2018/5/layout/CenteredIconLabelDescriptionList">
-  <dgm:title val="Centered Icon Label Description List"/>
-  <dgm:desc val="Use to show non-sequential or grouped chunks of information. The placeholder holds an icon or small picture, and corresponding text boxes show Level 1 and Level 2 text respectively. Works well for minimal Level 1 text accompanied by lengthier Level two text."/>
-  <dgm:catLst>
-    <dgm:cat type="icon" pri="500"/>
-  </dgm:catLst>
-  <dgm:sampData useDef="1">
-    <dgm:dataModel>
-      <dgm:ptLst/>
-      <dgm:bg/>
-      <dgm:whole/>
-    </dgm:dataModel>
-  </dgm:sampData>
-  <dgm:styleData useDef="1">
-    <dgm:dataModel>
-      <dgm:ptLst/>
-      <dgm:bg/>
-      <dgm:whole/>
-    </dgm:dataModel>
-  </dgm:styleData>
-  <dgm:clrData useDef="1">
-    <dgm:dataModel>
-      <dgm:ptLst/>
-      <dgm:bg/>
-      <dgm:whole/>
-    </dgm:dataModel>
-  </dgm:clrData>
-  <dgm:layoutNode name="root">
-    <dgm:varLst>
-      <dgm:dir/>
-      <dgm:resizeHandles val="exact"/>
-    </dgm:varLst>
-    <dgm:choose name="Name0">
-      <dgm:if name="Name1" axis="self" func="var" arg="dir" op="equ" val="norm">
-        <dgm:alg type="lin"/>
-      </dgm:if>
-      <dgm:else name="Name2">
-        <dgm:alg type="lin">
-          <dgm:param type="linDir" val="fromR"/>
-        </dgm:alg>
-      </dgm:else>
-    </dgm:choose>
-    <dgm:shape xmlns:r="http://schemas.openxmlformats.org/officeDocument/2006/relationships" r:blip="">
-      <dgm:adjLst/>
-    </dgm:shape>
-    <dgm:presOf/>
-    <dgm:constrLst>
-      <dgm:constr type="h" for="ch" forName="compNode" refType="h" fact="0.45"/>
-      <dgm:constr type="w" for="ch" forName="compNode" val="120"/>
-      <dgm:constr type="w" for="ch" forName="sibTrans" refType="w" refFor="ch" refForName="compNode" fact="0.175"/>
-      <dgm:constr type="primFontSz" for="des" forName="parTx" val="36"/>
-      <dgm:constr type="primFontSz" for="des" forName="desTx" refType="primFontSz" refFor="des" refForName="parTx" op="lte" fact="0.75"/>
-      <dgm:constr type="h" for="des" forName="compNode" op="equ"/>
-      <dgm:constr type="h" for="des" forName="iconRect" op="equ"/>
-      <dgm:constr type="w" for="des" forName="iconRect" op="equ"/>
-      <dgm:constr type="h" for="des" forName="iconSpace" op="equ"/>
-      <dgm:constr type="h" for="des" forName="parTx" op="equ"/>
-      <dgm:constr type="h" for="des" forName="txSpace" op="equ"/>
-      <dgm:constr type="h" for="des" forName="desTx" op="equ"/>
-    </dgm:constrLst>
-    <dgm:ruleLst>
-      <dgm:rule type="w" for="ch" forName="compNode" val="0" fact="NaN" max="NaN"/>
-    </dgm:ruleLst>
-    <dgm:forEach name="Name3" axis="ch" ptType="node">
-      <dgm:layoutNode name="compNode">
-        <dgm:alg type="composite"/>
-        <dgm:shape xmlns:r="http://schemas.openxmlformats.org/officeDocument/2006/relationships" r:blip="">
-          <dgm:adjLst/>
-        </dgm:shape>
-        <dgm:presOf axis="self"/>
-        <dgm:constrLst>
-          <dgm:constr type="w" for="ch" forName="iconRect" refType="w" fact="0.35"/>
-          <dgm:constr type="h" for="ch" forName="iconRect" refType="w" refFor="ch" refForName="iconRect"/>
-          <dgm:constr type="ctrX" for="ch" forName="iconRect" refType="w" fact="0.5"/>
-          <dgm:constr type="t" for="ch" forName="iconRect"/>
-          <dgm:constr type="w" for="ch" forName="iconSpace" refType="w"/>
-          <dgm:constr type="h" for="ch" forName="iconSpace" refType="h" fact="0.043"/>
-          <dgm:constr type="l" for="ch" forName="iconSpace"/>
-          <dgm:constr type="t" for="ch" forName="iconSpace" refType="b" refFor="ch" refForName="iconRect"/>
-          <dgm:constr type="w" for="ch" forName="parTx" refType="w"/>
-          <dgm:constr type="h" for="ch" forName="parTx" refType="w" fact="0.15"/>
-          <dgm:constr type="l" for="ch" forName="parTx"/>
-          <dgm:constr type="t" for="ch" forName="parTx" refType="b" refFor="ch" refForName="iconSpace"/>
-          <dgm:constr type="h" for="ch" forName="txSpace" refType="h" fact="0.02"/>
-          <dgm:constr type="w" for="ch" forName="txSpace" refType="w"/>
-          <dgm:constr type="l" for="ch" forName="txSpace"/>
-          <dgm:constr type="t" for="ch" forName="txSpace" refType="b" refFor="ch" refForName="parTx"/>
-          <dgm:constr type="w" for="ch" forName="desTx" refType="w"/>
-          <dgm:constr type="l" for="ch" forName="desTx"/>
-          <dgm:constr type="t" for="ch" forName="desTx" refType="b" refFor="ch" refForName="txSpace"/>
-        </dgm:constrLst>
-        <dgm:ruleLst>
-          <dgm:rule type="h" val="INF" fact="NaN" max="NaN"/>
-        </dgm:ruleLst>
-        <dgm:layoutNode name="iconRect" styleLbl="node1">
-          <dgm:alg type="sp"/>
-          <dgm:shape xmlns:r="http://schemas.openxmlformats.org/officeDocument/2006/relationships" type="rect" r:blip="" blipPhldr="1">
-            <dgm:adjLst/>
-          </dgm:shape>
-          <dgm:presOf/>
-          <dgm:constrLst/>
-          <dgm:ruleLst/>
-        </dgm:layoutNode>
-        <dgm:layoutNode name="iconSpace">
-          <dgm:alg type="sp"/>
-          <dgm:shape xmlns:r="http://schemas.openxmlformats.org/officeDocument/2006/relationships" r:blip="">
-            <dgm:adjLst/>
-          </dgm:shape>
-          <dgm:presOf/>
-          <dgm:constrLst/>
-          <dgm:ruleLst/>
-        </dgm:layoutNode>
-        <dgm:layoutNode name="parTx" styleLbl="revTx">
-          <dgm:varLst>
-            <dgm:chMax val="0"/>
-            <dgm:chPref val="0"/>
-          </dgm:varLst>
-          <dgm:alg type="tx">
-            <dgm:param type="txAnchorVert" val="t"/>
-          </dgm:alg>
-          <dgm:shape xmlns:r="http://schemas.openxmlformats.org/officeDocument/2006/relationships" type="rect" r:blip="">
-            <dgm:adjLst/>
-          </dgm:shape>
-          <dgm:presOf axis="self" ptType="node"/>
-          <dgm:constrLst>
-            <dgm:constr type="lMarg"/>
-            <dgm:constr type="rMarg"/>
-            <dgm:constr type="tMarg"/>
-            <dgm:constr type="bMarg"/>
-          </dgm:constrLst>
-          <dgm:ruleLst>
-            <dgm:rule type="primFontSz" val="14" fact="NaN" max="NaN"/>
-            <dgm:rule type="h" val="INF" fact="NaN" max="NaN"/>
-          </dgm:ruleLst>
-        </dgm:layoutNode>
-        <dgm:layoutNode name="txSpace">
-          <dgm:alg type="sp"/>
-          <dgm:shape xmlns:r="http://schemas.openxmlformats.org/officeDocument/2006/relationships" r:blip="">
-            <dgm:adjLst/>
-          </dgm:shape>
-          <dgm:presOf/>
-          <dgm:constrLst/>
-          <dgm:ruleLst/>
-        </dgm:layoutNode>
-        <dgm:layoutNode name="desTx" styleLbl="revTx">
-          <dgm:varLst/>
-          <dgm:alg type="tx">
-            <dgm:param type="stBulletLvl" val="0"/>
-            <dgm:param type="txAnchorVert" val="t"/>
-          </dgm:alg>
-          <dgm:shape xmlns:r="http://schemas.openxmlformats.org/officeDocument/2006/relationships" type="rect" r:blip="">
-            <dgm:adjLst/>
-          </dgm:shape>
-          <dgm:presOf axis="des" ptType="node"/>
-          <dgm:constrLst>
-            <dgm:constr type="secFontSz" refType="primFontSz"/>
-            <dgm:constr type="lMarg"/>
-            <dgm:constr type="rMarg"/>
-            <dgm:constr type="tMarg"/>
-            <dgm:constr type="bMarg"/>
-          </dgm:constrLst>
-          <dgm:ruleLst>
-            <dgm:rule type="primFontSz" val="NaN" fact="NaN" max="17"/>
-            <dgm:rule type="h" val="INF" fact="NaN" max="NaN"/>
-          </dgm:ruleLst>
-        </dgm:layoutNode>
-      </dgm:layoutNode>
-      <dgm:forEach name="Name4" axis="followSib" ptType="sibTrans" cnt="1">
-        <dgm:layoutNode name="sibTrans">
-          <dgm:alg type="sp"/>
-          <dgm:shape xmlns:r="http://schemas.openxmlformats.org/officeDocument/2006/relationships" r:blip="">
-            <dgm:adjLst/>
-          </dgm:shape>
-          <dgm:presOf axis="self"/>
-          <dgm:constrLst/>
-          <dgm:ruleLst/>
-        </dgm:layoutNode>
-      </dgm:forEach>
-    </dgm:forEach>
-  </dgm:layoutNode>
-  <dgm:extLst>
-    <a:ext uri="{68A01E43-0DF5-4B5B-8FA6-DAF915123BFB}">
-      <dgm1612:lstStyle xmlns:dgm1612="http://schemas.microsoft.com/office/drawing/2016/12/diagram">
-        <a:lvl1pPr>
-          <a:lnSpc>
-            <a:spcPct val="100000"/>
-          </a:lnSpc>
-          <a:defRPr b="1"/>
-        </a:lvl1pPr>
-        <a:lvl2pPr>
-          <a:lnSpc>
-            <a:spcPct val="100000"/>
-          </a:lnSpc>
-        </a:lvl2pPr>
-      </dgm1612:lstStyle>
-    </a:ext>
-  </dgm:extLst>
-</dgm:layoutDef>
-</file>
-
-<file path=ppt/diagrams/quickStyle1.xml><?xml version="1.0" encoding="utf-8"?>
-<dgm:styleDef xmlns:dgm="http://schemas.openxmlformats.org/drawingml/2006/diagram" xmlns:a="http://schemas.openxmlformats.org/drawingml/2006/main" uniqueId="urn:microsoft.com/office/officeart/2005/8/quickstyle/simple1">
-  <dgm:title val=""/>
-  <dgm:desc val=""/>
-  <dgm:catLst>
-    <dgm:cat type="simple" pri="10100"/>
-  </dgm:catLst>
-  <dgm:scene3d>
-    <a:camera prst="orthographicFront"/>
-    <a:lightRig rig="threePt" dir="t"/>
-  </dgm:scene3d>
-  <dgm:styleLbl name="node0">
-    <dgm:scene3d>
-      <a:camera prst="orthographicFront"/>
-      <a:lightRig rig="threePt" dir="t"/>
-    </dgm:scene3d>
-    <dgm:sp3d/>
-    <dgm:txPr/>
-    <dgm:style>
-      <a:lnRef idx="2">
-        <a:scrgbClr r="0" g="0" b="0"/>
-      </a:lnRef>
-      <a:fillRef idx="1">
-        <a:scrgbClr r="0" g="0" b="0"/>
-      </a:fillRef>
-      <a:effectRef idx="0">
-        <a:scrgbClr r="0" g="0" b="0"/>
-      </a:effectRef>
-      <a:fontRef idx="minor">
-        <a:schemeClr val="lt1"/>
-      </a:fontRef>
-    </dgm:style>
-  </dgm:styleLbl>
-  <dgm:styleLbl name="lnNode1">
-    <dgm:scene3d>
-      <a:camera prst="orthographicFront"/>
-      <a:lightRig rig="threePt" dir="t"/>
-    </dgm:scene3d>
-    <dgm:sp3d/>
-    <dgm:txPr/>
-    <dgm:style>
-      <a:lnRef idx="2">
-        <a:scrgbClr r="0" g="0" b="0"/>
-      </a:lnRef>
-      <a:fillRef idx="1">
-        <a:scrgbClr r="0" g="0" b="0"/>
-      </a:fillRef>
-      <a:effectRef idx="0">
-        <a:scrgbClr r="0" g="0" b="0"/>
-      </a:effectRef>
-      <a:fontRef idx="minor">
-        <a:schemeClr val="lt1"/>
-      </a:fontRef>
-    </dgm:style>
-  </dgm:styleLbl>
-  <dgm:styleLbl name="vennNode1">
-    <dgm:scene3d>
-      <a:camera prst="orthographicFront"/>
-      <a:lightRig rig="threePt" dir="t"/>
-    </dgm:scene3d>
-    <dgm:sp3d/>
-    <dgm:txPr/>
-    <dgm:style>
-      <a:lnRef idx="2">
-        <a:scrgbClr r="0" g="0" b="0"/>
-      </a:lnRef>
-      <a:fillRef idx="1">
-        <a:scrgbClr r="0" g="0" b="0"/>
-      </a:fillRef>
-      <a:effectRef idx="0">
-        <a:scrgbClr r="0" g="0" b="0"/>
-      </a:effectRef>
-      <a:fontRef idx="minor">
-        <a:schemeClr val="tx1"/>
-      </a:fontRef>
-    </dgm:style>
-  </dgm:styleLbl>
-  <dgm:styleLbl name="alignNode1">
-    <dgm:scene3d>
-      <a:camera prst="orthographicFront"/>
-      <a:lightRig rig="threePt" dir="t"/>
-    </dgm:scene3d>
-    <dgm:sp3d/>
-    <dgm:txPr/>
-    <dgm:style>
-      <a:lnRef idx="2">
-        <a:scrgbClr r="0" g="0" b="0"/>
-      </a:lnRef>
-      <a:fillRef idx="1">
-        <a:scrgbClr r="0" g="0" b="0"/>
-      </a:fillRef>
-      <a:effectRef idx="0">
-        <a:scrgbClr r="0" g="0" b="0"/>
-      </a:effectRef>
-      <a:fontRef idx="minor">
-        <a:schemeClr val="lt1"/>
-      </a:fontRef>
-    </dgm:style>
-  </dgm:styleLbl>
-  <dgm:styleLbl name="node1">
-    <dgm:scene3d>
-      <a:camera prst="orthographicFront"/>
-      <a:lightRig rig="threePt" dir="t"/>
-    </dgm:scene3d>
-    <dgm:sp3d/>
-    <dgm:txPr/>
-    <dgm:style>
-      <a:lnRef idx="2">
-        <a:scrgbClr r="0" g="0" b="0"/>
-      </a:lnRef>
-      <a:fillRef idx="1">
-        <a:scrgbClr r="0" g="0" b="0"/>
-      </a:fillRef>
-      <a:effectRef idx="0">
-        <a:scrgbClr r="0" g="0" b="0"/>
-      </a:effectRef>
-      <a:fontRef idx="minor">
-        <a:schemeClr val="lt1"/>
-      </a:fontRef>
-    </dgm:style>
-  </dgm:styleLbl>
-  <dgm:styleLbl name="node2">
-    <dgm:scene3d>
-      <a:camera prst="orthographicFront"/>
-      <a:lightRig rig="threePt" dir="t"/>
-    </dgm:scene3d>
-    <dgm:sp3d/>
-    <dgm:txPr/>
-    <dgm:style>
-      <a:lnRef idx="2">
-        <a:scrgbClr r="0" g="0" b="0"/>
-      </a:lnRef>
-      <a:fillRef idx="1">
-        <a:scrgbClr r="0" g="0" b="0"/>
-      </a:fillRef>
-      <a:effectRef idx="0">
-        <a:scrgbClr r="0" g="0" b="0"/>
-      </a:effectRef>
-      <a:fontRef idx="minor">
-        <a:schemeClr val="lt1"/>
-      </a:fontRef>
-    </dgm:style>
-  </dgm:styleLbl>
-  <dgm:styleLbl name="node3">
-    <dgm:scene3d>
-      <a:camera prst="orthographicFront"/>
-      <a:lightRig rig="threePt" dir="t"/>
-    </dgm:scene3d>
-    <dgm:sp3d/>
-    <dgm:txPr/>
-    <dgm:style>
-      <a:lnRef idx="2">
-        <a:scrgbClr r="0" g="0" b="0"/>
-      </a:lnRef>
-      <a:fillRef idx="1">
-        <a:scrgbClr r="0" g="0" b="0"/>
-      </a:fillRef>
-      <a:effectRef idx="0">
-        <a:scrgbClr r="0" g="0" b="0"/>
-      </a:effectRef>
-      <a:fontRef idx="minor">
-        <a:schemeClr val="lt1"/>
-      </a:fontRef>
-    </dgm:style>
-  </dgm:styleLbl>
-  <dgm:styleLbl name="node4">
-    <dgm:scene3d>
-      <a:camera prst="orthographicFront"/>
-      <a:lightRig rig="threePt" dir="t"/>
-    </dgm:scene3d>
-    <dgm:sp3d/>
-    <dgm:txPr/>
-    <dgm:style>
-      <a:lnRef idx="2">
-        <a:scrgbClr r="0" g="0" b="0"/>
-      </a:lnRef>
-      <a:fillRef idx="1">
-        <a:scrgbClr r="0" g="0" b="0"/>
-      </a:fillRef>
-      <a:effectRef idx="0">
-        <a:scrgbClr r="0" g="0" b="0"/>
-      </a:effectRef>
-      <a:fontRef idx="minor">
-        <a:schemeClr val="lt1"/>
-      </a:fontRef>
-    </dgm:style>
-  </dgm:styleLbl>
-  <dgm:styleLbl name="fgImgPlace1">
-    <dgm:scene3d>
-      <a:camera prst="orthographicFront"/>
-      <a:lightRig rig="threePt" dir="t"/>
-    </dgm:scene3d>
-    <dgm:sp3d/>
-    <dgm:txPr/>
-    <dgm:style>
-      <a:lnRef idx="2">
-        <a:scrgbClr r="0" g="0" b="0"/>
-      </a:lnRef>
-      <a:fillRef idx="1">
-        <a:scrgbClr r="0" g="0" b="0"/>
-      </a:fillRef>
-      <a:effectRef idx="0">
-        <a:scrgbClr r="0" g="0" b="0"/>
-      </a:effectRef>
-      <a:fontRef idx="minor"/>
-    </dgm:style>
-  </dgm:styleLbl>
-  <dgm:styleLbl name="alignImgPlace1">
-    <dgm:scene3d>
-      <a:camera prst="orthographicFront"/>
-      <a:lightRig rig="threePt" dir="t"/>
-    </dgm:scene3d>
-    <dgm:sp3d/>
-    <dgm:txPr/>
-    <dgm:style>
-      <a:lnRef idx="2">
-        <a:scrgbClr r="0" g="0" b="0"/>
-      </a:lnRef>
-      <a:fillRef idx="1">
-        <a:scrgbClr r="0" g="0" b="0"/>
-      </a:fillRef>
-      <a:effectRef idx="0">
-        <a:scrgbClr r="0" g="0" b="0"/>
-      </a:effectRef>
-      <a:fontRef idx="minor"/>
-    </dgm:style>
-  </dgm:styleLbl>
-  <dgm:styleLbl name="bgImgPlace1">
-    <dgm:scene3d>
-      <a:camera prst="orthographicFront"/>
-      <a:lightRig rig="threePt" dir="t"/>
-    </dgm:scene3d>
-    <dgm:sp3d/>
-    <dgm:txPr/>
-    <dgm:style>
-      <a:lnRef idx="2">
-        <a:scrgbClr r="0" g="0" b="0"/>
-      </a:lnRef>
-      <a:fillRef idx="1">
-        <a:scrgbClr r="0" g="0" b="0"/>
-      </a:fillRef>
-      <a:effectRef idx="0">
-        <a:scrgbClr r="0" g="0" b="0"/>
-      </a:effectRef>
-      <a:fontRef idx="minor"/>
-    </dgm:style>
-  </dgm:styleLbl>
-  <dgm:styleLbl name="sibTrans2D1">
-    <dgm:scene3d>
-      <a:camera prst="orthographicFront"/>
-      <a:lightRig rig="threePt" dir="t"/>
-    </dgm:scene3d>
-    <dgm:sp3d/>
-    <dgm:txPr/>
-    <dgm:style>
-      <a:lnRef idx="0">
-        <a:scrgbClr r="0" g="0" b="0"/>
-      </a:lnRef>
-      <a:fillRef idx="1">
-        <a:scrgbClr r="0" g="0" b="0"/>
-      </a:fillRef>
-      <a:effectRef idx="0">
-        <a:scrgbClr r="0" g="0" b="0"/>
-      </a:effectRef>
-      <a:fontRef idx="minor">
-        <a:schemeClr val="lt1"/>
-      </a:fontRef>
-    </dgm:style>
-  </dgm:styleLbl>
-  <dgm:styleLbl name="fgSibTrans2D1">
-    <dgm:scene3d>
-      <a:camera prst="orthographicFront"/>
-      <a:lightRig rig="threePt" dir="t"/>
-    </dgm:scene3d>
-    <dgm:sp3d/>
-    <dgm:txPr/>
-    <dgm:style>
-      <a:lnRef idx="0">
-        <a:scrgbClr r="0" g="0" b="0"/>
-      </a:lnRef>
-      <a:fillRef idx="1">
-        <a:scrgbClr r="0" g="0" b="0"/>
-      </a:fillRef>
-      <a:effectRef idx="0">
-        <a:scrgbClr r="0" g="0" b="0"/>
-      </a:effectRef>
-      <a:fontRef idx="minor">
-        <a:schemeClr val="lt1"/>
-      </a:fontRef>
-    </dgm:style>
-  </dgm:styleLbl>
-  <dgm:styleLbl name="bgSibTrans2D1">
-    <dgm:scene3d>
-      <a:camera prst="orthographicFront"/>
-      <a:lightRig rig="threePt" dir="t"/>
-    </dgm:scene3d>
-    <dgm:sp3d/>
-    <dgm:txPr/>
-    <dgm:style>
-      <a:lnRef idx="0">
-        <a:scrgbClr r="0" g="0" b="0"/>
-      </a:lnRef>
-      <a:fillRef idx="1">
-        <a:scrgbClr r="0" g="0" b="0"/>
-      </a:fillRef>
-      <a:effectRef idx="0">
-        <a:scrgbClr r="0" g="0" b="0"/>
-      </a:effectRef>
-      <a:fontRef idx="minor">
-        <a:schemeClr val="lt1"/>
-      </a:fontRef>
-    </dgm:style>
-  </dgm:styleLbl>
-  <dgm:styleLbl name="sibTrans1D1">
-    <dgm:scene3d>
-      <a:camera prst="orthographicFront"/>
-      <a:lightRig rig="threePt" dir="t"/>
-    </dgm:scene3d>
-    <dgm:sp3d/>
-    <dgm:txPr/>
-    <dgm:style>
-      <a:lnRef idx="1">
-        <a:scrgbClr r="0" g="0" b="0"/>
-      </a:lnRef>
-      <a:fillRef idx="0">
-        <a:scrgbClr r="0" g="0" b="0"/>
-      </a:fillRef>
-      <a:effectRef idx="0">
-        <a:scrgbClr r="0" g="0" b="0"/>
-      </a:effectRef>
-      <a:fontRef idx="minor"/>
-    </dgm:style>
-  </dgm:styleLbl>
-  <dgm:styleLbl name="callout">
-    <dgm:scene3d>
-      <a:camera prst="orthographicFront"/>
-      <a:lightRig rig="threePt" dir="t"/>
-    </dgm:scene3d>
-    <dgm:sp3d/>
-    <dgm:txPr/>
-    <dgm:style>
-      <a:lnRef idx="2">
-        <a:scrgbClr r="0" g="0" b="0"/>
-      </a:lnRef>
-      <a:fillRef idx="1">
-        <a:scrgbClr r="0" g="0" b="0"/>
-      </a:fillRef>
-      <a:effectRef idx="0">
-        <a:scrgbClr r="0" g="0" b="0"/>
-      </a:effectRef>
-      <a:fontRef idx="minor"/>
-    </dgm:style>
-  </dgm:styleLbl>
-  <dgm:styleLbl name="asst0">
-    <dgm:scene3d>
-      <a:camera prst="orthographicFront"/>
-      <a:lightRig rig="threePt" dir="t"/>
-    </dgm:scene3d>
-    <dgm:sp3d/>
-    <dgm:txPr/>
-    <dgm:style>
-      <a:lnRef idx="2">
-        <a:scrgbClr r="0" g="0" b="0"/>
-      </a:lnRef>
-      <a:fillRef idx="1">
-        <a:scrgbClr r="0" g="0" b="0"/>
-      </a:fillRef>
-      <a:effectRef idx="0">
-        <a:scrgbClr r="0" g="0" b="0"/>
-      </a:effectRef>
-      <a:fontRef idx="minor">
-        <a:schemeClr val="lt1"/>
-      </a:fontRef>
-    </dgm:style>
-  </dgm:styleLbl>
-  <dgm:styleLbl name="asst1">
-    <dgm:scene3d>
-      <a:camera prst="orthographicFront"/>
-      <a:lightRig rig="threePt" dir="t"/>
-    </dgm:scene3d>
-    <dgm:sp3d/>
-    <dgm:txPr/>
-    <dgm:style>
-      <a:lnRef idx="2">
-        <a:scrgbClr r="0" g="0" b="0"/>
-      </a:lnRef>
-      <a:fillRef idx="1">
-        <a:scrgbClr r="0" g="0" b="0"/>
-      </a:fillRef>
-      <a:effectRef idx="0">
-        <a:scrgbClr r="0" g="0" b="0"/>
-      </a:effectRef>
-      <a:fontRef idx="minor">
-        <a:schemeClr val="lt1"/>
-      </a:fontRef>
-    </dgm:style>
-  </dgm:styleLbl>
-  <dgm:styleLbl name="asst2">
-    <dgm:scene3d>
-      <a:camera prst="orthographicFront"/>
-      <a:lightRig rig="threePt" dir="t"/>
-    </dgm:scene3d>
-    <dgm:sp3d/>
-    <dgm:txPr/>
-    <dgm:style>
-      <a:lnRef idx="2">
-        <a:scrgbClr r="0" g="0" b="0"/>
-      </a:lnRef>
-      <a:fillRef idx="1">
-        <a:scrgbClr r="0" g="0" b="0"/>
-      </a:fillRef>
-      <a:effectRef idx="0">
-        <a:scrgbClr r="0" g="0" b="0"/>
-      </a:effectRef>
-      <a:fontRef idx="minor">
-        <a:schemeClr val="lt1"/>
-      </a:fontRef>
-    </dgm:style>
-  </dgm:styleLbl>
-  <dgm:styleLbl name="asst3">
-    <dgm:scene3d>
-      <a:camera prst="orthographicFront"/>
-      <a:lightRig rig="threePt" dir="t"/>
-    </dgm:scene3d>
-    <dgm:sp3d/>
-    <dgm:txPr/>
-    <dgm:style>
-      <a:lnRef idx="2">
-        <a:scrgbClr r="0" g="0" b="0"/>
-      </a:lnRef>
-      <a:fillRef idx="1">
-        <a:scrgbClr r="0" g="0" b="0"/>
-      </a:fillRef>
-      <a:effectRef idx="0">
-        <a:scrgbClr r="0" g="0" b="0"/>
-      </a:effectRef>
-      <a:fontRef idx="minor">
-        <a:schemeClr val="lt1"/>
-      </a:fontRef>
-    </dgm:style>
-  </dgm:styleLbl>
-  <dgm:styleLbl name="asst4">
-    <dgm:scene3d>
-      <a:camera prst="orthographicFront"/>
-      <a:lightRig rig="threePt" dir="t"/>
-    </dgm:scene3d>
-    <dgm:sp3d/>
-    <dgm:txPr/>
-    <dgm:style>
-      <a:lnRef idx="2">
-        <a:scrgbClr r="0" g="0" b="0"/>
-      </a:lnRef>
-      <a:fillRef idx="1">
-        <a:scrgbClr r="0" g="0" b="0"/>
-      </a:fillRef>
-      <a:effectRef idx="0">
-        <a:scrgbClr r="0" g="0" b="0"/>
-      </a:effectRef>
-      <a:fontRef idx="minor">
-        <a:schemeClr val="lt1"/>
-      </a:fontRef>
-    </dgm:style>
-  </dgm:styleLbl>
-  <dgm:styleLbl name="parChTrans2D1">
-    <dgm:scene3d>
-      <a:camera prst="orthographicFront"/>
-      <a:lightRig rig="threePt" dir="t"/>
-    </dgm:scene3d>
-    <dgm:sp3d/>
-    <dgm:txPr/>
-    <dgm:style>
-      <a:lnRef idx="2">
-        <a:scrgbClr r="0" g="0" b="0"/>
-      </a:lnRef>
-      <a:fillRef idx="1">
-        <a:scrgbClr r="0" g="0" b="0"/>
-      </a:fillRef>
-      <a:effectRef idx="0">
-        <a:scrgbClr r="0" g="0" b="0"/>
-      </a:effectRef>
-      <a:fontRef idx="minor">
-        <a:schemeClr val="lt1"/>
-      </a:fontRef>
-    </dgm:style>
-  </dgm:styleLbl>
-  <dgm:styleLbl name="parChTrans2D2">
-    <dgm:scene3d>
-      <a:camera prst="orthographicFront"/>
-      <a:lightRig rig="threePt" dir="t"/>
-    </dgm:scene3d>
-    <dgm:sp3d/>
-    <dgm:txPr/>
-    <dgm:style>
-      <a:lnRef idx="2">
-        <a:scrgbClr r="0" g="0" b="0"/>
-      </a:lnRef>
-      <a:fillRef idx="1">
-        <a:scrgbClr r="0" g="0" b="0"/>
-      </a:fillRef>
-      <a:effectRef idx="0">
-        <a:scrgbClr r="0" g="0" b="0"/>
-      </a:effectRef>
-      <a:fontRef idx="minor">
-        <a:schemeClr val="lt1"/>
-      </a:fontRef>
-    </dgm:style>
-  </dgm:styleLbl>
-  <dgm:styleLbl name="parChTrans2D3">
-    <dgm:scene3d>
-      <a:camera prst="orthographicFront"/>
-      <a:lightRig rig="threePt" dir="t"/>
-    </dgm:scene3d>
-    <dgm:sp3d/>
-    <dgm:txPr/>
-    <dgm:style>
-      <a:lnRef idx="2">
-        <a:scrgbClr r="0" g="0" b="0"/>
-      </a:lnRef>
-      <a:fillRef idx="1">
-        <a:scrgbClr r="0" g="0" b="0"/>
-      </a:fillRef>
-      <a:effectRef idx="0">
-        <a:scrgbClr r="0" g="0" b="0"/>
-      </a:effectRef>
-      <a:fontRef idx="minor">
-        <a:schemeClr val="lt1"/>
-      </a:fontRef>
-    </dgm:style>
-  </dgm:styleLbl>
-  <dgm:styleLbl name="parChTrans2D4">
-    <dgm:scene3d>
-      <a:camera prst="orthographicFront"/>
-      <a:lightRig rig="threePt" dir="t"/>
-    </dgm:scene3d>
-    <dgm:sp3d/>
-    <dgm:txPr/>
-    <dgm:style>
-      <a:lnRef idx="2">
-        <a:scrgbClr r="0" g="0" b="0"/>
-      </a:lnRef>
-      <a:fillRef idx="1">
-        <a:scrgbClr r="0" g="0" b="0"/>
-      </a:fillRef>
-      <a:effectRef idx="0">
-        <a:scrgbClr r="0" g="0" b="0"/>
-      </a:effectRef>
-      <a:fontRef idx="minor">
-        <a:schemeClr val="lt1"/>
-      </a:fontRef>
-    </dgm:style>
-  </dgm:styleLbl>
-  <dgm:styleLbl name="parChTrans1D1">
-    <dgm:scene3d>
-      <a:camera prst="orthographicFront"/>
-      <a:lightRig rig="threePt" dir="t"/>
-    </dgm:scene3d>
-    <dgm:sp3d/>
-    <dgm:txPr/>
-    <dgm:style>
-      <a:lnRef idx="2">
-        <a:scrgbClr r="0" g="0" b="0"/>
-      </a:lnRef>
-      <a:fillRef idx="0">
-        <a:scrgbClr r="0" g="0" b="0"/>
-      </a:fillRef>
-      <a:effectRef idx="0">
-        <a:scrgbClr r="0" g="0" b="0"/>
-      </a:effectRef>
-      <a:fontRef idx="minor"/>
-    </dgm:style>
-  </dgm:styleLbl>
-  <dgm:styleLbl name="parChTrans1D2">
-    <dgm:scene3d>
-      <a:camera prst="orthographicFront"/>
-      <a:lightRig rig="threePt" dir="t"/>
-    </dgm:scene3d>
-    <dgm:sp3d/>
-    <dgm:txPr/>
-    <dgm:style>
-      <a:lnRef idx="2">
-        <a:scrgbClr r="0" g="0" b="0"/>
-      </a:lnRef>
-      <a:fillRef idx="0">
-        <a:scrgbClr r="0" g="0" b="0"/>
-      </a:fillRef>
-      <a:effectRef idx="0">
-        <a:scrgbClr r="0" g="0" b="0"/>
-      </a:effectRef>
-      <a:fontRef idx="minor"/>
-    </dgm:style>
-  </dgm:styleLbl>
-  <dgm:styleLbl name="parChTrans1D3">
-    <dgm:scene3d>
-      <a:camera prst="orthographicFront"/>
-      <a:lightRig rig="threePt" dir="t"/>
-    </dgm:scene3d>
-    <dgm:sp3d/>
-    <dgm:txPr/>
-    <dgm:style>
-      <a:lnRef idx="2">
-        <a:scrgbClr r="0" g="0" b="0"/>
-      </a:lnRef>
-      <a:fillRef idx="0">
-        <a:scrgbClr r="0" g="0" b="0"/>
-      </a:fillRef>
-      <a:effectRef idx="0">
-        <a:scrgbClr r="0" g="0" b="0"/>
-      </a:effectRef>
-      <a:fontRef idx="minor"/>
-    </dgm:style>
-  </dgm:styleLbl>
-  <dgm:styleLbl name="parChTrans1D4">
-    <dgm:scene3d>
-      <a:camera prst="orthographicFront"/>
-      <a:lightRig rig="threePt" dir="t"/>
-    </dgm:scene3d>
-    <dgm:sp3d/>
-    <dgm:txPr/>
-    <dgm:style>
-      <a:lnRef idx="2">
-        <a:scrgbClr r="0" g="0" b="0"/>
-      </a:lnRef>
-      <a:fillRef idx="0">
-        <a:scrgbClr r="0" g="0" b="0"/>
-      </a:fillRef>
-      <a:effectRef idx="0">
-        <a:scrgbClr r="0" g="0" b="0"/>
-      </a:effectRef>
-      <a:fontRef idx="minor"/>
-    </dgm:style>
-  </dgm:styleLbl>
-  <dgm:styleLbl name="fgAcc1">
-    <dgm:scene3d>
-      <a:camera prst="orthographicFront"/>
-      <a:lightRig rig="threePt" dir="t"/>
-    </dgm:scene3d>
-    <dgm:sp3d/>
-    <dgm:txPr/>
-    <dgm:style>
-      <a:lnRef idx="2">
-        <a:scrgbClr r="0" g="0" b="0"/>
-      </a:lnRef>
-      <a:fillRef idx="1">
-        <a:scrgbClr r="0" g="0" b="0"/>
-      </a:fillRef>
-      <a:effectRef idx="0">
-        <a:scrgbClr r="0" g="0" b="0"/>
-      </a:effectRef>
-      <a:fontRef idx="minor"/>
-    </dgm:style>
-  </dgm:styleLbl>
-  <dgm:styleLbl name="conFgAcc1">
-    <dgm:scene3d>
-      <a:camera prst="orthographicFront"/>
-      <a:lightRig rig="threePt" dir="t"/>
-    </dgm:scene3d>
-    <dgm:sp3d/>
-    <dgm:txPr/>
-    <dgm:style>
-      <a:lnRef idx="2">
-        <a:scrgbClr r="0" g="0" b="0"/>
-      </a:lnRef>
-      <a:fillRef idx="1">
-        <a:scrgbClr r="0" g="0" b="0"/>
-      </a:fillRef>
-      <a:effectRef idx="0">
-        <a:scrgbClr r="0" g="0" b="0"/>
-      </a:effectRef>
-      <a:fontRef idx="minor"/>
-    </dgm:style>
-  </dgm:styleLbl>
-  <dgm:styleLbl name="alignAcc1">
-    <dgm:scene3d>
-      <a:camera prst="orthographicFront"/>
-      <a:lightRig rig="threePt" dir="t"/>
-    </dgm:scene3d>
-    <dgm:sp3d/>
-    <dgm:txPr/>
-    <dgm:style>
-      <a:lnRef idx="2">
-        <a:scrgbClr r="0" g="0" b="0"/>
-      </a:lnRef>
-      <a:fillRef idx="1">
-        <a:scrgbClr r="0" g="0" b="0"/>
-      </a:fillRef>
-      <a:effectRef idx="0">
-        <a:scrgbClr r="0" g="0" b="0"/>
-      </a:effectRef>
-      <a:fontRef idx="minor"/>
-    </dgm:style>
-  </dgm:styleLbl>
-  <dgm:styleLbl name="trAlignAcc1">
-    <dgm:scene3d>
-      <a:camera prst="orthographicFront"/>
-      <a:lightRig rig="threePt" dir="t"/>
-    </dgm:scene3d>
-    <dgm:sp3d/>
-    <dgm:txPr/>
-    <dgm:style>
-      <a:lnRef idx="1">
-        <a:scrgbClr r="0" g="0" b="0"/>
-      </a:lnRef>
-      <a:fillRef idx="1">
-        <a:scrgbClr r="0" g="0" b="0"/>
-      </a:fillRef>
-      <a:effectRef idx="0">
-        <a:scrgbClr r="0" g="0" b="0"/>
-      </a:effectRef>
-      <a:fontRef idx="minor"/>
-    </dgm:style>
-  </dgm:styleLbl>
-  <dgm:styleLbl name="bgAcc1">
-    <dgm:scene3d>
-      <a:camera prst="orthographicFront"/>
-      <a:lightRig rig="threePt" dir="t"/>
-    </dgm:scene3d>
-    <dgm:sp3d/>
-    <dgm:txPr/>
-    <dgm:style>
-      <a:lnRef idx="2">
-        <a:scrgbClr r="0" g="0" b="0"/>
-      </a:lnRef>
-      <a:fillRef idx="1">
-        <a:scrgbClr r="0" g="0" b="0"/>
-      </a:fillRef>
-      <a:effectRef idx="0">
-        <a:scrgbClr r="0" g="0" b="0"/>
-      </a:effectRef>
-      <a:fontRef idx="minor"/>
-    </dgm:style>
-  </dgm:styleLbl>
-  <dgm:styleLbl name="solidFgAcc1">
-    <dgm:scene3d>
-      <a:camera prst="orthographicFront"/>
-      <a:lightRig rig="threePt" dir="t"/>
-    </dgm:scene3d>
-    <dgm:sp3d/>
-    <dgm:txPr/>
-    <dgm:style>
-      <a:lnRef idx="2">
-        <a:scrgbClr r="0" g="0" b="0"/>
-      </a:lnRef>
-      <a:fillRef idx="1">
-        <a:scrgbClr r="0" g="0" b="0"/>
-      </a:fillRef>
-      <a:effectRef idx="0">
-        <a:scrgbClr r="0" g="0" b="0"/>
-      </a:effectRef>
-      <a:fontRef idx="minor"/>
-    </dgm:style>
-  </dgm:styleLbl>
-  <dgm:styleLbl name="solidAlignAcc1">
-    <dgm:scene3d>
-      <a:camera prst="orthographicFront"/>
-      <a:lightRig rig="threePt" dir="t"/>
-    </dgm:scene3d>
-    <dgm:sp3d/>
-    <dgm:txPr/>
-    <dgm:style>
-      <a:lnRef idx="2">
-        <a:scrgbClr r="0" g="0" b="0"/>
-      </a:lnRef>
-      <a:fillRef idx="1">
-        <a:scrgbClr r="0" g="0" b="0"/>
-      </a:fillRef>
-      <a:effectRef idx="0">
-        <a:scrgbClr r="0" g="0" b="0"/>
-      </a:effectRef>
-      <a:fontRef idx="minor"/>
-    </dgm:style>
-  </dgm:styleLbl>
-  <dgm:styleLbl name="solidBgAcc1">
-    <dgm:scene3d>
-      <a:camera prst="orthographicFront"/>
-      <a:lightRig rig="threePt" dir="t"/>
-    </dgm:scene3d>
-    <dgm:sp3d/>
-    <dgm:txPr/>
-    <dgm:style>
-      <a:lnRef idx="2">
-        <a:scrgbClr r="0" g="0" b="0"/>
-      </a:lnRef>
-      <a:fillRef idx="1">
-        <a:scrgbClr r="0" g="0" b="0"/>
-      </a:fillRef>
-      <a:effectRef idx="0">
-        <a:scrgbClr r="0" g="0" b="0"/>
-      </a:effectRef>
-      <a:fontRef idx="minor"/>
-    </dgm:style>
-  </dgm:styleLbl>
-  <dgm:styleLbl name="fgAccFollowNode1">
-    <dgm:scene3d>
-      <a:camera prst="orthographicFront"/>
-      <a:lightRig rig="threePt" dir="t"/>
-    </dgm:scene3d>
-    <dgm:sp3d/>
-    <dgm:txPr/>
-    <dgm:style>
-      <a:lnRef idx="2">
-        <a:scrgbClr r="0" g="0" b="0"/>
-      </a:lnRef>
-      <a:fillRef idx="1">
-        <a:scrgbClr r="0" g="0" b="0"/>
-      </a:fillRef>
-      <a:effectRef idx="0">
-        <a:scrgbClr r="0" g="0" b="0"/>
-      </a:effectRef>
-      <a:fontRef idx="minor"/>
-    </dgm:style>
-  </dgm:styleLbl>
-  <dgm:styleLbl name="alignAccFollowNode1">
-    <dgm:scene3d>
-      <a:camera prst="orthographicFront"/>
-      <a:lightRig rig="threePt" dir="t"/>
-    </dgm:scene3d>
-    <dgm:sp3d/>
-    <dgm:txPr/>
-    <dgm:style>
-      <a:lnRef idx="2">
-        <a:scrgbClr r="0" g="0" b="0"/>
-      </a:lnRef>
-      <a:fillRef idx="1">
-        <a:scrgbClr r="0" g="0" b="0"/>
-      </a:fillRef>
-      <a:effectRef idx="0">
-        <a:scrgbClr r="0" g="0" b="0"/>
-      </a:effectRef>
-      <a:fontRef idx="minor"/>
-    </dgm:style>
-  </dgm:styleLbl>
-  <dgm:styleLbl name="bgAccFollowNode1">
-    <dgm:scene3d>
-      <a:camera prst="orthographicFront"/>
-      <a:lightRig rig="threePt" dir="t"/>
-    </dgm:scene3d>
-    <dgm:sp3d/>
-    <dgm:txPr/>
-    <dgm:style>
-      <a:lnRef idx="2">
-        <a:scrgbClr r="0" g="0" b="0"/>
-      </a:lnRef>
-      <a:fillRef idx="1">
-        <a:scrgbClr r="0" g="0" b="0"/>
-      </a:fillRef>
-      <a:effectRef idx="0">
-        <a:scrgbClr r="0" g="0" b="0"/>
-      </a:effectRef>
-      <a:fontRef idx="minor"/>
-    </dgm:style>
-  </dgm:styleLbl>
-  <dgm:styleLbl name="fgAcc0">
-    <dgm:scene3d>
-      <a:camera prst="orthographicFront"/>
-      <a:lightRig rig="threePt" dir="t"/>
-    </dgm:scene3d>
-    <dgm:sp3d/>
-    <dgm:txPr/>
-    <dgm:style>
-      <a:lnRef idx="2">
-        <a:scrgbClr r="0" g="0" b="0"/>
-      </a:lnRef>
-      <a:fillRef idx="1">
-        <a:scrgbClr r="0" g="0" b="0"/>
-      </a:fillRef>
-      <a:effectRef idx="0">
-        <a:scrgbClr r="0" g="0" b="0"/>
-      </a:effectRef>
-      <a:fontRef idx="minor"/>
-    </dgm:style>
-  </dgm:styleLbl>
-  <dgm:styleLbl name="fgAcc2">
-    <dgm:scene3d>
-      <a:camera prst="orthographicFront"/>
-      <a:lightRig rig="threePt" dir="t"/>
-    </dgm:scene3d>
-    <dgm:sp3d/>
-    <dgm:txPr/>
-    <dgm:style>
-      <a:lnRef idx="2">
-        <a:scrgbClr r="0" g="0" b="0"/>
-      </a:lnRef>
-      <a:fillRef idx="1">
-        <a:scrgbClr r="0" g="0" b="0"/>
-      </a:fillRef>
-      <a:effectRef idx="0">
-        <a:scrgbClr r="0" g="0" b="0"/>
-      </a:effectRef>
-      <a:fontRef idx="minor"/>
-    </dgm:style>
-  </dgm:styleLbl>
-  <dgm:styleLbl name="fgAcc3">
-    <dgm:scene3d>
-      <a:camera prst="orthographicFront"/>
-      <a:lightRig rig="threePt" dir="t"/>
-    </dgm:scene3d>
-    <dgm:sp3d/>
-    <dgm:txPr/>
-    <dgm:style>
-      <a:lnRef idx="2">
-        <a:scrgbClr r="0" g="0" b="0"/>
-      </a:lnRef>
-      <a:fillRef idx="1">
-        <a:scrgbClr r="0" g="0" b="0"/>
-      </a:fillRef>
-      <a:effectRef idx="0">
-        <a:scrgbClr r="0" g="0" b="0"/>
-      </a:effectRef>
-      <a:fontRef idx="minor"/>
-    </dgm:style>
-  </dgm:styleLbl>
-  <dgm:styleLbl name="fgAcc4">
-    <dgm:scene3d>
-      <a:camera prst="orthographicFront"/>
-      <a:lightRig rig="threePt" dir="t"/>
-    </dgm:scene3d>
-    <dgm:sp3d/>
-    <dgm:txPr/>
-    <dgm:style>
-      <a:lnRef idx="2">
-        <a:scrgbClr r="0" g="0" b="0"/>
-      </a:lnRef>
-      <a:fillRef idx="1">
-        <a:scrgbClr r="0" g="0" b="0"/>
-      </a:fillRef>
-      <a:effectRef idx="0">
-        <a:scrgbClr r="0" g="0" b="0"/>
-      </a:effectRef>
-      <a:fontRef idx="minor"/>
-    </dgm:style>
-  </dgm:styleLbl>
-  <dgm:styleLbl name="bgShp">
-    <dgm:scene3d>
-      <a:camera prst="orthographicFront"/>
-      <a:lightRig rig="threePt" dir="t"/>
-    </dgm:scene3d>
-    <dgm:sp3d/>
-    <dgm:txPr/>
-    <dgm:style>
-      <a:lnRef idx="0">
-        <a:scrgbClr r="0" g="0" b="0"/>
-      </a:lnRef>
-      <a:fillRef idx="1">
-        <a:scrgbClr r="0" g="0" b="0"/>
-      </a:fillRef>
-      <a:effectRef idx="0">
-        <a:scrgbClr r="0" g="0" b="0"/>
-      </a:effectRef>
-      <a:fontRef idx="minor"/>
-    </dgm:style>
-  </dgm:styleLbl>
-  <dgm:styleLbl name="dkBgShp">
-    <dgm:scene3d>
-      <a:camera prst="orthographicFront"/>
-      <a:lightRig rig="threePt" dir="t"/>
-    </dgm:scene3d>
-    <dgm:sp3d/>
-    <dgm:txPr/>
-    <dgm:style>
-      <a:lnRef idx="0">
-        <a:scrgbClr r="0" g="0" b="0"/>
-      </a:lnRef>
-      <a:fillRef idx="1">
-        <a:scrgbClr r="0" g="0" b="0"/>
-      </a:fillRef>
-      <a:effectRef idx="0">
-        <a:scrgbClr r="0" g="0" b="0"/>
-      </a:effectRef>
-      <a:fontRef idx="minor"/>
-    </dgm:style>
-  </dgm:styleLbl>
-  <dgm:styleLbl name="trBgShp">
-    <dgm:scene3d>
-      <a:camera prst="orthographicFront"/>
-      <a:lightRig rig="threePt" dir="t"/>
-    </dgm:scene3d>
-    <dgm:sp3d/>
-    <dgm:txPr/>
-    <dgm:style>
-      <a:lnRef idx="0">
-        <a:scrgbClr r="0" g="0" b="0"/>
-      </a:lnRef>
-      <a:fillRef idx="1">
-        <a:scrgbClr r="0" g="0" b="0"/>
-      </a:fillRef>
-      <a:effectRef idx="0">
-        <a:scrgbClr r="0" g="0" b="0"/>
-      </a:effectRef>
-      <a:fontRef idx="minor"/>
-    </dgm:style>
-  </dgm:styleLbl>
-  <dgm:styleLbl name="fgShp">
-    <dgm:scene3d>
-      <a:camera prst="orthographicFront"/>
-      <a:lightRig rig="threePt" dir="t"/>
-    </dgm:scene3d>
-    <dgm:sp3d/>
-    <dgm:txPr/>
-    <dgm:style>
-      <a:lnRef idx="2">
-        <a:scrgbClr r="0" g="0" b="0"/>
-      </a:lnRef>
-      <a:fillRef idx="1">
-        <a:scrgbClr r="0" g="0" b="0"/>
-      </a:fillRef>
-      <a:effectRef idx="0">
-        <a:scrgbClr r="0" g="0" b="0"/>
-      </a:effectRef>
-      <a:fontRef idx="minor"/>
-    </dgm:style>
-  </dgm:styleLbl>
-  <dgm:styleLbl name="revTx">
-    <dgm:scene3d>
-      <a:camera prst="orthographicFront"/>
-      <a:lightRig rig="threePt" dir="t"/>
-    </dgm:scene3d>
-    <dgm:sp3d/>
-    <dgm:txPr/>
-    <dgm:style>
-      <a:lnRef idx="0">
-        <a:scrgbClr r="0" g="0" b="0"/>
-      </a:lnRef>
-      <a:fillRef idx="0">
-        <a:scrgbClr r="0" g="0" b="0"/>
-      </a:fillRef>
-      <a:effectRef idx="0">
-        <a:scrgbClr r="0" g="0" b="0"/>
-      </a:effectRef>
-      <a:fontRef idx="minor"/>
-    </dgm:style>
-  </dgm:styleLbl>
-</dgm:styleDef>
 </file>
 
 <file path=ppt/slideLayouts/slideLayout1.xml><?xml version="1.0" encoding="utf-8"?>
@@ -9342,7 +5982,7 @@
           </a:effectLst>
           <a:extLst>
             <a:ext uri="{91240B29-F687-4f45-9708-019B960494DF}">
-              <a14:hiddenLine xmlns:a16="http://schemas.microsoft.com/office/drawing/2014/main" xmlns:p14="http://schemas.microsoft.com/office/powerpoint/2010/main" xmlns:a14="http://schemas.microsoft.com/office/drawing/2010/main" xmlns="" w="9525">
+              <a14:hiddenLine xmlns="" xmlns:a14="http://schemas.microsoft.com/office/drawing/2010/main" xmlns:p14="http://schemas.microsoft.com/office/powerpoint/2010/main" xmlns:a16="http://schemas.microsoft.com/office/drawing/2014/main" w="9525">
                 <a:solidFill>
                   <a:srgbClr val="000000"/>
                 </a:solidFill>
@@ -9606,58 +6246,747 @@
         </p:nvSpPr>
         <p:spPr>
           <a:xfrm>
-            <a:off x="913795" y="609600"/>
+            <a:off x="438150" y="638175"/>
             <a:ext cx="10353762" cy="1257300"/>
           </a:xfrm>
         </p:spPr>
         <p:txBody>
-          <a:bodyPr>
+          <a:bodyPr anchor="b">
             <a:normAutofit/>
           </a:bodyPr>
           <a:lstStyle/>
           <a:p>
-            <a:r>
-              <a:rPr lang="en-US" dirty="0"/>
-              <a:t>Title Lorem Ipsum </a:t>
-            </a:r>
-          </a:p>
-        </p:txBody>
-      </p:sp>
-      <p:graphicFrame>
-        <p:nvGraphicFramePr>
-          <p:cNvPr id="12" name="Content Placeholder 2" descr="SmartArt graphic">
+            <a:pPr algn="l"/>
+            <a:r>
+              <a:rPr lang="en-US" sz="5400" dirty="0"/>
+              <a:t>What company was involved?</a:t>
+            </a:r>
+          </a:p>
+        </p:txBody>
+      </p:sp>
+      <p:pic>
+        <p:nvPicPr>
+          <p:cNvPr id="10" name="Content Placeholder 9" descr="Graphical user interface, text, application&#10;&#10;Description automatically generated">
             <a:extLst>
               <a:ext uri="{FF2B5EF4-FFF2-40B4-BE49-F238E27FC236}">
-                <a16:creationId xmlns:a16="http://schemas.microsoft.com/office/drawing/2014/main" id="{1E5659A2-FA7D-4C38-864B-37B42C27540F}"/>
+                <a16:creationId xmlns:a16="http://schemas.microsoft.com/office/drawing/2014/main" id="{83DFC32A-C5D2-5480-D3FB-9661D10EC447}"/>
               </a:ext>
             </a:extLst>
           </p:cNvPr>
-          <p:cNvGraphicFramePr>
-            <a:graphicFrameLocks noGrp="1"/>
-          </p:cNvGraphicFramePr>
+          <p:cNvPicPr>
+            <a:picLocks noGrp="1" noChangeAspect="1"/>
+          </p:cNvPicPr>
           <p:nvPr>
             <p:ph idx="1"/>
-            <p:extLst>
-              <p:ext uri="{D42A27DB-BD31-4B8C-83A1-F6EECF244321}">
-                <p14:modId xmlns:p14="http://schemas.microsoft.com/office/powerpoint/2010/main" val="3619622974"/>
-              </p:ext>
-            </p:extLst>
-          </p:nvPr>
-        </p:nvGraphicFramePr>
-        <p:xfrm>
-          <a:off x="914400" y="2076450"/>
-          <a:ext cx="10353675" cy="3714750"/>
-        </p:xfrm>
-        <a:graphic>
-          <a:graphicData uri="http://schemas.openxmlformats.org/drawingml/2006/diagram">
-            <dgm:relIds xmlns:dgm="http://schemas.openxmlformats.org/drawingml/2006/diagram" xmlns:r="http://schemas.openxmlformats.org/officeDocument/2006/relationships" r:dm="rId3" r:lo="rId4" r:qs="rId5" r:cs="rId6"/>
-          </a:graphicData>
-        </a:graphic>
-      </p:graphicFrame>
+          </p:nvPr>
+        </p:nvPicPr>
+        <p:blipFill>
+          <a:blip r:embed="rId3"/>
+          <a:stretch>
+            <a:fillRect/>
+          </a:stretch>
+        </p:blipFill>
+        <p:spPr>
+          <a:xfrm>
+            <a:off x="4591050" y="2124075"/>
+            <a:ext cx="7162800" cy="4248150"/>
+          </a:xfrm>
+        </p:spPr>
+      </p:pic>
+      <p:sp>
+        <p:nvSpPr>
+          <p:cNvPr id="11" name="TextBox 10">
+            <a:extLst>
+              <a:ext uri="{FF2B5EF4-FFF2-40B4-BE49-F238E27FC236}">
+                <a16:creationId xmlns:a16="http://schemas.microsoft.com/office/drawing/2014/main" id="{C7F052C9-0831-F33F-C099-01583949A1CA}"/>
+              </a:ext>
+            </a:extLst>
+          </p:cNvPr>
+          <p:cNvSpPr txBox="1"/>
+          <p:nvPr/>
+        </p:nvSpPr>
+        <p:spPr>
+          <a:xfrm>
+            <a:off x="438150" y="3075057"/>
+            <a:ext cx="3867150" cy="707886"/>
+          </a:xfrm>
+          <a:prstGeom prst="rect">
+            <a:avLst/>
+          </a:prstGeom>
+          <a:noFill/>
+        </p:spPr>
+        <p:txBody>
+          <a:bodyPr wrap="square" rtlCol="0">
+            <a:spAutoFit/>
+          </a:bodyPr>
+          <a:lstStyle/>
+          <a:p>
+            <a:r>
+              <a:rPr lang="en-US" sz="2000" dirty="0" err="1"/>
+              <a:t>Linkedin</a:t>
+            </a:r>
+            <a:r>
+              <a:rPr lang="en-US" sz="2000" dirty="0"/>
+              <a:t> was the company involved in the data breach.</a:t>
+            </a:r>
+          </a:p>
+        </p:txBody>
+      </p:sp>
     </p:spTree>
     <p:extLst>
       <p:ext uri="{BB962C8B-B14F-4D97-AF65-F5344CB8AC3E}">
         <p14:creationId xmlns:p14="http://schemas.microsoft.com/office/powerpoint/2010/main" val="3265077456"/>
+      </p:ext>
+    </p:extLst>
+  </p:cSld>
+  <p:clrMapOvr>
+    <a:masterClrMapping/>
+  </p:clrMapOvr>
+</p:sld>
+</file>
+
+<file path=ppt/slides/slide3.xml><?xml version="1.0" encoding="utf-8"?>
+<p:sld xmlns:a="http://schemas.openxmlformats.org/drawingml/2006/main" xmlns:r="http://schemas.openxmlformats.org/officeDocument/2006/relationships" xmlns:p="http://schemas.openxmlformats.org/presentationml/2006/main">
+  <p:cSld>
+    <p:bg>
+      <p:bgPr>
+        <a:blipFill rotWithShape="1">
+          <a:blip r:embed="rId2">
+            <a:duotone>
+              <a:schemeClr val="bg1">
+                <a:shade val="80000"/>
+                <a:lumMod val="80000"/>
+              </a:schemeClr>
+              <a:schemeClr val="bg1">
+                <a:tint val="98000"/>
+              </a:schemeClr>
+            </a:duotone>
+          </a:blip>
+          <a:stretch/>
+        </a:blipFill>
+        <a:effectLst/>
+      </p:bgPr>
+    </p:bg>
+    <p:spTree>
+      <p:nvGrpSpPr>
+        <p:cNvPr id="1" name=""/>
+        <p:cNvGrpSpPr/>
+        <p:nvPr/>
+      </p:nvGrpSpPr>
+      <p:grpSpPr>
+        <a:xfrm>
+          <a:off x="0" y="0"/>
+          <a:ext cx="0" cy="0"/>
+          <a:chOff x="0" y="0"/>
+          <a:chExt cx="0" cy="0"/>
+        </a:xfrm>
+      </p:grpSpPr>
+      <p:sp useBgFill="1">
+        <p:nvSpPr>
+          <p:cNvPr id="11" name="Rectangle 10">
+            <a:extLst>
+              <a:ext uri="{FF2B5EF4-FFF2-40B4-BE49-F238E27FC236}">
+                <a16:creationId xmlns:a16="http://schemas.microsoft.com/office/drawing/2014/main" id="{60AB9C63-27B3-4275-BF3D-3E4717045524}"/>
+              </a:ext>
+              <a:ext uri="{C183D7F6-B498-43B3-948B-1728B52AA6E4}">
+                <adec:decorative xmlns:adec="http://schemas.microsoft.com/office/drawing/2017/decorative" val="1"/>
+              </a:ext>
+            </a:extLst>
+          </p:cNvPr>
+          <p:cNvSpPr>
+            <a:spLocks noGrp="1" noRot="1" noChangeAspect="1" noMove="1" noResize="1" noEditPoints="1" noAdjustHandles="1" noChangeArrowheads="1" noChangeShapeType="1" noTextEdit="1"/>
+          </p:cNvSpPr>
+          <p:nvPr>
+            <p:extLst>
+              <p:ext uri="{386F3935-93C4-4BCD-93E2-E3B085C9AB24}">
+                <p16:designElem xmlns:p16="http://schemas.microsoft.com/office/powerpoint/2015/main" val="1"/>
+              </p:ext>
+            </p:extLst>
+          </p:nvPr>
+        </p:nvSpPr>
+        <p:spPr>
+          <a:xfrm>
+            <a:off x="15518" y="0"/>
+            <a:ext cx="12192000" cy="6858000"/>
+          </a:xfrm>
+          <a:prstGeom prst="rect">
+            <a:avLst/>
+          </a:prstGeom>
+          <a:ln>
+            <a:noFill/>
+          </a:ln>
+        </p:spPr>
+        <p:style>
+          <a:lnRef idx="2">
+            <a:schemeClr val="accent1">
+              <a:shade val="50000"/>
+            </a:schemeClr>
+          </a:lnRef>
+          <a:fillRef idx="1">
+            <a:schemeClr val="accent1"/>
+          </a:fillRef>
+          <a:effectRef idx="0">
+            <a:schemeClr val="accent1"/>
+          </a:effectRef>
+          <a:fontRef idx="minor">
+            <a:schemeClr val="lt1"/>
+          </a:fontRef>
+        </p:style>
+        <p:txBody>
+          <a:bodyPr rtlCol="0" anchor="ctr"/>
+          <a:lstStyle/>
+          <a:p>
+            <a:pPr algn="ctr"/>
+            <a:endParaRPr lang="en-US"/>
+          </a:p>
+        </p:txBody>
+      </p:sp>
+      <p:sp>
+        <p:nvSpPr>
+          <p:cNvPr id="2" name="Title 1">
+            <a:extLst>
+              <a:ext uri="{FF2B5EF4-FFF2-40B4-BE49-F238E27FC236}">
+                <a16:creationId xmlns:a16="http://schemas.microsoft.com/office/drawing/2014/main" id="{1C75489D-2D86-8CFF-DCD8-6F2D3787A944}"/>
+              </a:ext>
+            </a:extLst>
+          </p:cNvPr>
+          <p:cNvSpPr>
+            <a:spLocks noGrp="1"/>
+          </p:cNvSpPr>
+          <p:nvPr>
+            <p:ph type="title"/>
+          </p:nvPr>
+        </p:nvSpPr>
+        <p:spPr>
+          <a:xfrm>
+            <a:off x="5402100" y="508389"/>
+            <a:ext cx="5441285" cy="2922365"/>
+          </a:xfrm>
+        </p:spPr>
+        <p:txBody>
+          <a:bodyPr vert="horz" lIns="91440" tIns="45720" rIns="91440" bIns="45720" rtlCol="0" anchor="ctr">
+            <a:normAutofit/>
+          </a:bodyPr>
+          <a:lstStyle/>
+          <a:p>
+            <a:r>
+              <a:rPr lang="en-US" sz="5400" dirty="0"/>
+              <a:t>Who perpetrated the breach? </a:t>
+            </a:r>
+          </a:p>
+        </p:txBody>
+      </p:sp>
+      <p:sp>
+        <p:nvSpPr>
+          <p:cNvPr id="4" name="Text Placeholder 3">
+            <a:extLst>
+              <a:ext uri="{FF2B5EF4-FFF2-40B4-BE49-F238E27FC236}">
+                <a16:creationId xmlns:a16="http://schemas.microsoft.com/office/drawing/2014/main" id="{0CB35D1C-8D46-0180-8132-B1190D7BCCAC}"/>
+              </a:ext>
+            </a:extLst>
+          </p:cNvPr>
+          <p:cNvSpPr>
+            <a:spLocks noGrp="1"/>
+          </p:cNvSpPr>
+          <p:nvPr>
+            <p:ph type="body" sz="half" idx="2"/>
+          </p:nvPr>
+        </p:nvSpPr>
+        <p:spPr>
+          <a:xfrm>
+            <a:off x="5508234" y="3921915"/>
+            <a:ext cx="5441286" cy="933340"/>
+          </a:xfrm>
+        </p:spPr>
+        <p:txBody>
+          <a:bodyPr vert="horz" lIns="91440" tIns="45720" rIns="91440" bIns="45720" rtlCol="0" anchor="t">
+            <a:normAutofit/>
+          </a:bodyPr>
+          <a:lstStyle/>
+          <a:p>
+            <a:pPr>
+              <a:lnSpc>
+                <a:spcPct val="100000"/>
+              </a:lnSpc>
+            </a:pPr>
+            <a:r>
+              <a:rPr lang="en-US" sz="1700" dirty="0">
+                <a:solidFill>
+                  <a:schemeClr val="tx1">
+                    <a:lumMod val="95000"/>
+                  </a:schemeClr>
+                </a:solidFill>
+              </a:rPr>
+              <a:t>A user known as ‘</a:t>
+            </a:r>
+            <a:r>
+              <a:rPr lang="en-US" sz="1700" dirty="0" err="1">
+                <a:solidFill>
+                  <a:schemeClr val="tx1">
+                    <a:lumMod val="95000"/>
+                  </a:schemeClr>
+                </a:solidFill>
+              </a:rPr>
+              <a:t>TomLiner</a:t>
+            </a:r>
+            <a:r>
+              <a:rPr lang="en-US" sz="1700" dirty="0">
+                <a:solidFill>
+                  <a:schemeClr val="tx1">
+                    <a:lumMod val="95000"/>
+                  </a:schemeClr>
+                </a:solidFill>
+              </a:rPr>
+              <a:t>’, using the moniker ‘GOD user’ perpetrated the information gathering.</a:t>
+            </a:r>
+          </a:p>
+        </p:txBody>
+      </p:sp>
+      <p:pic>
+        <p:nvPicPr>
+          <p:cNvPr id="13" name="Picture 12">
+            <a:extLst>
+              <a:ext uri="{FF2B5EF4-FFF2-40B4-BE49-F238E27FC236}">
+                <a16:creationId xmlns:a16="http://schemas.microsoft.com/office/drawing/2014/main" id="{76AAFF90-89E1-46D5-B8B5-3BFDBB92D867}"/>
+              </a:ext>
+              <a:ext uri="{C183D7F6-B498-43B3-948B-1728B52AA6E4}">
+                <adec:decorative xmlns:adec="http://schemas.microsoft.com/office/drawing/2017/decorative" val="1"/>
+              </a:ext>
+            </a:extLst>
+          </p:cNvPr>
+          <p:cNvPicPr>
+            <a:picLocks noGrp="1" noRot="1" noChangeAspect="1" noMove="1" noResize="1" noEditPoints="1" noAdjustHandles="1" noChangeArrowheads="1" noChangeShapeType="1" noCrop="1"/>
+          </p:cNvPicPr>
+          <p:nvPr>
+            <p:extLst>
+              <p:ext uri="{386F3935-93C4-4BCD-93E2-E3B085C9AB24}">
+                <p16:designElem xmlns:p16="http://schemas.microsoft.com/office/powerpoint/2015/main" val="1"/>
+              </p:ext>
+            </p:extLst>
+          </p:nvPr>
+        </p:nvPicPr>
+        <p:blipFill rotWithShape="1">
+          <a:blip r:embed="rId3">
+            <a:extLst>
+              <a:ext uri="{28A0092B-C50C-407E-A947-70E740481C1C}">
+                <a14:useLocalDpi xmlns:a14="http://schemas.microsoft.com/office/drawing/2010/main" val="0"/>
+              </a:ext>
+            </a:extLst>
+          </a:blip>
+          <a:srcRect t="964" r="2807" b="1446"/>
+          <a:stretch/>
+        </p:blipFill>
+        <p:spPr>
+          <a:xfrm>
+            <a:off x="-10649" y="1"/>
+            <a:ext cx="4690532" cy="6858000"/>
+          </a:xfrm>
+          <a:prstGeom prst="rect">
+            <a:avLst/>
+          </a:prstGeom>
+        </p:spPr>
+      </p:pic>
+      <p:pic>
+        <p:nvPicPr>
+          <p:cNvPr id="6" name="Content Placeholder 5" descr="TomLiner">
+            <a:extLst>
+              <a:ext uri="{FF2B5EF4-FFF2-40B4-BE49-F238E27FC236}">
+                <a16:creationId xmlns:a16="http://schemas.microsoft.com/office/drawing/2014/main" id="{CE23A5D5-0DA4-2DD4-7650-54DDFBAEA1B6}"/>
+              </a:ext>
+            </a:extLst>
+          </p:cNvPr>
+          <p:cNvPicPr>
+            <a:picLocks noGrp="1" noChangeAspect="1"/>
+          </p:cNvPicPr>
+          <p:nvPr>
+            <p:ph idx="1"/>
+          </p:nvPr>
+        </p:nvPicPr>
+        <p:blipFill>
+          <a:blip r:embed="rId4"/>
+          <a:stretch>
+            <a:fillRect/>
+          </a:stretch>
+        </p:blipFill>
+        <p:spPr>
+          <a:xfrm>
+            <a:off x="643339" y="1551977"/>
+            <a:ext cx="3551912" cy="3303278"/>
+          </a:xfrm>
+          <a:prstGeom prst="rect">
+            <a:avLst/>
+          </a:prstGeom>
+        </p:spPr>
+      </p:pic>
+    </p:spTree>
+    <p:extLst>
+      <p:ext uri="{BB962C8B-B14F-4D97-AF65-F5344CB8AC3E}">
+        <p14:creationId xmlns:p14="http://schemas.microsoft.com/office/powerpoint/2010/main" val="1435376163"/>
+      </p:ext>
+    </p:extLst>
+  </p:cSld>
+  <p:clrMapOvr>
+    <a:masterClrMapping/>
+  </p:clrMapOvr>
+</p:sld>
+</file>
+
+<file path=ppt/slides/slide4.xml><?xml version="1.0" encoding="utf-8"?>
+<p:sld xmlns:a="http://schemas.openxmlformats.org/drawingml/2006/main" xmlns:r="http://schemas.openxmlformats.org/officeDocument/2006/relationships" xmlns:p="http://schemas.openxmlformats.org/presentationml/2006/main">
+  <p:cSld>
+    <p:bg>
+      <p:bgPr>
+        <a:blipFill rotWithShape="1">
+          <a:blip r:embed="rId2">
+            <a:duotone>
+              <a:schemeClr val="bg1">
+                <a:shade val="80000"/>
+                <a:lumMod val="80000"/>
+              </a:schemeClr>
+              <a:schemeClr val="bg1">
+                <a:tint val="98000"/>
+              </a:schemeClr>
+            </a:duotone>
+          </a:blip>
+          <a:stretch/>
+        </a:blipFill>
+        <a:effectLst/>
+      </p:bgPr>
+    </p:bg>
+    <p:spTree>
+      <p:nvGrpSpPr>
+        <p:cNvPr id="1" name=""/>
+        <p:cNvGrpSpPr/>
+        <p:nvPr/>
+      </p:nvGrpSpPr>
+      <p:grpSpPr>
+        <a:xfrm>
+          <a:off x="0" y="0"/>
+          <a:ext cx="0" cy="0"/>
+          <a:chOff x="0" y="0"/>
+          <a:chExt cx="0" cy="0"/>
+        </a:xfrm>
+      </p:grpSpPr>
+      <p:sp useBgFill="1">
+        <p:nvSpPr>
+          <p:cNvPr id="15" name="Rectangle 10">
+            <a:extLst>
+              <a:ext uri="{FF2B5EF4-FFF2-40B4-BE49-F238E27FC236}">
+                <a16:creationId xmlns:a16="http://schemas.microsoft.com/office/drawing/2014/main" id="{94AB646F-3BE3-47A3-B14F-9CB84F6BF5BD}"/>
+              </a:ext>
+              <a:ext uri="{C183D7F6-B498-43B3-948B-1728B52AA6E4}">
+                <adec:decorative xmlns:adec="http://schemas.microsoft.com/office/drawing/2017/decorative" val="1"/>
+              </a:ext>
+            </a:extLst>
+          </p:cNvPr>
+          <p:cNvSpPr>
+            <a:spLocks noGrp="1" noRot="1" noChangeAspect="1" noMove="1" noResize="1" noEditPoints="1" noAdjustHandles="1" noChangeArrowheads="1" noChangeShapeType="1" noTextEdit="1"/>
+          </p:cNvSpPr>
+          <p:nvPr>
+            <p:extLst>
+              <p:ext uri="{386F3935-93C4-4BCD-93E2-E3B085C9AB24}">
+                <p16:designElem xmlns:p16="http://schemas.microsoft.com/office/powerpoint/2015/main" val="1"/>
+              </p:ext>
+            </p:extLst>
+          </p:nvPr>
+        </p:nvSpPr>
+        <p:spPr>
+          <a:xfrm>
+            <a:off x="0" y="0"/>
+            <a:ext cx="12192000" cy="6858000"/>
+          </a:xfrm>
+          <a:prstGeom prst="rect">
+            <a:avLst/>
+          </a:prstGeom>
+          <a:ln>
+            <a:noFill/>
+          </a:ln>
+        </p:spPr>
+        <p:style>
+          <a:lnRef idx="2">
+            <a:schemeClr val="accent1">
+              <a:shade val="50000"/>
+            </a:schemeClr>
+          </a:lnRef>
+          <a:fillRef idx="1">
+            <a:schemeClr val="accent1"/>
+          </a:fillRef>
+          <a:effectRef idx="0">
+            <a:schemeClr val="accent1"/>
+          </a:effectRef>
+          <a:fontRef idx="minor">
+            <a:schemeClr val="lt1"/>
+          </a:fontRef>
+        </p:style>
+        <p:txBody>
+          <a:bodyPr rtlCol="0" anchor="ctr"/>
+          <a:lstStyle/>
+          <a:p>
+            <a:pPr algn="ctr"/>
+            <a:endParaRPr lang="en-US"/>
+          </a:p>
+        </p:txBody>
+      </p:sp>
+      <p:sp>
+        <p:nvSpPr>
+          <p:cNvPr id="2" name="Title 1">
+            <a:extLst>
+              <a:ext uri="{FF2B5EF4-FFF2-40B4-BE49-F238E27FC236}">
+                <a16:creationId xmlns:a16="http://schemas.microsoft.com/office/drawing/2014/main" id="{8DC16315-F096-B608-7472-D865628CFDF1}"/>
+              </a:ext>
+            </a:extLst>
+          </p:cNvPr>
+          <p:cNvSpPr>
+            <a:spLocks noGrp="1"/>
+          </p:cNvSpPr>
+          <p:nvPr>
+            <p:ph type="title"/>
+          </p:nvPr>
+        </p:nvSpPr>
+        <p:spPr>
+          <a:xfrm>
+            <a:off x="913795" y="609599"/>
+            <a:ext cx="5978072" cy="1481150"/>
+          </a:xfrm>
+        </p:spPr>
+        <p:txBody>
+          <a:bodyPr vert="horz" lIns="91440" tIns="45720" rIns="91440" bIns="45720" rtlCol="0" anchor="ctr">
+            <a:normAutofit/>
+          </a:bodyPr>
+          <a:lstStyle/>
+          <a:p>
+            <a:r>
+              <a:rPr lang="en-US" sz="4000"/>
+              <a:t>What exactly happened?</a:t>
+            </a:r>
+          </a:p>
+        </p:txBody>
+      </p:sp>
+      <p:sp>
+        <p:nvSpPr>
+          <p:cNvPr id="3" name="Content Placeholder 2">
+            <a:extLst>
+              <a:ext uri="{FF2B5EF4-FFF2-40B4-BE49-F238E27FC236}">
+                <a16:creationId xmlns:a16="http://schemas.microsoft.com/office/drawing/2014/main" id="{917CFCAA-9246-F0D2-95E1-6AF57016D405}"/>
+              </a:ext>
+            </a:extLst>
+          </p:cNvPr>
+          <p:cNvSpPr>
+            <a:spLocks noGrp="1"/>
+          </p:cNvSpPr>
+          <p:nvPr>
+            <p:ph sz="half" idx="1"/>
+          </p:nvPr>
+        </p:nvSpPr>
+        <p:spPr>
+          <a:xfrm>
+            <a:off x="913795" y="2279176"/>
+            <a:ext cx="5978072" cy="3415672"/>
+          </a:xfrm>
+        </p:spPr>
+        <p:txBody>
+          <a:bodyPr vert="horz" lIns="91440" tIns="45720" rIns="91440" bIns="45720" rtlCol="0" anchor="ctr">
+            <a:normAutofit/>
+          </a:bodyPr>
+          <a:lstStyle/>
+          <a:p>
+            <a:pPr marL="36900" indent="0">
+              <a:buNone/>
+            </a:pPr>
+            <a:r>
+              <a:rPr lang="en-US" dirty="0"/>
+              <a:t>LinkedIn’s API (Application Programming Interface) was misused by a third party to gain access to the personal data of millions of users.</a:t>
+            </a:r>
+          </a:p>
+        </p:txBody>
+      </p:sp>
+      <p:pic>
+        <p:nvPicPr>
+          <p:cNvPr id="16" name="Picture 12">
+            <a:extLst>
+              <a:ext uri="{FF2B5EF4-FFF2-40B4-BE49-F238E27FC236}">
+                <a16:creationId xmlns:a16="http://schemas.microsoft.com/office/drawing/2014/main" id="{E0BE7827-5B1A-4F37-BF70-19F7C5C6BDEB}"/>
+              </a:ext>
+              <a:ext uri="{C183D7F6-B498-43B3-948B-1728B52AA6E4}">
+                <adec:decorative xmlns:adec="http://schemas.microsoft.com/office/drawing/2017/decorative" val="1"/>
+              </a:ext>
+            </a:extLst>
+          </p:cNvPr>
+          <p:cNvPicPr>
+            <a:picLocks noGrp="1" noRot="1" noChangeAspect="1" noMove="1" noResize="1" noEditPoints="1" noAdjustHandles="1" noChangeArrowheads="1" noChangeShapeType="1" noCrop="1"/>
+          </p:cNvPicPr>
+          <p:nvPr>
+            <p:extLst>
+              <p:ext uri="{386F3935-93C4-4BCD-93E2-E3B085C9AB24}">
+                <p16:designElem xmlns:p16="http://schemas.microsoft.com/office/powerpoint/2015/main" val="1"/>
+              </p:ext>
+            </p:extLst>
+          </p:nvPr>
+        </p:nvPicPr>
+        <p:blipFill rotWithShape="1">
+          <a:blip r:embed="rId3">
+            <a:extLst>
+              <a:ext uri="{28A0092B-C50C-407E-A947-70E740481C1C}">
+                <a14:useLocalDpi xmlns:a14="http://schemas.microsoft.com/office/drawing/2010/main" val="0"/>
+              </a:ext>
+            </a:extLst>
+          </a:blip>
+          <a:srcRect t="964" r="2807" b="1446"/>
+          <a:stretch/>
+        </p:blipFill>
+        <p:spPr>
+          <a:xfrm>
+            <a:off x="7501468" y="1"/>
+            <a:ext cx="4690532" cy="6858000"/>
+          </a:xfrm>
+          <a:prstGeom prst="rect">
+            <a:avLst/>
+          </a:prstGeom>
+        </p:spPr>
+      </p:pic>
+      <p:pic>
+        <p:nvPicPr>
+          <p:cNvPr id="6" name="Content Placeholder 5" descr="Computer script on a screen">
+            <a:extLst>
+              <a:ext uri="{FF2B5EF4-FFF2-40B4-BE49-F238E27FC236}">
+                <a16:creationId xmlns:a16="http://schemas.microsoft.com/office/drawing/2014/main" id="{171D1254-1CFF-B741-8858-E27C5478E320}"/>
+              </a:ext>
+            </a:extLst>
+          </p:cNvPr>
+          <p:cNvPicPr>
+            <a:picLocks noGrp="1" noChangeAspect="1"/>
+          </p:cNvPicPr>
+          <p:nvPr>
+            <p:ph sz="half" idx="2"/>
+          </p:nvPr>
+        </p:nvPicPr>
+        <p:blipFill rotWithShape="1">
+          <a:blip r:embed="rId4"/>
+          <a:srcRect l="7539" r="47964" b="-1"/>
+          <a:stretch/>
+        </p:blipFill>
+        <p:spPr>
+          <a:xfrm>
+            <a:off x="7620351" y="10"/>
+            <a:ext cx="4571649" cy="6857990"/>
+          </a:xfrm>
+          <a:prstGeom prst="rect">
+            <a:avLst/>
+          </a:prstGeom>
+        </p:spPr>
+      </p:pic>
+    </p:spTree>
+    <p:extLst>
+      <p:ext uri="{BB962C8B-B14F-4D97-AF65-F5344CB8AC3E}">
+        <p14:creationId xmlns:p14="http://schemas.microsoft.com/office/powerpoint/2010/main" val="3669261301"/>
+      </p:ext>
+    </p:extLst>
+  </p:cSld>
+  <p:clrMapOvr>
+    <a:masterClrMapping/>
+  </p:clrMapOvr>
+</p:sld>
+</file>
+
+<file path=ppt/slides/slide5.xml><?xml version="1.0" encoding="utf-8"?>
+<p:sld xmlns:a="http://schemas.openxmlformats.org/drawingml/2006/main" xmlns:r="http://schemas.openxmlformats.org/officeDocument/2006/relationships" xmlns:p="http://schemas.openxmlformats.org/presentationml/2006/main">
+  <p:cSld>
+    <p:spTree>
+      <p:nvGrpSpPr>
+        <p:cNvPr id="1" name=""/>
+        <p:cNvGrpSpPr/>
+        <p:nvPr/>
+      </p:nvGrpSpPr>
+      <p:grpSpPr>
+        <a:xfrm>
+          <a:off x="0" y="0"/>
+          <a:ext cx="0" cy="0"/>
+          <a:chOff x="0" y="0"/>
+          <a:chExt cx="0" cy="0"/>
+        </a:xfrm>
+      </p:grpSpPr>
+      <p:sp>
+        <p:nvSpPr>
+          <p:cNvPr id="2" name="Title 1">
+            <a:extLst>
+              <a:ext uri="{FF2B5EF4-FFF2-40B4-BE49-F238E27FC236}">
+                <a16:creationId xmlns:a16="http://schemas.microsoft.com/office/drawing/2014/main" id="{3EC1301D-EB74-DFE6-E2B4-5A89C59EC404}"/>
+              </a:ext>
+            </a:extLst>
+          </p:cNvPr>
+          <p:cNvSpPr>
+            <a:spLocks noGrp="1"/>
+          </p:cNvSpPr>
+          <p:nvPr>
+            <p:ph type="title"/>
+          </p:nvPr>
+        </p:nvSpPr>
+        <p:spPr/>
+        <p:txBody>
+          <a:bodyPr/>
+          <a:lstStyle/>
+          <a:p>
+            <a:r>
+              <a:rPr lang="en-US" dirty="0"/>
+              <a:t>When did the breach take place?</a:t>
+            </a:r>
+          </a:p>
+        </p:txBody>
+      </p:sp>
+      <p:sp>
+        <p:nvSpPr>
+          <p:cNvPr id="3" name="Content Placeholder 2">
+            <a:extLst>
+              <a:ext uri="{FF2B5EF4-FFF2-40B4-BE49-F238E27FC236}">
+                <a16:creationId xmlns:a16="http://schemas.microsoft.com/office/drawing/2014/main" id="{555805C6-43EA-BCAA-D044-11E378A1183E}"/>
+              </a:ext>
+            </a:extLst>
+          </p:cNvPr>
+          <p:cNvSpPr>
+            <a:spLocks noGrp="1"/>
+          </p:cNvSpPr>
+          <p:nvPr>
+            <p:ph sz="half" idx="1"/>
+          </p:nvPr>
+        </p:nvSpPr>
+        <p:spPr/>
+        <p:txBody>
+          <a:bodyPr/>
+          <a:lstStyle/>
+          <a:p>
+            <a:endParaRPr lang="en-US"/>
+          </a:p>
+        </p:txBody>
+      </p:sp>
+      <p:sp>
+        <p:nvSpPr>
+          <p:cNvPr id="4" name="Content Placeholder 3">
+            <a:extLst>
+              <a:ext uri="{FF2B5EF4-FFF2-40B4-BE49-F238E27FC236}">
+                <a16:creationId xmlns:a16="http://schemas.microsoft.com/office/drawing/2014/main" id="{2D3650BB-B46F-C67B-FB8B-048120118E19}"/>
+              </a:ext>
+            </a:extLst>
+          </p:cNvPr>
+          <p:cNvSpPr>
+            <a:spLocks noGrp="1"/>
+          </p:cNvSpPr>
+          <p:nvPr>
+            <p:ph sz="half" idx="2"/>
+          </p:nvPr>
+        </p:nvSpPr>
+        <p:spPr/>
+        <p:txBody>
+          <a:bodyPr/>
+          <a:lstStyle/>
+          <a:p>
+            <a:endParaRPr lang="en-US"/>
+          </a:p>
+        </p:txBody>
+      </p:sp>
+    </p:spTree>
+    <p:extLst>
+      <p:ext uri="{BB962C8B-B14F-4D97-AF65-F5344CB8AC3E}">
+        <p14:creationId xmlns:p14="http://schemas.microsoft.com/office/powerpoint/2010/main" val="1916348363"/>
       </p:ext>
     </p:extLst>
   </p:cSld>
@@ -9850,24 +7179,6 @@
 </file>
 
 <file path=customXml/item1.xml><?xml version="1.0" encoding="utf-8"?>
-<p:properties xmlns:p="http://schemas.microsoft.com/office/2006/metadata/properties" xmlns:xsi="http://www.w3.org/2001/XMLSchema-instance" xmlns:pc="http://schemas.microsoft.com/office/infopath/2007/PartnerControls">
-  <documentManagement>
-    <Status xmlns="71af3243-3dd4-4a8d-8c0d-dd76da1f02a5">Not started</Status>
-    <MediaServiceKeyPoints xmlns="71af3243-3dd4-4a8d-8c0d-dd76da1f02a5" xsi:nil="true"/>
-  </documentManagement>
-</p:properties>
-</file>
-
-<file path=customXml/item2.xml><?xml version="1.0" encoding="utf-8"?>
-<?mso-contentType ?>
-<FormTemplates xmlns="http://schemas.microsoft.com/sharepoint/v3/contenttype/forms">
-  <Display>DocumentLibraryForm</Display>
-  <Edit>DocumentLibraryForm</Edit>
-  <New>DocumentLibraryForm</New>
-</FormTemplates>
-</file>
-
-<file path=customXml/item3.xml><?xml version="1.0" encoding="utf-8"?>
 <ct:contentTypeSchema xmlns:ct="http://schemas.microsoft.com/office/2006/metadata/contentType" xmlns:ma="http://schemas.microsoft.com/office/2006/metadata/properties/metaAttributes" ct:_="" ma:_="" ma:contentTypeName="Document" ma:contentTypeID="0x01010079F111ED35F8CC479449609E8A0923A6" ma:contentTypeVersion="12" ma:contentTypeDescription="Create a new document." ma:contentTypeScope="" ma:versionID="a410dd7f93c95333ffa1b60ed6adedd1">
   <xsd:schema xmlns:xsd="http://www.w3.org/2001/XMLSchema" xmlns:xs="http://www.w3.org/2001/XMLSchema" xmlns:p="http://schemas.microsoft.com/office/2006/metadata/properties" xmlns:ns2="71af3243-3dd4-4a8d-8c0d-dd76da1f02a5" xmlns:ns3="16c05727-aa75-4e4a-9b5f-8a80a1165891" targetNamespace="http://schemas.microsoft.com/office/2006/metadata/properties" ma:root="true" ma:fieldsID="a936d9baba76aa3866493feff160faab" ns2:_="" ns3:_="">
     <xsd:import namespace="71af3243-3dd4-4a8d-8c0d-dd76da1f02a5"/>
@@ -10088,25 +7399,25 @@
 </ct:contentTypeSchema>
 </file>
 
-<file path=customXml/itemProps1.xml><?xml version="1.0" encoding="utf-8"?>
-<ds:datastoreItem xmlns:ds="http://schemas.openxmlformats.org/officeDocument/2006/customXml" ds:itemID="{F7E70FC5-1855-47AB-8CE1-CB3C873A8988}">
-  <ds:schemaRefs>
-    <ds:schemaRef ds:uri="http://schemas.microsoft.com/office/2006/metadata/properties"/>
-    <ds:schemaRef ds:uri="http://schemas.microsoft.com/office/infopath/2007/PartnerControls"/>
-    <ds:schemaRef ds:uri="71af3243-3dd4-4a8d-8c0d-dd76da1f02a5"/>
-  </ds:schemaRefs>
-</ds:datastoreItem>
+<file path=customXml/item2.xml><?xml version="1.0" encoding="utf-8"?>
+<?mso-contentType ?>
+<FormTemplates xmlns="http://schemas.microsoft.com/sharepoint/v3/contenttype/forms">
+  <Display>DocumentLibraryForm</Display>
+  <Edit>DocumentLibraryForm</Edit>
+  <New>DocumentLibraryForm</New>
+</FormTemplates>
 </file>
 
-<file path=customXml/itemProps2.xml><?xml version="1.0" encoding="utf-8"?>
-<ds:datastoreItem xmlns:ds="http://schemas.openxmlformats.org/officeDocument/2006/customXml" ds:itemID="{30CB38EC-895A-4F8F-8F75-E263501ABB5A}">
-  <ds:schemaRefs>
-    <ds:schemaRef ds:uri="http://schemas.microsoft.com/sharepoint/v3/contenttype/forms"/>
-  </ds:schemaRefs>
-</ds:datastoreItem>
+<file path=customXml/item3.xml><?xml version="1.0" encoding="utf-8"?>
+<p:properties xmlns:p="http://schemas.microsoft.com/office/2006/metadata/properties" xmlns:xsi="http://www.w3.org/2001/XMLSchema-instance" xmlns:pc="http://schemas.microsoft.com/office/infopath/2007/PartnerControls">
+  <documentManagement>
+    <Status xmlns="71af3243-3dd4-4a8d-8c0d-dd76da1f02a5">Not started</Status>
+    <MediaServiceKeyPoints xmlns="71af3243-3dd4-4a8d-8c0d-dd76da1f02a5" xsi:nil="true"/>
+  </documentManagement>
+</p:properties>
 </file>
 
-<file path=customXml/itemProps3.xml><?xml version="1.0" encoding="utf-8"?>
+<file path=customXml/itemProps1.xml><?xml version="1.0" encoding="utf-8"?>
 <ds:datastoreItem xmlns:ds="http://schemas.openxmlformats.org/officeDocument/2006/customXml" ds:itemID="{5560E646-30AD-4BA0-97EA-A7A07DF5499A}">
   <ds:schemaRefs>
     <ds:schemaRef ds:uri="http://schemas.microsoft.com/office/2006/metadata/contentType"/>
@@ -10123,4 +7434,22 @@
     <ds:schemaRef ds:uri="http://schemas.microsoft.com/internal/obd"/>
   </ds:schemaRefs>
 </ds:datastoreItem>
+</file>
+
+<file path=customXml/itemProps2.xml><?xml version="1.0" encoding="utf-8"?>
+<ds:datastoreItem xmlns:ds="http://schemas.openxmlformats.org/officeDocument/2006/customXml" ds:itemID="{30CB38EC-895A-4F8F-8F75-E263501ABB5A}">
+  <ds:schemaRefs>
+    <ds:schemaRef ds:uri="http://schemas.microsoft.com/sharepoint/v3/contenttype/forms"/>
+  </ds:schemaRefs>
+</ds:datastoreItem>
+</file>
+
+<file path=customXml/itemProps3.xml><?xml version="1.0" encoding="utf-8"?>
+<ds:datastoreItem xmlns:ds="http://schemas.openxmlformats.org/officeDocument/2006/customXml" ds:itemID="{F7E70FC5-1855-47AB-8CE1-CB3C873A8988}">
+  <ds:schemaRefs>
+    <ds:schemaRef ds:uri="http://schemas.microsoft.com/office/2006/metadata/properties"/>
+    <ds:schemaRef ds:uri="http://schemas.microsoft.com/office/infopath/2007/PartnerControls"/>
+    <ds:schemaRef ds:uri="71af3243-3dd4-4a8d-8c0d-dd76da1f02a5"/>
+  </ds:schemaRefs>
+</ds:datastoreItem>
 </file>
</xml_diff>